<commit_message>
NEW: final code changes and presentation
</commit_message>
<xml_diff>
--- a/week 1/week_1_intro.pptx
+++ b/week 1/week_1_intro.pptx
@@ -5,7 +5,7 @@
     <p:sldMasterId id="2147483972" r:id="rId1"/>
   </p:sldMasterIdLst>
   <p:notesMasterIdLst>
-    <p:notesMasterId r:id="rId27"/>
+    <p:notesMasterId r:id="rId37"/>
   </p:notesMasterIdLst>
   <p:sldIdLst>
     <p:sldId id="256" r:id="rId2"/>
@@ -33,6 +33,16 @@
     <p:sldId id="279" r:id="rId24"/>
     <p:sldId id="278" r:id="rId25"/>
     <p:sldId id="280" r:id="rId26"/>
+    <p:sldId id="281" r:id="rId27"/>
+    <p:sldId id="282" r:id="rId28"/>
+    <p:sldId id="283" r:id="rId29"/>
+    <p:sldId id="284" r:id="rId30"/>
+    <p:sldId id="285" r:id="rId31"/>
+    <p:sldId id="286" r:id="rId32"/>
+    <p:sldId id="287" r:id="rId33"/>
+    <p:sldId id="288" r:id="rId34"/>
+    <p:sldId id="289" r:id="rId35"/>
+    <p:sldId id="290" r:id="rId36"/>
   </p:sldIdLst>
   <p:sldSz cx="12192000" cy="6858000"/>
   <p:notesSz cx="6858000" cy="9144000"/>
@@ -221,7 +231,7 @@
           <a:p>
             <a:fld id="{19356E6C-AC99-594F-A973-00A5B63B4978}" type="datetimeFigureOut">
               <a:rPr lang="en-CR" smtClean="0"/>
-              <a:t>9/4/22</a:t>
+              <a:t>15/4/22</a:t>
             </a:fld>
             <a:endParaRPr lang="en-CR"/>
           </a:p>
@@ -644,7 +654,7 @@
           <a:p>
             <a:fld id="{6F6A969C-B561-A54A-B39E-B070FA434C7A}" type="datetime1">
               <a:rPr lang="en-US" smtClean="0"/>
-              <a:t>4/9/22</a:t>
+              <a:t>4/15/22</a:t>
             </a:fld>
             <a:endParaRPr lang="en-US" dirty="0"/>
           </a:p>
@@ -815,7 +825,7 @@
           <a:p>
             <a:fld id="{D2C1C5B1-AB71-F04F-9BC1-728AEE9F606F}" type="datetime1">
               <a:rPr lang="en-US" smtClean="0"/>
-              <a:t>4/9/22</a:t>
+              <a:t>4/15/22</a:t>
             </a:fld>
             <a:endParaRPr lang="en-US" dirty="0"/>
           </a:p>
@@ -996,7 +1006,7 @@
           <a:p>
             <a:fld id="{B9B5003B-8902-DE40-85EC-DBE1D6B0404C}" type="datetime1">
               <a:rPr lang="en-US" smtClean="0"/>
-              <a:t>4/9/22</a:t>
+              <a:t>4/15/22</a:t>
             </a:fld>
             <a:endParaRPr lang="en-US" dirty="0"/>
           </a:p>
@@ -1167,7 +1177,7 @@
           <a:p>
             <a:fld id="{90CB073F-4785-D24B-9AD2-2E89AA9D1EED}" type="datetime1">
               <a:rPr lang="en-US" smtClean="0"/>
-              <a:t>4/9/22</a:t>
+              <a:t>4/15/22</a:t>
             </a:fld>
             <a:endParaRPr lang="en-US" dirty="0"/>
           </a:p>
@@ -1428,7 +1438,7 @@
           <a:p>
             <a:fld id="{6EB6C2CC-0699-DE41-B0D6-9685E88AE972}" type="datetime1">
               <a:rPr lang="en-US" smtClean="0"/>
-              <a:t>4/9/22</a:t>
+              <a:t>4/15/22</a:t>
             </a:fld>
             <a:endParaRPr lang="en-US" dirty="0"/>
           </a:p>
@@ -1661,7 +1671,7 @@
           <a:p>
             <a:fld id="{0D920FF4-B9C0-4644-B7FB-6986FDBA3661}" type="datetime1">
               <a:rPr lang="en-US" smtClean="0"/>
-              <a:t>4/9/22</a:t>
+              <a:t>4/15/22</a:t>
             </a:fld>
             <a:endParaRPr lang="en-US" dirty="0"/>
           </a:p>
@@ -2017,7 +2027,7 @@
           <a:p>
             <a:fld id="{13B90772-6900-4F46-B6C8-76039AF4EE22}" type="datetime1">
               <a:rPr lang="en-US" smtClean="0"/>
-              <a:t>4/9/22</a:t>
+              <a:t>4/15/22</a:t>
             </a:fld>
             <a:endParaRPr lang="en-US" dirty="0"/>
           </a:p>
@@ -2159,7 +2169,7 @@
           <a:p>
             <a:fld id="{F529848E-D503-CE47-B4AC-9541F3456290}" type="datetime1">
               <a:rPr lang="en-US" smtClean="0"/>
-              <a:t>4/9/22</a:t>
+              <a:t>4/15/22</a:t>
             </a:fld>
             <a:endParaRPr lang="en-US" dirty="0"/>
           </a:p>
@@ -2255,7 +2265,7 @@
           <a:p>
             <a:fld id="{8EF84499-F2EE-A546-8CB3-3ED28A972CAC}" type="datetime1">
               <a:rPr lang="en-US" smtClean="0"/>
-              <a:t>4/9/22</a:t>
+              <a:t>4/15/22</a:t>
             </a:fld>
             <a:endParaRPr lang="en-US" dirty="0"/>
           </a:p>
@@ -2613,7 +2623,7 @@
           <a:p>
             <a:fld id="{DDB9FDC3-AA29-8B45-B6EB-B0EA0C1764D3}" type="datetime1">
               <a:rPr lang="en-US" smtClean="0"/>
-              <a:t>4/9/22</a:t>
+              <a:t>4/15/22</a:t>
             </a:fld>
             <a:endParaRPr lang="en-US" dirty="0"/>
           </a:p>
@@ -2932,7 +2942,7 @@
           <a:p>
             <a:fld id="{56A88B0D-7FF5-1D45-A036-030328FD5E77}" type="datetime1">
               <a:rPr lang="en-US" smtClean="0"/>
-              <a:t>4/9/22</a:t>
+              <a:t>4/15/22</a:t>
             </a:fld>
             <a:endParaRPr lang="en-US" dirty="0"/>
           </a:p>
@@ -3178,7 +3188,7 @@
           <a:p>
             <a:fld id="{0915A0A8-4AAD-954C-B1B9-0F2CC92D59AC}" type="datetime1">
               <a:rPr lang="en-US" smtClean="0"/>
-              <a:t>4/9/22</a:t>
+              <a:t>4/15/22</a:t>
             </a:fld>
             <a:endParaRPr lang="en-US" dirty="0"/>
           </a:p>
@@ -7305,10 +7315,2471 @@
           </a:p>
         </p:txBody>
       </p:sp>
+      <p:sp>
+        <p:nvSpPr>
+          <p:cNvPr id="4" name="TextBox 3">
+            <a:extLst>
+              <a:ext uri="{FF2B5EF4-FFF2-40B4-BE49-F238E27FC236}">
+                <a16:creationId xmlns:a16="http://schemas.microsoft.com/office/drawing/2014/main" id="{DAD0A73E-BB2B-4D41-8529-C5C2D3838AE0}"/>
+              </a:ext>
+            </a:extLst>
+          </p:cNvPr>
+          <p:cNvSpPr txBox="1"/>
+          <p:nvPr/>
+        </p:nvSpPr>
+        <p:spPr>
+          <a:xfrm>
+            <a:off x="945267" y="2828835"/>
+            <a:ext cx="5150733" cy="1477328"/>
+          </a:xfrm>
+          <a:prstGeom prst="rect">
+            <a:avLst/>
+          </a:prstGeom>
+          <a:noFill/>
+        </p:spPr>
+        <p:txBody>
+          <a:bodyPr wrap="square" rtlCol="0">
+            <a:spAutoFit/>
+          </a:bodyPr>
+          <a:lstStyle/>
+          <a:p>
+            <a:pPr marL="285750" indent="-285750">
+              <a:buFont typeface="Arial" panose="020B0604020202020204" pitchFamily="34" charset="0"/>
+              <a:buChar char="•"/>
+            </a:pPr>
+            <a:r>
+              <a:rPr lang="en-CR" dirty="0"/>
+              <a:t>Contruir nuevas imágenes/ reutilizar imágenes</a:t>
+            </a:r>
+          </a:p>
+          <a:p>
+            <a:pPr marL="285750" indent="-285750">
+              <a:buFont typeface="Arial" panose="020B0604020202020204" pitchFamily="34" charset="0"/>
+              <a:buChar char="•"/>
+            </a:pPr>
+            <a:r>
+              <a:rPr lang="en-CR" dirty="0"/>
+              <a:t>Push al Docker Container Registry (Docker Hub)</a:t>
+            </a:r>
+          </a:p>
+          <a:p>
+            <a:pPr marL="285750" indent="-285750">
+              <a:buFont typeface="Arial" panose="020B0604020202020204" pitchFamily="34" charset="0"/>
+              <a:buChar char="•"/>
+            </a:pPr>
+            <a:r>
+              <a:rPr lang="en-CR" dirty="0"/>
+              <a:t>Archivos de configuración (Dockerfile)</a:t>
+            </a:r>
+          </a:p>
+          <a:p>
+            <a:pPr marL="285750" indent="-285750">
+              <a:buFont typeface="Arial" panose="020B0604020202020204" pitchFamily="34" charset="0"/>
+              <a:buChar char="•"/>
+            </a:pPr>
+            <a:r>
+              <a:rPr lang="en-CR" dirty="0"/>
+              <a:t>¿Cómo quiero que se vea mi imagen?</a:t>
+            </a:r>
+          </a:p>
+          <a:p>
+            <a:pPr marL="742950" lvl="1" indent="-285750">
+              <a:buFont typeface="Arial" panose="020B0604020202020204" pitchFamily="34" charset="0"/>
+              <a:buChar char="•"/>
+            </a:pPr>
+            <a:r>
+              <a:rPr lang="en-CR" dirty="0"/>
+              <a:t>Pipeline de la imagen</a:t>
+            </a:r>
+          </a:p>
+        </p:txBody>
+      </p:sp>
+      <p:pic>
+        <p:nvPicPr>
+          <p:cNvPr id="1026" name="Picture 2">
+            <a:extLst>
+              <a:ext uri="{FF2B5EF4-FFF2-40B4-BE49-F238E27FC236}">
+                <a16:creationId xmlns:a16="http://schemas.microsoft.com/office/drawing/2014/main" id="{EC277184-ED20-F24A-9966-900226ABF30C}"/>
+              </a:ext>
+            </a:extLst>
+          </p:cNvPr>
+          <p:cNvPicPr>
+            <a:picLocks noChangeAspect="1" noChangeArrowheads="1"/>
+          </p:cNvPicPr>
+          <p:nvPr/>
+        </p:nvPicPr>
+        <p:blipFill>
+          <a:blip r:embed="rId2">
+            <a:extLst>
+              <a:ext uri="{28A0092B-C50C-407E-A947-70E740481C1C}">
+                <a14:useLocalDpi xmlns:a14="http://schemas.microsoft.com/office/drawing/2010/main" val="0"/>
+              </a:ext>
+            </a:extLst>
+          </a:blip>
+          <a:srcRect/>
+          <a:stretch>
+            <a:fillRect/>
+          </a:stretch>
+        </p:blipFill>
+        <p:spPr bwMode="auto">
+          <a:xfrm>
+            <a:off x="5173884" y="3793860"/>
+            <a:ext cx="6308202" cy="2099448"/>
+          </a:xfrm>
+          <a:prstGeom prst="rect">
+            <a:avLst/>
+          </a:prstGeom>
+          <a:noFill/>
+          <a:extLst>
+            <a:ext uri="{909E8E84-426E-40DD-AFC4-6F175D3DCCD1}">
+              <a14:hiddenFill xmlns:a14="http://schemas.microsoft.com/office/drawing/2010/main">
+                <a:solidFill>
+                  <a:srgbClr val="FFFFFF"/>
+                </a:solidFill>
+              </a14:hiddenFill>
+            </a:ext>
+          </a:extLst>
+        </p:spPr>
+      </p:pic>
+      <p:sp>
+        <p:nvSpPr>
+          <p:cNvPr id="7" name="TextBox 6">
+            <a:extLst>
+              <a:ext uri="{FF2B5EF4-FFF2-40B4-BE49-F238E27FC236}">
+                <a16:creationId xmlns:a16="http://schemas.microsoft.com/office/drawing/2014/main" id="{9C38E5C3-58DD-AB4D-8C70-7C331ADA6BBE}"/>
+              </a:ext>
+            </a:extLst>
+          </p:cNvPr>
+          <p:cNvSpPr txBox="1"/>
+          <p:nvPr/>
+        </p:nvSpPr>
+        <p:spPr>
+          <a:xfrm>
+            <a:off x="121534" y="6445180"/>
+            <a:ext cx="6099858" cy="276999"/>
+          </a:xfrm>
+          <a:prstGeom prst="rect">
+            <a:avLst/>
+          </a:prstGeom>
+          <a:noFill/>
+        </p:spPr>
+        <p:txBody>
+          <a:bodyPr wrap="square">
+            <a:spAutoFit/>
+          </a:bodyPr>
+          <a:lstStyle/>
+          <a:p>
+            <a:r>
+              <a:rPr lang="en-CR" sz="1200" dirty="0">
+                <a:solidFill>
+                  <a:schemeClr val="tx2"/>
+                </a:solidFill>
+              </a:rPr>
+              <a:t>https://miro.medium.com/max/1400/0*CP98BIIBgMG2K3u5.png</a:t>
+            </a:r>
+          </a:p>
+        </p:txBody>
+      </p:sp>
     </p:spTree>
     <p:extLst>
       <p:ext uri="{BB962C8B-B14F-4D97-AF65-F5344CB8AC3E}">
         <p14:creationId xmlns:p14="http://schemas.microsoft.com/office/powerpoint/2010/main" val="3899022406"/>
+      </p:ext>
+    </p:extLst>
+  </p:cSld>
+  <p:clrMapOvr>
+    <a:masterClrMapping/>
+  </p:clrMapOvr>
+</p:sld>
+</file>
+
+<file path=ppt/slides/slide26.xml><?xml version="1.0" encoding="utf-8"?>
+<p:sld xmlns:a="http://schemas.openxmlformats.org/drawingml/2006/main" xmlns:r="http://schemas.openxmlformats.org/officeDocument/2006/relationships" xmlns:p="http://schemas.openxmlformats.org/presentationml/2006/main">
+  <p:cSld>
+    <p:spTree>
+      <p:nvGrpSpPr>
+        <p:cNvPr id="1" name=""/>
+        <p:cNvGrpSpPr/>
+        <p:nvPr/>
+      </p:nvGrpSpPr>
+      <p:grpSpPr>
+        <a:xfrm>
+          <a:off x="0" y="0"/>
+          <a:ext cx="0" cy="0"/>
+          <a:chOff x="0" y="0"/>
+          <a:chExt cx="0" cy="0"/>
+        </a:xfrm>
+      </p:grpSpPr>
+      <p:sp>
+        <p:nvSpPr>
+          <p:cNvPr id="2" name="Title 1">
+            <a:extLst>
+              <a:ext uri="{FF2B5EF4-FFF2-40B4-BE49-F238E27FC236}">
+                <a16:creationId xmlns:a16="http://schemas.microsoft.com/office/drawing/2014/main" id="{5FCAE98A-1FA7-F640-BC7F-9C11658500D7}"/>
+              </a:ext>
+            </a:extLst>
+          </p:cNvPr>
+          <p:cNvSpPr>
+            <a:spLocks noGrp="1"/>
+          </p:cNvSpPr>
+          <p:nvPr>
+            <p:ph type="title"/>
+          </p:nvPr>
+        </p:nvSpPr>
+        <p:spPr/>
+        <p:txBody>
+          <a:bodyPr/>
+          <a:lstStyle/>
+          <a:p>
+            <a:r>
+              <a:rPr lang="en-US" dirty="0" err="1"/>
+              <a:t>Dockerfile</a:t>
+            </a:r>
+            <a:endParaRPr lang="en-CR" dirty="0"/>
+          </a:p>
+        </p:txBody>
+      </p:sp>
+      <p:sp>
+        <p:nvSpPr>
+          <p:cNvPr id="3" name="Slide Number Placeholder 2">
+            <a:extLst>
+              <a:ext uri="{FF2B5EF4-FFF2-40B4-BE49-F238E27FC236}">
+                <a16:creationId xmlns:a16="http://schemas.microsoft.com/office/drawing/2014/main" id="{1DECACD6-7120-4E4A-BB11-C58BCD3D0F9A}"/>
+              </a:ext>
+            </a:extLst>
+          </p:cNvPr>
+          <p:cNvSpPr>
+            <a:spLocks noGrp="1"/>
+          </p:cNvSpPr>
+          <p:nvPr>
+            <p:ph type="sldNum" sz="quarter" idx="12"/>
+          </p:nvPr>
+        </p:nvSpPr>
+        <p:spPr/>
+        <p:txBody>
+          <a:bodyPr/>
+          <a:lstStyle/>
+          <a:p>
+            <a:fld id="{4FAB73BC-B049-4115-A692-8D63A059BFB8}" type="slidenum">
+              <a:rPr lang="en-US" smtClean="0"/>
+              <a:pPr/>
+              <a:t>26</a:t>
+            </a:fld>
+            <a:endParaRPr lang="en-US" dirty="0"/>
+          </a:p>
+        </p:txBody>
+      </p:sp>
+      <p:sp>
+        <p:nvSpPr>
+          <p:cNvPr id="4" name="TextBox 3">
+            <a:extLst>
+              <a:ext uri="{FF2B5EF4-FFF2-40B4-BE49-F238E27FC236}">
+                <a16:creationId xmlns:a16="http://schemas.microsoft.com/office/drawing/2014/main" id="{DAD0A73E-BB2B-4D41-8529-C5C2D3838AE0}"/>
+              </a:ext>
+            </a:extLst>
+          </p:cNvPr>
+          <p:cNvSpPr txBox="1"/>
+          <p:nvPr/>
+        </p:nvSpPr>
+        <p:spPr>
+          <a:xfrm>
+            <a:off x="945267" y="2828835"/>
+            <a:ext cx="5150733" cy="646331"/>
+          </a:xfrm>
+          <a:prstGeom prst="rect">
+            <a:avLst/>
+          </a:prstGeom>
+          <a:noFill/>
+        </p:spPr>
+        <p:txBody>
+          <a:bodyPr wrap="square" rtlCol="0">
+            <a:spAutoFit/>
+          </a:bodyPr>
+          <a:lstStyle/>
+          <a:p>
+            <a:pPr marL="285750" indent="-285750">
+              <a:buFont typeface="Arial" panose="020B0604020202020204" pitchFamily="34" charset="0"/>
+              <a:buChar char="•"/>
+            </a:pPr>
+            <a:r>
+              <a:rPr lang="en-CR" dirty="0"/>
+              <a:t>Dockerfile: pipeline para creación de la imagen</a:t>
+            </a:r>
+          </a:p>
+          <a:p>
+            <a:pPr marL="285750" indent="-285750">
+              <a:buFont typeface="Arial" panose="020B0604020202020204" pitchFamily="34" charset="0"/>
+              <a:buChar char="•"/>
+            </a:pPr>
+            <a:r>
+              <a:rPr lang="en-CR" dirty="0"/>
+              <a:t>Arquitectura por capas y cache</a:t>
+            </a:r>
+          </a:p>
+        </p:txBody>
+      </p:sp>
+      <p:sp>
+        <p:nvSpPr>
+          <p:cNvPr id="8" name="TextBox 7">
+            <a:extLst>
+              <a:ext uri="{FF2B5EF4-FFF2-40B4-BE49-F238E27FC236}">
+                <a16:creationId xmlns:a16="http://schemas.microsoft.com/office/drawing/2014/main" id="{0B565E2E-6BB7-CD42-AEC6-19B9898B5310}"/>
+              </a:ext>
+            </a:extLst>
+          </p:cNvPr>
+          <p:cNvSpPr txBox="1"/>
+          <p:nvPr/>
+        </p:nvSpPr>
+        <p:spPr>
+          <a:xfrm>
+            <a:off x="2728986" y="3965923"/>
+            <a:ext cx="1446836" cy="369332"/>
+          </a:xfrm>
+          <a:prstGeom prst="rect">
+            <a:avLst/>
+          </a:prstGeom>
+          <a:solidFill>
+            <a:schemeClr val="accent1"/>
+          </a:solidFill>
+        </p:spPr>
+        <p:txBody>
+          <a:bodyPr wrap="square" rtlCol="0">
+            <a:spAutoFit/>
+          </a:bodyPr>
+          <a:lstStyle/>
+          <a:p>
+            <a:pPr algn="ctr"/>
+            <a:r>
+              <a:rPr lang="en-CR" dirty="0"/>
+              <a:t>Instrucción</a:t>
+            </a:r>
+            <a:r>
+              <a:rPr lang="en-CR" baseline="-25000" dirty="0"/>
+              <a:t>1</a:t>
+            </a:r>
+          </a:p>
+        </p:txBody>
+      </p:sp>
+      <p:sp>
+        <p:nvSpPr>
+          <p:cNvPr id="9" name="TextBox 8">
+            <a:extLst>
+              <a:ext uri="{FF2B5EF4-FFF2-40B4-BE49-F238E27FC236}">
+                <a16:creationId xmlns:a16="http://schemas.microsoft.com/office/drawing/2014/main" id="{FC9074CE-9908-5B4B-9B72-8ECE0B143FA8}"/>
+              </a:ext>
+            </a:extLst>
+          </p:cNvPr>
+          <p:cNvSpPr txBox="1"/>
+          <p:nvPr/>
+        </p:nvSpPr>
+        <p:spPr>
+          <a:xfrm>
+            <a:off x="4303143" y="3965923"/>
+            <a:ext cx="1446836" cy="369332"/>
+          </a:xfrm>
+          <a:prstGeom prst="rect">
+            <a:avLst/>
+          </a:prstGeom>
+          <a:solidFill>
+            <a:schemeClr val="accent2"/>
+          </a:solidFill>
+        </p:spPr>
+        <p:txBody>
+          <a:bodyPr wrap="square" rtlCol="0">
+            <a:spAutoFit/>
+          </a:bodyPr>
+          <a:lstStyle/>
+          <a:p>
+            <a:pPr algn="ctr"/>
+            <a:r>
+              <a:rPr lang="en-CR" dirty="0"/>
+              <a:t>Argumento</a:t>
+            </a:r>
+            <a:r>
+              <a:rPr lang="en-CR" baseline="-25000" dirty="0"/>
+              <a:t>1</a:t>
+            </a:r>
+          </a:p>
+        </p:txBody>
+      </p:sp>
+      <p:sp>
+        <p:nvSpPr>
+          <p:cNvPr id="10" name="TextBox 9">
+            <a:extLst>
+              <a:ext uri="{FF2B5EF4-FFF2-40B4-BE49-F238E27FC236}">
+                <a16:creationId xmlns:a16="http://schemas.microsoft.com/office/drawing/2014/main" id="{B84D5521-FB89-0D4F-ADA0-AB3BA5CFD205}"/>
+              </a:ext>
+            </a:extLst>
+          </p:cNvPr>
+          <p:cNvSpPr txBox="1"/>
+          <p:nvPr/>
+        </p:nvSpPr>
+        <p:spPr>
+          <a:xfrm>
+            <a:off x="2728986" y="5123934"/>
+            <a:ext cx="1446836" cy="369332"/>
+          </a:xfrm>
+          <a:prstGeom prst="rect">
+            <a:avLst/>
+          </a:prstGeom>
+          <a:solidFill>
+            <a:schemeClr val="accent1"/>
+          </a:solidFill>
+        </p:spPr>
+        <p:txBody>
+          <a:bodyPr wrap="square" rtlCol="0">
+            <a:spAutoFit/>
+          </a:bodyPr>
+          <a:lstStyle/>
+          <a:p>
+            <a:pPr algn="ctr"/>
+            <a:r>
+              <a:rPr lang="en-CR" dirty="0"/>
+              <a:t>Instrucción</a:t>
+            </a:r>
+            <a:r>
+              <a:rPr lang="en-CR" baseline="-25000" dirty="0"/>
+              <a:t>n</a:t>
+            </a:r>
+          </a:p>
+        </p:txBody>
+      </p:sp>
+      <p:sp>
+        <p:nvSpPr>
+          <p:cNvPr id="11" name="TextBox 10">
+            <a:extLst>
+              <a:ext uri="{FF2B5EF4-FFF2-40B4-BE49-F238E27FC236}">
+                <a16:creationId xmlns:a16="http://schemas.microsoft.com/office/drawing/2014/main" id="{33FF569A-4E7E-BD45-A2A3-A9B858DAC0D6}"/>
+              </a:ext>
+            </a:extLst>
+          </p:cNvPr>
+          <p:cNvSpPr txBox="1"/>
+          <p:nvPr/>
+        </p:nvSpPr>
+        <p:spPr>
+          <a:xfrm>
+            <a:off x="4303143" y="5123934"/>
+            <a:ext cx="1446836" cy="369332"/>
+          </a:xfrm>
+          <a:prstGeom prst="rect">
+            <a:avLst/>
+          </a:prstGeom>
+          <a:solidFill>
+            <a:schemeClr val="accent2"/>
+          </a:solidFill>
+        </p:spPr>
+        <p:txBody>
+          <a:bodyPr wrap="square" rtlCol="0">
+            <a:spAutoFit/>
+          </a:bodyPr>
+          <a:lstStyle/>
+          <a:p>
+            <a:pPr algn="ctr"/>
+            <a:r>
+              <a:rPr lang="en-CR" dirty="0"/>
+              <a:t>Argumento</a:t>
+            </a:r>
+            <a:r>
+              <a:rPr lang="en-CR" baseline="-25000" dirty="0"/>
+              <a:t>n</a:t>
+            </a:r>
+          </a:p>
+        </p:txBody>
+      </p:sp>
+      <p:cxnSp>
+        <p:nvCxnSpPr>
+          <p:cNvPr id="6" name="Straight Connector 5">
+            <a:extLst>
+              <a:ext uri="{FF2B5EF4-FFF2-40B4-BE49-F238E27FC236}">
+                <a16:creationId xmlns:a16="http://schemas.microsoft.com/office/drawing/2014/main" id="{32EE7EEF-6220-214F-96A5-2756C7DC3EBA}"/>
+              </a:ext>
+            </a:extLst>
+          </p:cNvPr>
+          <p:cNvCxnSpPr>
+            <a:cxnSpLocks/>
+          </p:cNvCxnSpPr>
+          <p:nvPr/>
+        </p:nvCxnSpPr>
+        <p:spPr>
+          <a:xfrm flipV="1">
+            <a:off x="4212107" y="4871644"/>
+            <a:ext cx="0" cy="131639"/>
+          </a:xfrm>
+          <a:prstGeom prst="line">
+            <a:avLst/>
+          </a:prstGeom>
+        </p:spPr>
+        <p:style>
+          <a:lnRef idx="3">
+            <a:schemeClr val="accent1"/>
+          </a:lnRef>
+          <a:fillRef idx="0">
+            <a:schemeClr val="accent1"/>
+          </a:fillRef>
+          <a:effectRef idx="2">
+            <a:schemeClr val="accent1"/>
+          </a:effectRef>
+          <a:fontRef idx="minor">
+            <a:schemeClr val="tx1"/>
+          </a:fontRef>
+        </p:style>
+      </p:cxnSp>
+      <p:cxnSp>
+        <p:nvCxnSpPr>
+          <p:cNvPr id="14" name="Straight Connector 13">
+            <a:extLst>
+              <a:ext uri="{FF2B5EF4-FFF2-40B4-BE49-F238E27FC236}">
+                <a16:creationId xmlns:a16="http://schemas.microsoft.com/office/drawing/2014/main" id="{B366DA46-6B2F-E04E-B0A7-A069B0C524D5}"/>
+              </a:ext>
+            </a:extLst>
+          </p:cNvPr>
+          <p:cNvCxnSpPr>
+            <a:cxnSpLocks/>
+          </p:cNvCxnSpPr>
+          <p:nvPr/>
+        </p:nvCxnSpPr>
+        <p:spPr>
+          <a:xfrm flipV="1">
+            <a:off x="4212107" y="4682958"/>
+            <a:ext cx="0" cy="131639"/>
+          </a:xfrm>
+          <a:prstGeom prst="line">
+            <a:avLst/>
+          </a:prstGeom>
+        </p:spPr>
+        <p:style>
+          <a:lnRef idx="3">
+            <a:schemeClr val="accent1"/>
+          </a:lnRef>
+          <a:fillRef idx="0">
+            <a:schemeClr val="accent1"/>
+          </a:fillRef>
+          <a:effectRef idx="2">
+            <a:schemeClr val="accent1"/>
+          </a:effectRef>
+          <a:fontRef idx="minor">
+            <a:schemeClr val="tx1"/>
+          </a:fontRef>
+        </p:style>
+      </p:cxnSp>
+      <p:cxnSp>
+        <p:nvCxnSpPr>
+          <p:cNvPr id="15" name="Straight Connector 14">
+            <a:extLst>
+              <a:ext uri="{FF2B5EF4-FFF2-40B4-BE49-F238E27FC236}">
+                <a16:creationId xmlns:a16="http://schemas.microsoft.com/office/drawing/2014/main" id="{933B0C20-FA85-6948-9194-0F1465A4B4AD}"/>
+              </a:ext>
+            </a:extLst>
+          </p:cNvPr>
+          <p:cNvCxnSpPr>
+            <a:cxnSpLocks/>
+          </p:cNvCxnSpPr>
+          <p:nvPr/>
+        </p:nvCxnSpPr>
+        <p:spPr>
+          <a:xfrm flipV="1">
+            <a:off x="4212107" y="4494273"/>
+            <a:ext cx="0" cy="131639"/>
+          </a:xfrm>
+          <a:prstGeom prst="line">
+            <a:avLst/>
+          </a:prstGeom>
+        </p:spPr>
+        <p:style>
+          <a:lnRef idx="3">
+            <a:schemeClr val="accent1"/>
+          </a:lnRef>
+          <a:fillRef idx="0">
+            <a:schemeClr val="accent1"/>
+          </a:fillRef>
+          <a:effectRef idx="2">
+            <a:schemeClr val="accent1"/>
+          </a:effectRef>
+          <a:fontRef idx="minor">
+            <a:schemeClr val="tx1"/>
+          </a:fontRef>
+        </p:style>
+      </p:cxnSp>
+      <p:cxnSp>
+        <p:nvCxnSpPr>
+          <p:cNvPr id="16" name="Straight Connector 15">
+            <a:extLst>
+              <a:ext uri="{FF2B5EF4-FFF2-40B4-BE49-F238E27FC236}">
+                <a16:creationId xmlns:a16="http://schemas.microsoft.com/office/drawing/2014/main" id="{A8B99019-CD93-3146-94CA-BD9D3CD259EC}"/>
+              </a:ext>
+            </a:extLst>
+          </p:cNvPr>
+          <p:cNvCxnSpPr/>
+          <p:nvPr/>
+        </p:nvCxnSpPr>
+        <p:spPr>
+          <a:xfrm>
+            <a:off x="5932714" y="4158343"/>
+            <a:ext cx="315686" cy="0"/>
+          </a:xfrm>
+          <a:prstGeom prst="line">
+            <a:avLst/>
+          </a:prstGeom>
+        </p:spPr>
+        <p:style>
+          <a:lnRef idx="3">
+            <a:schemeClr val="accent2"/>
+          </a:lnRef>
+          <a:fillRef idx="0">
+            <a:schemeClr val="accent2"/>
+          </a:fillRef>
+          <a:effectRef idx="2">
+            <a:schemeClr val="accent2"/>
+          </a:effectRef>
+          <a:fontRef idx="minor">
+            <a:schemeClr val="tx1"/>
+          </a:fontRef>
+        </p:style>
+      </p:cxnSp>
+      <p:cxnSp>
+        <p:nvCxnSpPr>
+          <p:cNvPr id="18" name="Straight Connector 17">
+            <a:extLst>
+              <a:ext uri="{FF2B5EF4-FFF2-40B4-BE49-F238E27FC236}">
+                <a16:creationId xmlns:a16="http://schemas.microsoft.com/office/drawing/2014/main" id="{5074603E-B85C-B24F-ABBE-ED6BEC22C617}"/>
+              </a:ext>
+            </a:extLst>
+          </p:cNvPr>
+          <p:cNvCxnSpPr/>
+          <p:nvPr/>
+        </p:nvCxnSpPr>
+        <p:spPr>
+          <a:xfrm>
+            <a:off x="6346371" y="4158343"/>
+            <a:ext cx="315686" cy="0"/>
+          </a:xfrm>
+          <a:prstGeom prst="line">
+            <a:avLst/>
+          </a:prstGeom>
+        </p:spPr>
+        <p:style>
+          <a:lnRef idx="3">
+            <a:schemeClr val="accent2"/>
+          </a:lnRef>
+          <a:fillRef idx="0">
+            <a:schemeClr val="accent2"/>
+          </a:fillRef>
+          <a:effectRef idx="2">
+            <a:schemeClr val="accent2"/>
+          </a:effectRef>
+          <a:fontRef idx="minor">
+            <a:schemeClr val="tx1"/>
+          </a:fontRef>
+        </p:style>
+      </p:cxnSp>
+      <p:cxnSp>
+        <p:nvCxnSpPr>
+          <p:cNvPr id="19" name="Straight Connector 18">
+            <a:extLst>
+              <a:ext uri="{FF2B5EF4-FFF2-40B4-BE49-F238E27FC236}">
+                <a16:creationId xmlns:a16="http://schemas.microsoft.com/office/drawing/2014/main" id="{5DDB1D7B-AD02-DC41-B35D-502B35DE1908}"/>
+              </a:ext>
+            </a:extLst>
+          </p:cNvPr>
+          <p:cNvCxnSpPr/>
+          <p:nvPr/>
+        </p:nvCxnSpPr>
+        <p:spPr>
+          <a:xfrm>
+            <a:off x="6749143" y="4158343"/>
+            <a:ext cx="315686" cy="0"/>
+          </a:xfrm>
+          <a:prstGeom prst="line">
+            <a:avLst/>
+          </a:prstGeom>
+        </p:spPr>
+        <p:style>
+          <a:lnRef idx="3">
+            <a:schemeClr val="accent2"/>
+          </a:lnRef>
+          <a:fillRef idx="0">
+            <a:schemeClr val="accent2"/>
+          </a:fillRef>
+          <a:effectRef idx="2">
+            <a:schemeClr val="accent2"/>
+          </a:effectRef>
+          <a:fontRef idx="minor">
+            <a:schemeClr val="tx1"/>
+          </a:fontRef>
+        </p:style>
+      </p:cxnSp>
+      <p:cxnSp>
+        <p:nvCxnSpPr>
+          <p:cNvPr id="20" name="Straight Connector 19">
+            <a:extLst>
+              <a:ext uri="{FF2B5EF4-FFF2-40B4-BE49-F238E27FC236}">
+                <a16:creationId xmlns:a16="http://schemas.microsoft.com/office/drawing/2014/main" id="{37C3AF4F-5532-4941-8CD2-8ABE6ECAD288}"/>
+              </a:ext>
+            </a:extLst>
+          </p:cNvPr>
+          <p:cNvCxnSpPr/>
+          <p:nvPr/>
+        </p:nvCxnSpPr>
+        <p:spPr>
+          <a:xfrm>
+            <a:off x="5932714" y="5334000"/>
+            <a:ext cx="315686" cy="0"/>
+          </a:xfrm>
+          <a:prstGeom prst="line">
+            <a:avLst/>
+          </a:prstGeom>
+        </p:spPr>
+        <p:style>
+          <a:lnRef idx="3">
+            <a:schemeClr val="accent2"/>
+          </a:lnRef>
+          <a:fillRef idx="0">
+            <a:schemeClr val="accent2"/>
+          </a:fillRef>
+          <a:effectRef idx="2">
+            <a:schemeClr val="accent2"/>
+          </a:effectRef>
+          <a:fontRef idx="minor">
+            <a:schemeClr val="tx1"/>
+          </a:fontRef>
+        </p:style>
+      </p:cxnSp>
+      <p:cxnSp>
+        <p:nvCxnSpPr>
+          <p:cNvPr id="21" name="Straight Connector 20">
+            <a:extLst>
+              <a:ext uri="{FF2B5EF4-FFF2-40B4-BE49-F238E27FC236}">
+                <a16:creationId xmlns:a16="http://schemas.microsoft.com/office/drawing/2014/main" id="{4F314BAC-C40F-D549-9920-62D06FD397D8}"/>
+              </a:ext>
+            </a:extLst>
+          </p:cNvPr>
+          <p:cNvCxnSpPr/>
+          <p:nvPr/>
+        </p:nvCxnSpPr>
+        <p:spPr>
+          <a:xfrm>
+            <a:off x="6346371" y="5334000"/>
+            <a:ext cx="315686" cy="0"/>
+          </a:xfrm>
+          <a:prstGeom prst="line">
+            <a:avLst/>
+          </a:prstGeom>
+        </p:spPr>
+        <p:style>
+          <a:lnRef idx="3">
+            <a:schemeClr val="accent2"/>
+          </a:lnRef>
+          <a:fillRef idx="0">
+            <a:schemeClr val="accent2"/>
+          </a:fillRef>
+          <a:effectRef idx="2">
+            <a:schemeClr val="accent2"/>
+          </a:effectRef>
+          <a:fontRef idx="minor">
+            <a:schemeClr val="tx1"/>
+          </a:fontRef>
+        </p:style>
+      </p:cxnSp>
+      <p:cxnSp>
+        <p:nvCxnSpPr>
+          <p:cNvPr id="22" name="Straight Connector 21">
+            <a:extLst>
+              <a:ext uri="{FF2B5EF4-FFF2-40B4-BE49-F238E27FC236}">
+                <a16:creationId xmlns:a16="http://schemas.microsoft.com/office/drawing/2014/main" id="{74B7541C-A92E-FE4C-82B7-DD192FD93BCC}"/>
+              </a:ext>
+            </a:extLst>
+          </p:cNvPr>
+          <p:cNvCxnSpPr/>
+          <p:nvPr/>
+        </p:nvCxnSpPr>
+        <p:spPr>
+          <a:xfrm>
+            <a:off x="6749143" y="5334000"/>
+            <a:ext cx="315686" cy="0"/>
+          </a:xfrm>
+          <a:prstGeom prst="line">
+            <a:avLst/>
+          </a:prstGeom>
+        </p:spPr>
+        <p:style>
+          <a:lnRef idx="3">
+            <a:schemeClr val="accent2"/>
+          </a:lnRef>
+          <a:fillRef idx="0">
+            <a:schemeClr val="accent2"/>
+          </a:fillRef>
+          <a:effectRef idx="2">
+            <a:schemeClr val="accent2"/>
+          </a:effectRef>
+          <a:fontRef idx="minor">
+            <a:schemeClr val="tx1"/>
+          </a:fontRef>
+        </p:style>
+      </p:cxnSp>
+      <p:sp>
+        <p:nvSpPr>
+          <p:cNvPr id="23" name="TextBox 22">
+            <a:extLst>
+              <a:ext uri="{FF2B5EF4-FFF2-40B4-BE49-F238E27FC236}">
+                <a16:creationId xmlns:a16="http://schemas.microsoft.com/office/drawing/2014/main" id="{7866906B-3EE5-324F-ABC3-A49F545091C7}"/>
+              </a:ext>
+            </a:extLst>
+          </p:cNvPr>
+          <p:cNvSpPr txBox="1"/>
+          <p:nvPr/>
+        </p:nvSpPr>
+        <p:spPr>
+          <a:xfrm>
+            <a:off x="7179293" y="3965923"/>
+            <a:ext cx="1529269" cy="369332"/>
+          </a:xfrm>
+          <a:prstGeom prst="rect">
+            <a:avLst/>
+          </a:prstGeom>
+          <a:solidFill>
+            <a:schemeClr val="accent4"/>
+          </a:solidFill>
+        </p:spPr>
+        <p:txBody>
+          <a:bodyPr wrap="square" rtlCol="0">
+            <a:spAutoFit/>
+          </a:bodyPr>
+          <a:lstStyle/>
+          <a:p>
+            <a:pPr algn="ctr"/>
+            <a:r>
+              <a:rPr lang="en-CR" dirty="0"/>
+              <a:t>Capa</a:t>
+            </a:r>
+            <a:r>
+              <a:rPr lang="en-CR" baseline="-25000" dirty="0"/>
+              <a:t>1</a:t>
+            </a:r>
+            <a:r>
+              <a:rPr lang="en-CR" dirty="0"/>
+              <a:t> (a MB)</a:t>
+            </a:r>
+            <a:endParaRPr lang="en-CR" baseline="-25000" dirty="0"/>
+          </a:p>
+        </p:txBody>
+      </p:sp>
+      <p:sp>
+        <p:nvSpPr>
+          <p:cNvPr id="25" name="TextBox 24">
+            <a:extLst>
+              <a:ext uri="{FF2B5EF4-FFF2-40B4-BE49-F238E27FC236}">
+                <a16:creationId xmlns:a16="http://schemas.microsoft.com/office/drawing/2014/main" id="{60C0838C-D60C-AA44-95A0-F2E54886AAAE}"/>
+              </a:ext>
+            </a:extLst>
+          </p:cNvPr>
+          <p:cNvSpPr txBox="1"/>
+          <p:nvPr/>
+        </p:nvSpPr>
+        <p:spPr>
+          <a:xfrm>
+            <a:off x="7179293" y="5149334"/>
+            <a:ext cx="1529269" cy="369332"/>
+          </a:xfrm>
+          <a:prstGeom prst="rect">
+            <a:avLst/>
+          </a:prstGeom>
+          <a:solidFill>
+            <a:schemeClr val="accent4"/>
+          </a:solidFill>
+        </p:spPr>
+        <p:txBody>
+          <a:bodyPr wrap="square" rtlCol="0">
+            <a:spAutoFit/>
+          </a:bodyPr>
+          <a:lstStyle/>
+          <a:p>
+            <a:pPr algn="ctr"/>
+            <a:r>
+              <a:rPr lang="en-CR" dirty="0"/>
+              <a:t>Capa</a:t>
+            </a:r>
+            <a:r>
+              <a:rPr lang="en-CR" baseline="-25000" dirty="0"/>
+              <a:t>n</a:t>
+            </a:r>
+            <a:r>
+              <a:rPr lang="en-CR" dirty="0"/>
+              <a:t> (b MB)</a:t>
+            </a:r>
+            <a:endParaRPr lang="en-CR" baseline="-25000" dirty="0"/>
+          </a:p>
+        </p:txBody>
+      </p:sp>
+    </p:spTree>
+    <p:extLst>
+      <p:ext uri="{BB962C8B-B14F-4D97-AF65-F5344CB8AC3E}">
+        <p14:creationId xmlns:p14="http://schemas.microsoft.com/office/powerpoint/2010/main" val="140335876"/>
+      </p:ext>
+    </p:extLst>
+  </p:cSld>
+  <p:clrMapOvr>
+    <a:masterClrMapping/>
+  </p:clrMapOvr>
+</p:sld>
+</file>
+
+<file path=ppt/slides/slide27.xml><?xml version="1.0" encoding="utf-8"?>
+<p:sld xmlns:a="http://schemas.openxmlformats.org/drawingml/2006/main" xmlns:r="http://schemas.openxmlformats.org/officeDocument/2006/relationships" xmlns:p="http://schemas.openxmlformats.org/presentationml/2006/main">
+  <p:cSld>
+    <p:spTree>
+      <p:nvGrpSpPr>
+        <p:cNvPr id="1" name=""/>
+        <p:cNvGrpSpPr/>
+        <p:nvPr/>
+      </p:nvGrpSpPr>
+      <p:grpSpPr>
+        <a:xfrm>
+          <a:off x="0" y="0"/>
+          <a:ext cx="0" cy="0"/>
+          <a:chOff x="0" y="0"/>
+          <a:chExt cx="0" cy="0"/>
+        </a:xfrm>
+      </p:grpSpPr>
+      <p:sp>
+        <p:nvSpPr>
+          <p:cNvPr id="2" name="Title 1">
+            <a:extLst>
+              <a:ext uri="{FF2B5EF4-FFF2-40B4-BE49-F238E27FC236}">
+                <a16:creationId xmlns:a16="http://schemas.microsoft.com/office/drawing/2014/main" id="{5FCAE98A-1FA7-F640-BC7F-9C11658500D7}"/>
+              </a:ext>
+            </a:extLst>
+          </p:cNvPr>
+          <p:cNvSpPr>
+            <a:spLocks noGrp="1"/>
+          </p:cNvSpPr>
+          <p:nvPr>
+            <p:ph type="title"/>
+          </p:nvPr>
+        </p:nvSpPr>
+        <p:spPr/>
+        <p:txBody>
+          <a:bodyPr/>
+          <a:lstStyle/>
+          <a:p>
+            <a:r>
+              <a:rPr lang="en-US" dirty="0" err="1"/>
+              <a:t>Dockerfile</a:t>
+            </a:r>
+            <a:r>
+              <a:rPr lang="en-US" dirty="0"/>
+              <a:t>: </a:t>
+            </a:r>
+            <a:r>
+              <a:rPr lang="en-US" dirty="0" err="1"/>
+              <a:t>Ejemplo</a:t>
+            </a:r>
+            <a:endParaRPr lang="en-CR" dirty="0"/>
+          </a:p>
+        </p:txBody>
+      </p:sp>
+      <p:sp>
+        <p:nvSpPr>
+          <p:cNvPr id="3" name="Slide Number Placeholder 2">
+            <a:extLst>
+              <a:ext uri="{FF2B5EF4-FFF2-40B4-BE49-F238E27FC236}">
+                <a16:creationId xmlns:a16="http://schemas.microsoft.com/office/drawing/2014/main" id="{1DECACD6-7120-4E4A-BB11-C58BCD3D0F9A}"/>
+              </a:ext>
+            </a:extLst>
+          </p:cNvPr>
+          <p:cNvSpPr>
+            <a:spLocks noGrp="1"/>
+          </p:cNvSpPr>
+          <p:nvPr>
+            <p:ph type="sldNum" sz="quarter" idx="12"/>
+          </p:nvPr>
+        </p:nvSpPr>
+        <p:spPr/>
+        <p:txBody>
+          <a:bodyPr/>
+          <a:lstStyle/>
+          <a:p>
+            <a:fld id="{4FAB73BC-B049-4115-A692-8D63A059BFB8}" type="slidenum">
+              <a:rPr lang="en-US" smtClean="0"/>
+              <a:pPr/>
+              <a:t>27</a:t>
+            </a:fld>
+            <a:endParaRPr lang="en-US" dirty="0"/>
+          </a:p>
+        </p:txBody>
+      </p:sp>
+      <p:sp>
+        <p:nvSpPr>
+          <p:cNvPr id="4" name="TextBox 3">
+            <a:extLst>
+              <a:ext uri="{FF2B5EF4-FFF2-40B4-BE49-F238E27FC236}">
+                <a16:creationId xmlns:a16="http://schemas.microsoft.com/office/drawing/2014/main" id="{DAD0A73E-BB2B-4D41-8529-C5C2D3838AE0}"/>
+              </a:ext>
+            </a:extLst>
+          </p:cNvPr>
+          <p:cNvSpPr txBox="1"/>
+          <p:nvPr/>
+        </p:nvSpPr>
+        <p:spPr>
+          <a:xfrm>
+            <a:off x="3520633" y="2805686"/>
+            <a:ext cx="5150733" cy="2585323"/>
+          </a:xfrm>
+          <a:prstGeom prst="rect">
+            <a:avLst/>
+          </a:prstGeom>
+          <a:noFill/>
+        </p:spPr>
+        <p:txBody>
+          <a:bodyPr wrap="square" rtlCol="0">
+            <a:spAutoFit/>
+          </a:bodyPr>
+          <a:lstStyle/>
+          <a:p>
+            <a:r>
+              <a:rPr lang="en-US" dirty="0">
+                <a:solidFill>
+                  <a:schemeClr val="accent1"/>
+                </a:solidFill>
+              </a:rPr>
+              <a:t>FROM</a:t>
+            </a:r>
+            <a:r>
+              <a:rPr lang="en-US" dirty="0"/>
+              <a:t> </a:t>
+            </a:r>
+            <a:r>
+              <a:rPr lang="en-US" dirty="0">
+                <a:solidFill>
+                  <a:schemeClr val="tx2"/>
+                </a:solidFill>
+              </a:rPr>
+              <a:t>ubuntu</a:t>
+            </a:r>
+            <a:r>
+              <a:rPr lang="en-US" dirty="0"/>
+              <a:t> </a:t>
+            </a:r>
+          </a:p>
+          <a:p>
+            <a:endParaRPr lang="en-US" dirty="0"/>
+          </a:p>
+          <a:p>
+            <a:r>
+              <a:rPr lang="en-US" dirty="0">
+                <a:solidFill>
+                  <a:schemeClr val="accent1"/>
+                </a:solidFill>
+              </a:rPr>
+              <a:t>MAINTAINER</a:t>
+            </a:r>
+            <a:r>
+              <a:rPr lang="en-US" dirty="0"/>
+              <a:t> ARSTECH </a:t>
+            </a:r>
+            <a:r>
+              <a:rPr lang="en-US" dirty="0" err="1"/>
+              <a:t>arstech@e-mail</a:t>
+            </a:r>
+            <a:r>
+              <a:rPr lang="en-US" dirty="0"/>
+              <a:t> </a:t>
+            </a:r>
+          </a:p>
+          <a:p>
+            <a:endParaRPr lang="en-US" dirty="0"/>
+          </a:p>
+          <a:p>
+            <a:r>
+              <a:rPr lang="en-US" dirty="0">
+                <a:solidFill>
+                  <a:schemeClr val="accent1"/>
+                </a:solidFill>
+              </a:rPr>
+              <a:t>RUN</a:t>
+            </a:r>
+            <a:r>
+              <a:rPr lang="en-US" dirty="0"/>
+              <a:t> </a:t>
+            </a:r>
+            <a:r>
+              <a:rPr lang="en-US" dirty="0">
+                <a:solidFill>
+                  <a:schemeClr val="tx2"/>
+                </a:solidFill>
+              </a:rPr>
+              <a:t>apt-get update &amp;&amp; apt-get upgrade –y</a:t>
+            </a:r>
+          </a:p>
+          <a:p>
+            <a:r>
+              <a:rPr lang="en-US" dirty="0"/>
+              <a:t> </a:t>
+            </a:r>
+          </a:p>
+          <a:p>
+            <a:r>
+              <a:rPr lang="en-US" dirty="0">
+                <a:solidFill>
+                  <a:schemeClr val="accent1"/>
+                </a:solidFill>
+              </a:rPr>
+              <a:t>RUN</a:t>
+            </a:r>
+            <a:r>
+              <a:rPr lang="en-US" dirty="0"/>
+              <a:t> </a:t>
+            </a:r>
+            <a:r>
+              <a:rPr lang="en-US" dirty="0">
+                <a:solidFill>
+                  <a:schemeClr val="tx2"/>
+                </a:solidFill>
+              </a:rPr>
+              <a:t>apt-get install -y apt-utils </a:t>
+            </a:r>
+            <a:r>
+              <a:rPr lang="en-US" dirty="0" err="1">
+                <a:solidFill>
+                  <a:schemeClr val="tx2"/>
+                </a:solidFill>
+              </a:rPr>
+              <a:t>htop</a:t>
+            </a:r>
+            <a:endParaRPr lang="en-US" dirty="0">
+              <a:solidFill>
+                <a:schemeClr val="tx2"/>
+              </a:solidFill>
+            </a:endParaRPr>
+          </a:p>
+          <a:p>
+            <a:r>
+              <a:rPr lang="en-US" dirty="0"/>
+              <a:t> </a:t>
+            </a:r>
+          </a:p>
+          <a:p>
+            <a:r>
+              <a:rPr lang="en-US" dirty="0">
+                <a:solidFill>
+                  <a:schemeClr val="accent1"/>
+                </a:solidFill>
+              </a:rPr>
+              <a:t>CMD</a:t>
+            </a:r>
+            <a:r>
+              <a:rPr lang="en-US" dirty="0"/>
+              <a:t> </a:t>
+            </a:r>
+            <a:r>
+              <a:rPr lang="en-US" dirty="0">
+                <a:solidFill>
+                  <a:schemeClr val="tx2"/>
+                </a:solidFill>
+              </a:rPr>
+              <a:t>["</a:t>
+            </a:r>
+            <a:r>
+              <a:rPr lang="en-US" dirty="0" err="1">
+                <a:solidFill>
+                  <a:schemeClr val="tx2"/>
+                </a:solidFill>
+              </a:rPr>
+              <a:t>echo","It's</a:t>
+            </a:r>
+            <a:r>
+              <a:rPr lang="en-US" dirty="0">
+                <a:solidFill>
+                  <a:schemeClr val="tx2"/>
+                </a:solidFill>
+              </a:rPr>
+              <a:t> my Docker Image "]</a:t>
+            </a:r>
+            <a:endParaRPr lang="en-CR" dirty="0">
+              <a:solidFill>
+                <a:schemeClr val="tx2"/>
+              </a:solidFill>
+            </a:endParaRPr>
+          </a:p>
+        </p:txBody>
+      </p:sp>
+    </p:spTree>
+    <p:extLst>
+      <p:ext uri="{BB962C8B-B14F-4D97-AF65-F5344CB8AC3E}">
+        <p14:creationId xmlns:p14="http://schemas.microsoft.com/office/powerpoint/2010/main" val="3556475362"/>
+      </p:ext>
+    </p:extLst>
+  </p:cSld>
+  <p:clrMapOvr>
+    <a:masterClrMapping/>
+  </p:clrMapOvr>
+</p:sld>
+</file>
+
+<file path=ppt/slides/slide28.xml><?xml version="1.0" encoding="utf-8"?>
+<p:sld xmlns:a="http://schemas.openxmlformats.org/drawingml/2006/main" xmlns:r="http://schemas.openxmlformats.org/officeDocument/2006/relationships" xmlns:p="http://schemas.openxmlformats.org/presentationml/2006/main">
+  <p:cSld>
+    <p:spTree>
+      <p:nvGrpSpPr>
+        <p:cNvPr id="1" name=""/>
+        <p:cNvGrpSpPr/>
+        <p:nvPr/>
+      </p:nvGrpSpPr>
+      <p:grpSpPr>
+        <a:xfrm>
+          <a:off x="0" y="0"/>
+          <a:ext cx="0" cy="0"/>
+          <a:chOff x="0" y="0"/>
+          <a:chExt cx="0" cy="0"/>
+        </a:xfrm>
+      </p:grpSpPr>
+      <p:sp>
+        <p:nvSpPr>
+          <p:cNvPr id="2" name="Title 1">
+            <a:extLst>
+              <a:ext uri="{FF2B5EF4-FFF2-40B4-BE49-F238E27FC236}">
+                <a16:creationId xmlns:a16="http://schemas.microsoft.com/office/drawing/2014/main" id="{5FCAE98A-1FA7-F640-BC7F-9C11658500D7}"/>
+              </a:ext>
+            </a:extLst>
+          </p:cNvPr>
+          <p:cNvSpPr>
+            <a:spLocks noGrp="1"/>
+          </p:cNvSpPr>
+          <p:nvPr>
+            <p:ph type="title"/>
+          </p:nvPr>
+        </p:nvSpPr>
+        <p:spPr/>
+        <p:txBody>
+          <a:bodyPr/>
+          <a:lstStyle/>
+          <a:p>
+            <a:r>
+              <a:rPr lang="en-US" dirty="0" err="1"/>
+              <a:t>Dockerfile</a:t>
+            </a:r>
+            <a:r>
+              <a:rPr lang="en-US" dirty="0"/>
+              <a:t>: ENTRYPOINT VS CMD</a:t>
+            </a:r>
+            <a:endParaRPr lang="en-CR" dirty="0"/>
+          </a:p>
+        </p:txBody>
+      </p:sp>
+      <p:sp>
+        <p:nvSpPr>
+          <p:cNvPr id="3" name="Slide Number Placeholder 2">
+            <a:extLst>
+              <a:ext uri="{FF2B5EF4-FFF2-40B4-BE49-F238E27FC236}">
+                <a16:creationId xmlns:a16="http://schemas.microsoft.com/office/drawing/2014/main" id="{1DECACD6-7120-4E4A-BB11-C58BCD3D0F9A}"/>
+              </a:ext>
+            </a:extLst>
+          </p:cNvPr>
+          <p:cNvSpPr>
+            <a:spLocks noGrp="1"/>
+          </p:cNvSpPr>
+          <p:nvPr>
+            <p:ph type="sldNum" sz="quarter" idx="12"/>
+          </p:nvPr>
+        </p:nvSpPr>
+        <p:spPr/>
+        <p:txBody>
+          <a:bodyPr/>
+          <a:lstStyle/>
+          <a:p>
+            <a:fld id="{4FAB73BC-B049-4115-A692-8D63A059BFB8}" type="slidenum">
+              <a:rPr lang="en-US" smtClean="0"/>
+              <a:pPr/>
+              <a:t>28</a:t>
+            </a:fld>
+            <a:endParaRPr lang="en-US" dirty="0"/>
+          </a:p>
+        </p:txBody>
+      </p:sp>
+      <p:sp>
+        <p:nvSpPr>
+          <p:cNvPr id="4" name="TextBox 3">
+            <a:extLst>
+              <a:ext uri="{FF2B5EF4-FFF2-40B4-BE49-F238E27FC236}">
+                <a16:creationId xmlns:a16="http://schemas.microsoft.com/office/drawing/2014/main" id="{DAD0A73E-BB2B-4D41-8529-C5C2D3838AE0}"/>
+              </a:ext>
+            </a:extLst>
+          </p:cNvPr>
+          <p:cNvSpPr txBox="1"/>
+          <p:nvPr/>
+        </p:nvSpPr>
+        <p:spPr>
+          <a:xfrm>
+            <a:off x="835308" y="2840410"/>
+            <a:ext cx="3505198" cy="2308324"/>
+          </a:xfrm>
+          <a:prstGeom prst="rect">
+            <a:avLst/>
+          </a:prstGeom>
+          <a:noFill/>
+        </p:spPr>
+        <p:txBody>
+          <a:bodyPr wrap="square" rtlCol="0">
+            <a:spAutoFit/>
+          </a:bodyPr>
+          <a:lstStyle/>
+          <a:p>
+            <a:r>
+              <a:rPr lang="en-US" dirty="0">
+                <a:solidFill>
+                  <a:schemeClr val="accent1"/>
+                </a:solidFill>
+              </a:rPr>
+              <a:t>ENTRYPOINT: </a:t>
+            </a:r>
+            <a:r>
+              <a:rPr lang="en-US" dirty="0" err="1">
+                <a:solidFill>
+                  <a:schemeClr val="tx2"/>
+                </a:solidFill>
+              </a:rPr>
+              <a:t>Ejecutable</a:t>
+            </a:r>
+            <a:r>
+              <a:rPr lang="en-US" dirty="0">
+                <a:solidFill>
+                  <a:schemeClr val="tx2"/>
+                </a:solidFill>
+              </a:rPr>
+              <a:t> </a:t>
+            </a:r>
+            <a:r>
+              <a:rPr lang="en-US" dirty="0" err="1">
+                <a:solidFill>
+                  <a:schemeClr val="tx2"/>
+                </a:solidFill>
+              </a:rPr>
+              <a:t>por</a:t>
+            </a:r>
+            <a:r>
+              <a:rPr lang="en-US" dirty="0">
+                <a:solidFill>
+                  <a:schemeClr val="tx2"/>
+                </a:solidFill>
+              </a:rPr>
+              <a:t> </a:t>
+            </a:r>
+            <a:r>
+              <a:rPr lang="en-US" dirty="0" err="1">
+                <a:solidFill>
+                  <a:schemeClr val="tx2"/>
+                </a:solidFill>
+              </a:rPr>
+              <a:t>defecto</a:t>
+            </a:r>
+            <a:r>
+              <a:rPr lang="en-US" dirty="0">
+                <a:solidFill>
+                  <a:schemeClr val="tx2"/>
+                </a:solidFill>
+              </a:rPr>
+              <a:t> a corer </a:t>
+            </a:r>
+            <a:r>
+              <a:rPr lang="en-US" dirty="0" err="1">
+                <a:solidFill>
+                  <a:schemeClr val="tx2"/>
+                </a:solidFill>
+              </a:rPr>
+              <a:t>cuando</a:t>
+            </a:r>
+            <a:r>
+              <a:rPr lang="en-US" dirty="0">
+                <a:solidFill>
+                  <a:schemeClr val="tx2"/>
+                </a:solidFill>
+              </a:rPr>
+              <a:t> la imagen </a:t>
+            </a:r>
+            <a:r>
+              <a:rPr lang="en-US" dirty="0" err="1">
+                <a:solidFill>
+                  <a:schemeClr val="tx2"/>
+                </a:solidFill>
+              </a:rPr>
+              <a:t>inicia</a:t>
+            </a:r>
+            <a:r>
+              <a:rPr lang="en-US" dirty="0">
+                <a:solidFill>
+                  <a:schemeClr val="tx2"/>
+                </a:solidFill>
+              </a:rPr>
+              <a:t>. </a:t>
+            </a:r>
+            <a:r>
+              <a:rPr lang="en-US" i="1" dirty="0">
+                <a:solidFill>
+                  <a:schemeClr val="tx2"/>
+                </a:solidFill>
+              </a:rPr>
+              <a:t>bin/bash –c </a:t>
+            </a:r>
+            <a:r>
+              <a:rPr lang="en-US" i="1" dirty="0" err="1">
+                <a:solidFill>
+                  <a:schemeClr val="tx2"/>
+                </a:solidFill>
+              </a:rPr>
+              <a:t>por</a:t>
+            </a:r>
+            <a:r>
+              <a:rPr lang="en-US" i="1" dirty="0">
+                <a:solidFill>
+                  <a:schemeClr val="tx2"/>
+                </a:solidFill>
+              </a:rPr>
+              <a:t> </a:t>
+            </a:r>
+            <a:r>
+              <a:rPr lang="en-US" i="1" dirty="0" err="1">
+                <a:solidFill>
+                  <a:schemeClr val="tx2"/>
+                </a:solidFill>
+              </a:rPr>
+              <a:t>defecto</a:t>
+            </a:r>
+            <a:r>
+              <a:rPr lang="en-US" dirty="0">
+                <a:solidFill>
+                  <a:schemeClr val="tx2"/>
+                </a:solidFill>
+              </a:rPr>
+              <a:t>.</a:t>
+            </a:r>
+          </a:p>
+          <a:p>
+            <a:endParaRPr lang="en-US" dirty="0">
+              <a:solidFill>
+                <a:schemeClr val="tx2"/>
+              </a:solidFill>
+            </a:endParaRPr>
+          </a:p>
+          <a:p>
+            <a:r>
+              <a:rPr lang="en-US" dirty="0">
+                <a:solidFill>
+                  <a:schemeClr val="accent1"/>
+                </a:solidFill>
+              </a:rPr>
+              <a:t>CMD</a:t>
+            </a:r>
+            <a:r>
+              <a:rPr lang="en-US" dirty="0">
+                <a:solidFill>
+                  <a:schemeClr val="tx2"/>
+                </a:solidFill>
+              </a:rPr>
+              <a:t>: </a:t>
+            </a:r>
+            <a:r>
+              <a:rPr lang="en-US" dirty="0" err="1">
+                <a:solidFill>
+                  <a:schemeClr val="tx2"/>
+                </a:solidFill>
+              </a:rPr>
+              <a:t>Comando</a:t>
+            </a:r>
+            <a:r>
+              <a:rPr lang="en-US" dirty="0">
+                <a:solidFill>
+                  <a:schemeClr val="tx2"/>
+                </a:solidFill>
+              </a:rPr>
+              <a:t> </a:t>
+            </a:r>
+            <a:r>
+              <a:rPr lang="en-US" dirty="0" err="1">
+                <a:solidFill>
+                  <a:schemeClr val="tx2"/>
+                </a:solidFill>
+              </a:rPr>
+              <a:t>por</a:t>
+            </a:r>
+            <a:r>
+              <a:rPr lang="en-US" dirty="0">
+                <a:solidFill>
+                  <a:schemeClr val="tx2"/>
+                </a:solidFill>
+              </a:rPr>
+              <a:t> </a:t>
+            </a:r>
+            <a:r>
+              <a:rPr lang="en-US" dirty="0" err="1">
+                <a:solidFill>
+                  <a:schemeClr val="tx2"/>
+                </a:solidFill>
+              </a:rPr>
+              <a:t>defecto</a:t>
+            </a:r>
+            <a:r>
+              <a:rPr lang="en-US" dirty="0">
+                <a:solidFill>
+                  <a:schemeClr val="tx2"/>
+                </a:solidFill>
+              </a:rPr>
+              <a:t> a </a:t>
+            </a:r>
+            <a:r>
+              <a:rPr lang="en-US" dirty="0" err="1">
+                <a:solidFill>
+                  <a:schemeClr val="tx2"/>
+                </a:solidFill>
+              </a:rPr>
+              <a:t>ejecutar</a:t>
+            </a:r>
+            <a:endParaRPr lang="en-US" dirty="0">
+              <a:solidFill>
+                <a:schemeClr val="accent1"/>
+              </a:solidFill>
+            </a:endParaRPr>
+          </a:p>
+          <a:p>
+            <a:endParaRPr lang="en-US" dirty="0">
+              <a:solidFill>
+                <a:schemeClr val="accent1"/>
+              </a:solidFill>
+            </a:endParaRPr>
+          </a:p>
+          <a:p>
+            <a:endParaRPr lang="en-CR" dirty="0">
+              <a:solidFill>
+                <a:schemeClr val="tx2"/>
+              </a:solidFill>
+            </a:endParaRPr>
+          </a:p>
+        </p:txBody>
+      </p:sp>
+      <p:sp>
+        <p:nvSpPr>
+          <p:cNvPr id="5" name="TextBox 4">
+            <a:extLst>
+              <a:ext uri="{FF2B5EF4-FFF2-40B4-BE49-F238E27FC236}">
+                <a16:creationId xmlns:a16="http://schemas.microsoft.com/office/drawing/2014/main" id="{5F5B7933-9D9E-7903-EF1C-3B03CF8FABFD}"/>
+              </a:ext>
+            </a:extLst>
+          </p:cNvPr>
+          <p:cNvSpPr txBox="1"/>
+          <p:nvPr/>
+        </p:nvSpPr>
+        <p:spPr>
+          <a:xfrm>
+            <a:off x="5868301" y="3374020"/>
+            <a:ext cx="4313630" cy="1477328"/>
+          </a:xfrm>
+          <a:prstGeom prst="rect">
+            <a:avLst/>
+          </a:prstGeom>
+          <a:noFill/>
+        </p:spPr>
+        <p:txBody>
+          <a:bodyPr wrap="square" rtlCol="0">
+            <a:spAutoFit/>
+          </a:bodyPr>
+          <a:lstStyle/>
+          <a:p>
+            <a:r>
+              <a:rPr lang="en-US" dirty="0">
+                <a:solidFill>
+                  <a:schemeClr val="accent1"/>
+                </a:solidFill>
+              </a:rPr>
+              <a:t>FROM</a:t>
+            </a:r>
+            <a:r>
+              <a:rPr lang="en-US" dirty="0"/>
+              <a:t> </a:t>
+            </a:r>
+            <a:r>
+              <a:rPr lang="en-US" dirty="0" err="1"/>
+              <a:t>debian:wheezy</a:t>
+            </a:r>
+            <a:r>
+              <a:rPr lang="en-US" dirty="0"/>
+              <a:t> </a:t>
+            </a:r>
+          </a:p>
+          <a:p>
+            <a:r>
+              <a:rPr lang="en-US" dirty="0">
+                <a:solidFill>
+                  <a:schemeClr val="accent1"/>
+                </a:solidFill>
+              </a:rPr>
+              <a:t>ENTRYPOINT</a:t>
+            </a:r>
+            <a:r>
+              <a:rPr lang="en-US" dirty="0"/>
+              <a:t> ["/bin/ping"] </a:t>
+            </a:r>
+          </a:p>
+          <a:p>
+            <a:r>
+              <a:rPr lang="en-US" dirty="0">
+                <a:solidFill>
+                  <a:schemeClr val="accent1"/>
+                </a:solidFill>
+              </a:rPr>
+              <a:t>CMD</a:t>
+            </a:r>
+            <a:r>
+              <a:rPr lang="en-US" dirty="0"/>
+              <a:t> ["localhost"]</a:t>
+            </a:r>
+          </a:p>
+          <a:p>
+            <a:endParaRPr lang="en-US" dirty="0">
+              <a:solidFill>
+                <a:schemeClr val="tx2"/>
+              </a:solidFill>
+            </a:endParaRPr>
+          </a:p>
+          <a:p>
+            <a:r>
+              <a:rPr lang="en-US" i="1" dirty="0">
+                <a:solidFill>
+                  <a:schemeClr val="tx2"/>
+                </a:solidFill>
+              </a:rPr>
+              <a:t>#docker run -it &lt;image&gt;</a:t>
+            </a:r>
+          </a:p>
+        </p:txBody>
+      </p:sp>
+      <p:sp>
+        <p:nvSpPr>
+          <p:cNvPr id="6" name="TextBox 5">
+            <a:extLst>
+              <a:ext uri="{FF2B5EF4-FFF2-40B4-BE49-F238E27FC236}">
+                <a16:creationId xmlns:a16="http://schemas.microsoft.com/office/drawing/2014/main" id="{9235754A-6ED6-EFA3-9268-7F9012C563C3}"/>
+              </a:ext>
+            </a:extLst>
+          </p:cNvPr>
+          <p:cNvSpPr txBox="1"/>
+          <p:nvPr/>
+        </p:nvSpPr>
+        <p:spPr>
+          <a:xfrm>
+            <a:off x="835308" y="6217920"/>
+            <a:ext cx="4867294" cy="369332"/>
+          </a:xfrm>
+          <a:prstGeom prst="rect">
+            <a:avLst/>
+          </a:prstGeom>
+          <a:noFill/>
+        </p:spPr>
+        <p:txBody>
+          <a:bodyPr wrap="none" rtlCol="0">
+            <a:spAutoFit/>
+          </a:bodyPr>
+          <a:lstStyle/>
+          <a:p>
+            <a:r>
+              <a:rPr lang="en-US" dirty="0">
+                <a:solidFill>
+                  <a:srgbClr val="0070C0"/>
+                </a:solidFill>
+                <a:hlinkClick r:id="rId2"/>
+              </a:rPr>
+              <a:t>https://docs.docker.com/engine/reference/builder/</a:t>
+            </a:r>
+            <a:r>
+              <a:rPr lang="en-US" dirty="0">
+                <a:solidFill>
+                  <a:srgbClr val="0070C0"/>
+                </a:solidFill>
+              </a:rPr>
+              <a:t> </a:t>
+            </a:r>
+            <a:endParaRPr lang="en-CR" dirty="0">
+              <a:solidFill>
+                <a:srgbClr val="0070C0"/>
+              </a:solidFill>
+            </a:endParaRPr>
+          </a:p>
+        </p:txBody>
+      </p:sp>
+    </p:spTree>
+    <p:extLst>
+      <p:ext uri="{BB962C8B-B14F-4D97-AF65-F5344CB8AC3E}">
+        <p14:creationId xmlns:p14="http://schemas.microsoft.com/office/powerpoint/2010/main" val="3176269918"/>
+      </p:ext>
+    </p:extLst>
+  </p:cSld>
+  <p:clrMapOvr>
+    <a:masterClrMapping/>
+  </p:clrMapOvr>
+</p:sld>
+</file>
+
+<file path=ppt/slides/slide29.xml><?xml version="1.0" encoding="utf-8"?>
+<p:sld xmlns:a="http://schemas.openxmlformats.org/drawingml/2006/main" xmlns:r="http://schemas.openxmlformats.org/officeDocument/2006/relationships" xmlns:p="http://schemas.openxmlformats.org/presentationml/2006/main">
+  <p:cSld>
+    <p:spTree>
+      <p:nvGrpSpPr>
+        <p:cNvPr id="1" name=""/>
+        <p:cNvGrpSpPr/>
+        <p:nvPr/>
+      </p:nvGrpSpPr>
+      <p:grpSpPr>
+        <a:xfrm>
+          <a:off x="0" y="0"/>
+          <a:ext cx="0" cy="0"/>
+          <a:chOff x="0" y="0"/>
+          <a:chExt cx="0" cy="0"/>
+        </a:xfrm>
+      </p:grpSpPr>
+      <p:sp>
+        <p:nvSpPr>
+          <p:cNvPr id="2" name="Title 1">
+            <a:extLst>
+              <a:ext uri="{FF2B5EF4-FFF2-40B4-BE49-F238E27FC236}">
+                <a16:creationId xmlns:a16="http://schemas.microsoft.com/office/drawing/2014/main" id="{5FCAE98A-1FA7-F640-BC7F-9C11658500D7}"/>
+              </a:ext>
+            </a:extLst>
+          </p:cNvPr>
+          <p:cNvSpPr>
+            <a:spLocks noGrp="1"/>
+          </p:cNvSpPr>
+          <p:nvPr>
+            <p:ph type="title"/>
+          </p:nvPr>
+        </p:nvSpPr>
+        <p:spPr/>
+        <p:txBody>
+          <a:bodyPr/>
+          <a:lstStyle/>
+          <a:p>
+            <a:r>
+              <a:rPr lang="en-US" dirty="0"/>
+              <a:t>Caso de </a:t>
+            </a:r>
+            <a:r>
+              <a:rPr lang="en-US" dirty="0" err="1"/>
+              <a:t>estudio</a:t>
+            </a:r>
+            <a:endParaRPr lang="en-CR" dirty="0"/>
+          </a:p>
+        </p:txBody>
+      </p:sp>
+      <p:sp>
+        <p:nvSpPr>
+          <p:cNvPr id="3" name="Slide Number Placeholder 2">
+            <a:extLst>
+              <a:ext uri="{FF2B5EF4-FFF2-40B4-BE49-F238E27FC236}">
+                <a16:creationId xmlns:a16="http://schemas.microsoft.com/office/drawing/2014/main" id="{1DECACD6-7120-4E4A-BB11-C58BCD3D0F9A}"/>
+              </a:ext>
+            </a:extLst>
+          </p:cNvPr>
+          <p:cNvSpPr>
+            <a:spLocks noGrp="1"/>
+          </p:cNvSpPr>
+          <p:nvPr>
+            <p:ph type="sldNum" sz="quarter" idx="12"/>
+          </p:nvPr>
+        </p:nvSpPr>
+        <p:spPr/>
+        <p:txBody>
+          <a:bodyPr/>
+          <a:lstStyle/>
+          <a:p>
+            <a:fld id="{4FAB73BC-B049-4115-A692-8D63A059BFB8}" type="slidenum">
+              <a:rPr lang="en-US" smtClean="0"/>
+              <a:pPr/>
+              <a:t>29</a:t>
+            </a:fld>
+            <a:endParaRPr lang="en-US" dirty="0"/>
+          </a:p>
+        </p:txBody>
+      </p:sp>
+      <p:sp>
+        <p:nvSpPr>
+          <p:cNvPr id="7" name="Rounded Rectangle 6">
+            <a:extLst>
+              <a:ext uri="{FF2B5EF4-FFF2-40B4-BE49-F238E27FC236}">
+                <a16:creationId xmlns:a16="http://schemas.microsoft.com/office/drawing/2014/main" id="{9E8E9905-D70B-231A-413C-97CE25FB409F}"/>
+              </a:ext>
+            </a:extLst>
+          </p:cNvPr>
+          <p:cNvSpPr/>
+          <p:nvPr/>
+        </p:nvSpPr>
+        <p:spPr>
+          <a:xfrm>
+            <a:off x="983846" y="3653260"/>
+            <a:ext cx="1655180" cy="1192192"/>
+          </a:xfrm>
+          <a:prstGeom prst="roundRect">
+            <a:avLst/>
+          </a:prstGeom>
+        </p:spPr>
+        <p:style>
+          <a:lnRef idx="2">
+            <a:schemeClr val="accent1">
+              <a:shade val="50000"/>
+            </a:schemeClr>
+          </a:lnRef>
+          <a:fillRef idx="1">
+            <a:schemeClr val="accent1"/>
+          </a:fillRef>
+          <a:effectRef idx="0">
+            <a:schemeClr val="accent1"/>
+          </a:effectRef>
+          <a:fontRef idx="minor">
+            <a:schemeClr val="lt1"/>
+          </a:fontRef>
+        </p:style>
+        <p:txBody>
+          <a:bodyPr rtlCol="0" anchor="ctr"/>
+          <a:lstStyle/>
+          <a:p>
+            <a:pPr algn="ctr"/>
+            <a:r>
+              <a:rPr lang="en-CR" dirty="0"/>
+              <a:t>Compañía ABC</a:t>
+            </a:r>
+          </a:p>
+        </p:txBody>
+      </p:sp>
+      <p:sp>
+        <p:nvSpPr>
+          <p:cNvPr id="8" name="Oval 7">
+            <a:extLst>
+              <a:ext uri="{FF2B5EF4-FFF2-40B4-BE49-F238E27FC236}">
+                <a16:creationId xmlns:a16="http://schemas.microsoft.com/office/drawing/2014/main" id="{3066D971-2C2B-63B6-0E85-DF4BF318F27F}"/>
+              </a:ext>
+            </a:extLst>
+          </p:cNvPr>
+          <p:cNvSpPr/>
+          <p:nvPr/>
+        </p:nvSpPr>
+        <p:spPr>
+          <a:xfrm>
+            <a:off x="3981690" y="2426343"/>
+            <a:ext cx="1875099" cy="523754"/>
+          </a:xfrm>
+          <a:prstGeom prst="ellipse">
+            <a:avLst/>
+          </a:prstGeom>
+        </p:spPr>
+        <p:style>
+          <a:lnRef idx="2">
+            <a:schemeClr val="accent4">
+              <a:shade val="50000"/>
+            </a:schemeClr>
+          </a:lnRef>
+          <a:fillRef idx="1">
+            <a:schemeClr val="accent4"/>
+          </a:fillRef>
+          <a:effectRef idx="0">
+            <a:schemeClr val="accent4"/>
+          </a:effectRef>
+          <a:fontRef idx="minor">
+            <a:schemeClr val="lt1"/>
+          </a:fontRef>
+        </p:style>
+        <p:txBody>
+          <a:bodyPr rtlCol="0" anchor="ctr"/>
+          <a:lstStyle/>
+          <a:p>
+            <a:pPr algn="ctr"/>
+            <a:r>
+              <a:rPr lang="en-CR" dirty="0"/>
+              <a:t>Producto Z</a:t>
+            </a:r>
+          </a:p>
+        </p:txBody>
+      </p:sp>
+      <p:sp>
+        <p:nvSpPr>
+          <p:cNvPr id="9" name="Triangle 8">
+            <a:extLst>
+              <a:ext uri="{FF2B5EF4-FFF2-40B4-BE49-F238E27FC236}">
+                <a16:creationId xmlns:a16="http://schemas.microsoft.com/office/drawing/2014/main" id="{A29031E9-6AB6-FD11-8AF3-E165FF03A5DA}"/>
+              </a:ext>
+            </a:extLst>
+          </p:cNvPr>
+          <p:cNvSpPr/>
+          <p:nvPr/>
+        </p:nvSpPr>
+        <p:spPr>
+          <a:xfrm>
+            <a:off x="3553428" y="5212081"/>
+            <a:ext cx="2731625" cy="1188719"/>
+          </a:xfrm>
+          <a:prstGeom prst="triangle">
+            <a:avLst/>
+          </a:prstGeom>
+        </p:spPr>
+        <p:style>
+          <a:lnRef idx="3">
+            <a:schemeClr val="lt1"/>
+          </a:lnRef>
+          <a:fillRef idx="1">
+            <a:schemeClr val="accent3"/>
+          </a:fillRef>
+          <a:effectRef idx="1">
+            <a:schemeClr val="accent3"/>
+          </a:effectRef>
+          <a:fontRef idx="minor">
+            <a:schemeClr val="lt1"/>
+          </a:fontRef>
+        </p:style>
+        <p:txBody>
+          <a:bodyPr rtlCol="0" anchor="ctr"/>
+          <a:lstStyle/>
+          <a:p>
+            <a:pPr algn="ctr"/>
+            <a:r>
+              <a:rPr lang="en-CR" dirty="0"/>
+              <a:t>Producto X</a:t>
+            </a:r>
+          </a:p>
+        </p:txBody>
+      </p:sp>
+      <p:sp>
+        <p:nvSpPr>
+          <p:cNvPr id="11" name="Hexagon 10">
+            <a:extLst>
+              <a:ext uri="{FF2B5EF4-FFF2-40B4-BE49-F238E27FC236}">
+                <a16:creationId xmlns:a16="http://schemas.microsoft.com/office/drawing/2014/main" id="{3F6E77BF-162F-D059-0B99-44C8EE306DC8}"/>
+              </a:ext>
+            </a:extLst>
+          </p:cNvPr>
+          <p:cNvSpPr/>
+          <p:nvPr/>
+        </p:nvSpPr>
+        <p:spPr>
+          <a:xfrm>
+            <a:off x="3981690" y="3614195"/>
+            <a:ext cx="1782502" cy="1270322"/>
+          </a:xfrm>
+          <a:prstGeom prst="hexagon">
+            <a:avLst/>
+          </a:prstGeom>
+          <a:solidFill>
+            <a:srgbClr val="92D050"/>
+          </a:solidFill>
+        </p:spPr>
+        <p:style>
+          <a:lnRef idx="2">
+            <a:schemeClr val="accent1">
+              <a:shade val="50000"/>
+            </a:schemeClr>
+          </a:lnRef>
+          <a:fillRef idx="1">
+            <a:schemeClr val="accent1"/>
+          </a:fillRef>
+          <a:effectRef idx="0">
+            <a:schemeClr val="accent1"/>
+          </a:effectRef>
+          <a:fontRef idx="minor">
+            <a:schemeClr val="lt1"/>
+          </a:fontRef>
+        </p:style>
+        <p:txBody>
+          <a:bodyPr rtlCol="0" anchor="ctr"/>
+          <a:lstStyle/>
+          <a:p>
+            <a:pPr algn="ctr"/>
+            <a:r>
+              <a:rPr lang="en-CR" dirty="0"/>
+              <a:t>Producto W</a:t>
+            </a:r>
+          </a:p>
+        </p:txBody>
+      </p:sp>
+      <p:cxnSp>
+        <p:nvCxnSpPr>
+          <p:cNvPr id="13" name="Straight Arrow Connector 12">
+            <a:extLst>
+              <a:ext uri="{FF2B5EF4-FFF2-40B4-BE49-F238E27FC236}">
+                <a16:creationId xmlns:a16="http://schemas.microsoft.com/office/drawing/2014/main" id="{0F77F3D4-2041-9D8D-AABE-9BD5987A49EB}"/>
+              </a:ext>
+            </a:extLst>
+          </p:cNvPr>
+          <p:cNvCxnSpPr>
+            <a:stCxn id="7" idx="3"/>
+            <a:endCxn id="8" idx="2"/>
+          </p:cNvCxnSpPr>
+          <p:nvPr/>
+        </p:nvCxnSpPr>
+        <p:spPr>
+          <a:xfrm flipV="1">
+            <a:off x="2639026" y="2688220"/>
+            <a:ext cx="1342664" cy="1561136"/>
+          </a:xfrm>
+          <a:prstGeom prst="straightConnector1">
+            <a:avLst/>
+          </a:prstGeom>
+          <a:ln>
+            <a:solidFill>
+              <a:srgbClr val="C00000"/>
+            </a:solidFill>
+            <a:tailEnd type="triangle"/>
+          </a:ln>
+        </p:spPr>
+        <p:style>
+          <a:lnRef idx="1">
+            <a:schemeClr val="accent1"/>
+          </a:lnRef>
+          <a:fillRef idx="0">
+            <a:schemeClr val="accent1"/>
+          </a:fillRef>
+          <a:effectRef idx="0">
+            <a:schemeClr val="accent1"/>
+          </a:effectRef>
+          <a:fontRef idx="minor">
+            <a:schemeClr val="tx1"/>
+          </a:fontRef>
+        </p:style>
+      </p:cxnSp>
+      <p:cxnSp>
+        <p:nvCxnSpPr>
+          <p:cNvPr id="15" name="Straight Arrow Connector 14">
+            <a:extLst>
+              <a:ext uri="{FF2B5EF4-FFF2-40B4-BE49-F238E27FC236}">
+                <a16:creationId xmlns:a16="http://schemas.microsoft.com/office/drawing/2014/main" id="{51AA28F5-6AC2-3FA4-AE97-A36573C8772F}"/>
+              </a:ext>
+            </a:extLst>
+          </p:cNvPr>
+          <p:cNvCxnSpPr>
+            <a:stCxn id="7" idx="3"/>
+            <a:endCxn id="11" idx="3"/>
+          </p:cNvCxnSpPr>
+          <p:nvPr/>
+        </p:nvCxnSpPr>
+        <p:spPr>
+          <a:xfrm>
+            <a:off x="2639026" y="4249356"/>
+            <a:ext cx="1342664" cy="0"/>
+          </a:xfrm>
+          <a:prstGeom prst="straightConnector1">
+            <a:avLst/>
+          </a:prstGeom>
+          <a:ln>
+            <a:solidFill>
+              <a:srgbClr val="C00000"/>
+            </a:solidFill>
+            <a:tailEnd type="triangle"/>
+          </a:ln>
+        </p:spPr>
+        <p:style>
+          <a:lnRef idx="1">
+            <a:schemeClr val="accent1"/>
+          </a:lnRef>
+          <a:fillRef idx="0">
+            <a:schemeClr val="accent1"/>
+          </a:fillRef>
+          <a:effectRef idx="0">
+            <a:schemeClr val="accent1"/>
+          </a:effectRef>
+          <a:fontRef idx="minor">
+            <a:schemeClr val="tx1"/>
+          </a:fontRef>
+        </p:style>
+      </p:cxnSp>
+      <p:cxnSp>
+        <p:nvCxnSpPr>
+          <p:cNvPr id="17" name="Straight Arrow Connector 16">
+            <a:extLst>
+              <a:ext uri="{FF2B5EF4-FFF2-40B4-BE49-F238E27FC236}">
+                <a16:creationId xmlns:a16="http://schemas.microsoft.com/office/drawing/2014/main" id="{23F0A0D7-586B-69C5-FD48-C24813551171}"/>
+              </a:ext>
+            </a:extLst>
+          </p:cNvPr>
+          <p:cNvCxnSpPr>
+            <a:cxnSpLocks/>
+            <a:endCxn id="9" idx="2"/>
+          </p:cNvCxnSpPr>
+          <p:nvPr/>
+        </p:nvCxnSpPr>
+        <p:spPr>
+          <a:xfrm>
+            <a:off x="2639026" y="4247041"/>
+            <a:ext cx="914402" cy="2153759"/>
+          </a:xfrm>
+          <a:prstGeom prst="straightConnector1">
+            <a:avLst/>
+          </a:prstGeom>
+          <a:ln>
+            <a:solidFill>
+              <a:srgbClr val="C00000"/>
+            </a:solidFill>
+            <a:tailEnd type="triangle"/>
+          </a:ln>
+        </p:spPr>
+        <p:style>
+          <a:lnRef idx="1">
+            <a:schemeClr val="accent1"/>
+          </a:lnRef>
+          <a:fillRef idx="0">
+            <a:schemeClr val="accent1"/>
+          </a:fillRef>
+          <a:effectRef idx="0">
+            <a:schemeClr val="accent1"/>
+          </a:effectRef>
+          <a:fontRef idx="minor">
+            <a:schemeClr val="tx1"/>
+          </a:fontRef>
+        </p:style>
+      </p:cxnSp>
+      <p:pic>
+        <p:nvPicPr>
+          <p:cNvPr id="19" name="Picture 18">
+            <a:extLst>
+              <a:ext uri="{FF2B5EF4-FFF2-40B4-BE49-F238E27FC236}">
+                <a16:creationId xmlns:a16="http://schemas.microsoft.com/office/drawing/2014/main" id="{89322878-F4D7-73FE-2857-B8E7B82E8E53}"/>
+              </a:ext>
+            </a:extLst>
+          </p:cNvPr>
+          <p:cNvPicPr>
+            <a:picLocks noChangeAspect="1"/>
+          </p:cNvPicPr>
+          <p:nvPr/>
+        </p:nvPicPr>
+        <p:blipFill>
+          <a:blip r:embed="rId2">
+            <a:extLst>
+              <a:ext uri="{837473B0-CC2E-450A-ABE3-18F120FF3D39}">
+                <a1611:picAttrSrcUrl xmlns:a1611="http://schemas.microsoft.com/office/drawing/2016/11/main" r:id="rId3"/>
+              </a:ext>
+            </a:extLst>
+          </a:blip>
+          <a:stretch>
+            <a:fillRect/>
+          </a:stretch>
+        </p:blipFill>
+        <p:spPr>
+          <a:xfrm flipH="1">
+            <a:off x="8895137" y="3350870"/>
+            <a:ext cx="902826" cy="902826"/>
+          </a:xfrm>
+          <a:prstGeom prst="rect">
+            <a:avLst/>
+          </a:prstGeom>
+        </p:spPr>
+      </p:pic>
+      <p:pic>
+        <p:nvPicPr>
+          <p:cNvPr id="20" name="Picture 19">
+            <a:extLst>
+              <a:ext uri="{FF2B5EF4-FFF2-40B4-BE49-F238E27FC236}">
+                <a16:creationId xmlns:a16="http://schemas.microsoft.com/office/drawing/2014/main" id="{CE9D9D4D-76BA-1157-178A-1D3F57CD53D9}"/>
+              </a:ext>
+            </a:extLst>
+          </p:cNvPr>
+          <p:cNvPicPr>
+            <a:picLocks noChangeAspect="1"/>
+          </p:cNvPicPr>
+          <p:nvPr/>
+        </p:nvPicPr>
+        <p:blipFill>
+          <a:blip r:embed="rId2">
+            <a:extLst>
+              <a:ext uri="{837473B0-CC2E-450A-ABE3-18F120FF3D39}">
+                <a1611:picAttrSrcUrl xmlns:a1611="http://schemas.microsoft.com/office/drawing/2016/11/main" r:id="rId3"/>
+              </a:ext>
+            </a:extLst>
+          </a:blip>
+          <a:stretch>
+            <a:fillRect/>
+          </a:stretch>
+        </p:blipFill>
+        <p:spPr>
+          <a:xfrm flipH="1">
+            <a:off x="9269385" y="3587602"/>
+            <a:ext cx="902826" cy="902826"/>
+          </a:xfrm>
+          <a:prstGeom prst="rect">
+            <a:avLst/>
+          </a:prstGeom>
+        </p:spPr>
+      </p:pic>
+      <p:pic>
+        <p:nvPicPr>
+          <p:cNvPr id="21" name="Picture 20">
+            <a:extLst>
+              <a:ext uri="{FF2B5EF4-FFF2-40B4-BE49-F238E27FC236}">
+                <a16:creationId xmlns:a16="http://schemas.microsoft.com/office/drawing/2014/main" id="{AB94374B-2877-7C11-B7CE-839E354E7065}"/>
+              </a:ext>
+            </a:extLst>
+          </p:cNvPr>
+          <p:cNvPicPr>
+            <a:picLocks noChangeAspect="1"/>
+          </p:cNvPicPr>
+          <p:nvPr/>
+        </p:nvPicPr>
+        <p:blipFill>
+          <a:blip r:embed="rId2">
+            <a:extLst>
+              <a:ext uri="{837473B0-CC2E-450A-ABE3-18F120FF3D39}">
+                <a1611:picAttrSrcUrl xmlns:a1611="http://schemas.microsoft.com/office/drawing/2016/11/main" r:id="rId3"/>
+              </a:ext>
+            </a:extLst>
+          </a:blip>
+          <a:stretch>
+            <a:fillRect/>
+          </a:stretch>
+        </p:blipFill>
+        <p:spPr>
+          <a:xfrm flipH="1">
+            <a:off x="9541398" y="4064161"/>
+            <a:ext cx="902826" cy="902826"/>
+          </a:xfrm>
+          <a:prstGeom prst="rect">
+            <a:avLst/>
+          </a:prstGeom>
+        </p:spPr>
+      </p:pic>
+      <p:pic>
+        <p:nvPicPr>
+          <p:cNvPr id="22" name="Picture 21">
+            <a:extLst>
+              <a:ext uri="{FF2B5EF4-FFF2-40B4-BE49-F238E27FC236}">
+                <a16:creationId xmlns:a16="http://schemas.microsoft.com/office/drawing/2014/main" id="{4577ABDB-E417-5C15-5447-29C751C034B6}"/>
+              </a:ext>
+            </a:extLst>
+          </p:cNvPr>
+          <p:cNvPicPr>
+            <a:picLocks noChangeAspect="1"/>
+          </p:cNvPicPr>
+          <p:nvPr/>
+        </p:nvPicPr>
+        <p:blipFill>
+          <a:blip r:embed="rId2">
+            <a:extLst>
+              <a:ext uri="{837473B0-CC2E-450A-ABE3-18F120FF3D39}">
+                <a1611:picAttrSrcUrl xmlns:a1611="http://schemas.microsoft.com/office/drawing/2016/11/main" r:id="rId3"/>
+              </a:ext>
+            </a:extLst>
+          </a:blip>
+          <a:stretch>
+            <a:fillRect/>
+          </a:stretch>
+        </p:blipFill>
+        <p:spPr>
+          <a:xfrm flipH="1">
+            <a:off x="8817972" y="4111357"/>
+            <a:ext cx="902826" cy="902826"/>
+          </a:xfrm>
+          <a:prstGeom prst="rect">
+            <a:avLst/>
+          </a:prstGeom>
+        </p:spPr>
+      </p:pic>
+      <p:sp>
+        <p:nvSpPr>
+          <p:cNvPr id="23" name="TextBox 22">
+            <a:extLst>
+              <a:ext uri="{FF2B5EF4-FFF2-40B4-BE49-F238E27FC236}">
+                <a16:creationId xmlns:a16="http://schemas.microsoft.com/office/drawing/2014/main" id="{6ECB2F3F-D6F5-9C25-3C2F-081277C47A84}"/>
+              </a:ext>
+            </a:extLst>
+          </p:cNvPr>
+          <p:cNvSpPr txBox="1"/>
+          <p:nvPr/>
+        </p:nvSpPr>
+        <p:spPr>
+          <a:xfrm>
+            <a:off x="6820380" y="4065057"/>
+            <a:ext cx="1560645" cy="369332"/>
+          </a:xfrm>
+          <a:prstGeom prst="rect">
+            <a:avLst/>
+          </a:prstGeom>
+          <a:noFill/>
+        </p:spPr>
+        <p:txBody>
+          <a:bodyPr wrap="square" rtlCol="0">
+            <a:spAutoFit/>
+          </a:bodyPr>
+          <a:lstStyle/>
+          <a:p>
+            <a:r>
+              <a:rPr lang="en-CR" dirty="0"/>
+              <a:t>Subscripciones</a:t>
+            </a:r>
+          </a:p>
+        </p:txBody>
+      </p:sp>
+      <p:cxnSp>
+        <p:nvCxnSpPr>
+          <p:cNvPr id="25" name="Straight Arrow Connector 24">
+            <a:extLst>
+              <a:ext uri="{FF2B5EF4-FFF2-40B4-BE49-F238E27FC236}">
+                <a16:creationId xmlns:a16="http://schemas.microsoft.com/office/drawing/2014/main" id="{D5F7A17F-5334-DB88-2648-C63B9531BA14}"/>
+              </a:ext>
+            </a:extLst>
+          </p:cNvPr>
+          <p:cNvCxnSpPr>
+            <a:cxnSpLocks/>
+            <a:stCxn id="8" idx="6"/>
+          </p:cNvCxnSpPr>
+          <p:nvPr/>
+        </p:nvCxnSpPr>
+        <p:spPr>
+          <a:xfrm>
+            <a:off x="5856789" y="2688220"/>
+            <a:ext cx="1056188" cy="1413398"/>
+          </a:xfrm>
+          <a:prstGeom prst="straightConnector1">
+            <a:avLst/>
+          </a:prstGeom>
+          <a:ln>
+            <a:tailEnd type="triangle"/>
+          </a:ln>
+        </p:spPr>
+        <p:style>
+          <a:lnRef idx="1">
+            <a:schemeClr val="accent1"/>
+          </a:lnRef>
+          <a:fillRef idx="0">
+            <a:schemeClr val="accent1"/>
+          </a:fillRef>
+          <a:effectRef idx="0">
+            <a:schemeClr val="accent1"/>
+          </a:effectRef>
+          <a:fontRef idx="minor">
+            <a:schemeClr val="tx1"/>
+          </a:fontRef>
+        </p:style>
+      </p:cxnSp>
+      <p:cxnSp>
+        <p:nvCxnSpPr>
+          <p:cNvPr id="27" name="Straight Arrow Connector 26">
+            <a:extLst>
+              <a:ext uri="{FF2B5EF4-FFF2-40B4-BE49-F238E27FC236}">
+                <a16:creationId xmlns:a16="http://schemas.microsoft.com/office/drawing/2014/main" id="{F84EB4E6-AD62-EB4D-1C54-5BBEFE9C26D4}"/>
+              </a:ext>
+            </a:extLst>
+          </p:cNvPr>
+          <p:cNvCxnSpPr>
+            <a:cxnSpLocks/>
+            <a:stCxn id="11" idx="0"/>
+            <a:endCxn id="23" idx="1"/>
+          </p:cNvCxnSpPr>
+          <p:nvPr/>
+        </p:nvCxnSpPr>
+        <p:spPr>
+          <a:xfrm>
+            <a:off x="5764192" y="4249356"/>
+            <a:ext cx="1056188" cy="367"/>
+          </a:xfrm>
+          <a:prstGeom prst="straightConnector1">
+            <a:avLst/>
+          </a:prstGeom>
+          <a:ln>
+            <a:tailEnd type="triangle"/>
+          </a:ln>
+        </p:spPr>
+        <p:style>
+          <a:lnRef idx="1">
+            <a:schemeClr val="accent1"/>
+          </a:lnRef>
+          <a:fillRef idx="0">
+            <a:schemeClr val="accent1"/>
+          </a:fillRef>
+          <a:effectRef idx="0">
+            <a:schemeClr val="accent1"/>
+          </a:effectRef>
+          <a:fontRef idx="minor">
+            <a:schemeClr val="tx1"/>
+          </a:fontRef>
+        </p:style>
+      </p:cxnSp>
+      <p:cxnSp>
+        <p:nvCxnSpPr>
+          <p:cNvPr id="29" name="Straight Arrow Connector 28">
+            <a:extLst>
+              <a:ext uri="{FF2B5EF4-FFF2-40B4-BE49-F238E27FC236}">
+                <a16:creationId xmlns:a16="http://schemas.microsoft.com/office/drawing/2014/main" id="{C2399CA1-D933-611E-9251-34C5DDBD014F}"/>
+              </a:ext>
+            </a:extLst>
+          </p:cNvPr>
+          <p:cNvCxnSpPr>
+            <a:stCxn id="9" idx="4"/>
+          </p:cNvCxnSpPr>
+          <p:nvPr/>
+        </p:nvCxnSpPr>
+        <p:spPr>
+          <a:xfrm flipV="1">
+            <a:off x="6285053" y="4490428"/>
+            <a:ext cx="659757" cy="1910372"/>
+          </a:xfrm>
+          <a:prstGeom prst="straightConnector1">
+            <a:avLst/>
+          </a:prstGeom>
+          <a:ln>
+            <a:tailEnd type="triangle"/>
+          </a:ln>
+        </p:spPr>
+        <p:style>
+          <a:lnRef idx="1">
+            <a:schemeClr val="accent1"/>
+          </a:lnRef>
+          <a:fillRef idx="0">
+            <a:schemeClr val="accent1"/>
+          </a:fillRef>
+          <a:effectRef idx="0">
+            <a:schemeClr val="accent1"/>
+          </a:effectRef>
+          <a:fontRef idx="minor">
+            <a:schemeClr val="tx1"/>
+          </a:fontRef>
+        </p:style>
+      </p:cxnSp>
+      <p:cxnSp>
+        <p:nvCxnSpPr>
+          <p:cNvPr id="32" name="Straight Arrow Connector 31">
+            <a:extLst>
+              <a:ext uri="{FF2B5EF4-FFF2-40B4-BE49-F238E27FC236}">
+                <a16:creationId xmlns:a16="http://schemas.microsoft.com/office/drawing/2014/main" id="{FFAF8B79-CB49-0239-F6AE-8CCB3B191947}"/>
+              </a:ext>
+            </a:extLst>
+          </p:cNvPr>
+          <p:cNvCxnSpPr>
+            <a:cxnSpLocks/>
+            <a:endCxn id="23" idx="3"/>
+          </p:cNvCxnSpPr>
+          <p:nvPr/>
+        </p:nvCxnSpPr>
+        <p:spPr>
+          <a:xfrm flipH="1">
+            <a:off x="8381025" y="4249723"/>
+            <a:ext cx="495298" cy="0"/>
+          </a:xfrm>
+          <a:prstGeom prst="straightConnector1">
+            <a:avLst/>
+          </a:prstGeom>
+          <a:ln>
+            <a:headEnd type="triangle"/>
+            <a:tailEnd type="triangle"/>
+          </a:ln>
+        </p:spPr>
+        <p:style>
+          <a:lnRef idx="1">
+            <a:schemeClr val="accent1"/>
+          </a:lnRef>
+          <a:fillRef idx="0">
+            <a:schemeClr val="accent1"/>
+          </a:fillRef>
+          <a:effectRef idx="0">
+            <a:schemeClr val="accent1"/>
+          </a:effectRef>
+          <a:fontRef idx="minor">
+            <a:schemeClr val="tx1"/>
+          </a:fontRef>
+        </p:style>
+      </p:cxnSp>
+    </p:spTree>
+    <p:extLst>
+      <p:ext uri="{BB962C8B-B14F-4D97-AF65-F5344CB8AC3E}">
+        <p14:creationId xmlns:p14="http://schemas.microsoft.com/office/powerpoint/2010/main" val="3799237881"/>
       </p:ext>
     </p:extLst>
   </p:cSld>
@@ -7437,6 +9908,1546 @@
     <p:extLst>
       <p:ext uri="{BB962C8B-B14F-4D97-AF65-F5344CB8AC3E}">
         <p14:creationId xmlns:p14="http://schemas.microsoft.com/office/powerpoint/2010/main" val="4151360629"/>
+      </p:ext>
+    </p:extLst>
+  </p:cSld>
+  <p:clrMapOvr>
+    <a:masterClrMapping/>
+  </p:clrMapOvr>
+</p:sld>
+</file>
+
+<file path=ppt/slides/slide30.xml><?xml version="1.0" encoding="utf-8"?>
+<p:sld xmlns:a="http://schemas.openxmlformats.org/drawingml/2006/main" xmlns:r="http://schemas.openxmlformats.org/officeDocument/2006/relationships" xmlns:p="http://schemas.openxmlformats.org/presentationml/2006/main">
+  <p:cSld>
+    <p:spTree>
+      <p:nvGrpSpPr>
+        <p:cNvPr id="1" name=""/>
+        <p:cNvGrpSpPr/>
+        <p:nvPr/>
+      </p:nvGrpSpPr>
+      <p:grpSpPr>
+        <a:xfrm>
+          <a:off x="0" y="0"/>
+          <a:ext cx="0" cy="0"/>
+          <a:chOff x="0" y="0"/>
+          <a:chExt cx="0" cy="0"/>
+        </a:xfrm>
+      </p:grpSpPr>
+      <p:sp>
+        <p:nvSpPr>
+          <p:cNvPr id="2" name="Title 1">
+            <a:extLst>
+              <a:ext uri="{FF2B5EF4-FFF2-40B4-BE49-F238E27FC236}">
+                <a16:creationId xmlns:a16="http://schemas.microsoft.com/office/drawing/2014/main" id="{5FCAE98A-1FA7-F640-BC7F-9C11658500D7}"/>
+              </a:ext>
+            </a:extLst>
+          </p:cNvPr>
+          <p:cNvSpPr>
+            <a:spLocks noGrp="1"/>
+          </p:cNvSpPr>
+          <p:nvPr>
+            <p:ph type="title"/>
+          </p:nvPr>
+        </p:nvSpPr>
+        <p:spPr/>
+        <p:txBody>
+          <a:bodyPr/>
+          <a:lstStyle/>
+          <a:p>
+            <a:r>
+              <a:rPr lang="en-US" dirty="0"/>
+              <a:t>Caso de </a:t>
+            </a:r>
+            <a:r>
+              <a:rPr lang="en-US" dirty="0" err="1"/>
+              <a:t>estudio</a:t>
+            </a:r>
+            <a:endParaRPr lang="en-CR" dirty="0"/>
+          </a:p>
+        </p:txBody>
+      </p:sp>
+      <p:sp>
+        <p:nvSpPr>
+          <p:cNvPr id="3" name="Slide Number Placeholder 2">
+            <a:extLst>
+              <a:ext uri="{FF2B5EF4-FFF2-40B4-BE49-F238E27FC236}">
+                <a16:creationId xmlns:a16="http://schemas.microsoft.com/office/drawing/2014/main" id="{1DECACD6-7120-4E4A-BB11-C58BCD3D0F9A}"/>
+              </a:ext>
+            </a:extLst>
+          </p:cNvPr>
+          <p:cNvSpPr>
+            <a:spLocks noGrp="1"/>
+          </p:cNvSpPr>
+          <p:nvPr>
+            <p:ph type="sldNum" sz="quarter" idx="12"/>
+          </p:nvPr>
+        </p:nvSpPr>
+        <p:spPr/>
+        <p:txBody>
+          <a:bodyPr/>
+          <a:lstStyle/>
+          <a:p>
+            <a:fld id="{4FAB73BC-B049-4115-A692-8D63A059BFB8}" type="slidenum">
+              <a:rPr lang="en-US" smtClean="0"/>
+              <a:pPr/>
+              <a:t>30</a:t>
+            </a:fld>
+            <a:endParaRPr lang="en-US" dirty="0"/>
+          </a:p>
+        </p:txBody>
+      </p:sp>
+      <p:sp>
+        <p:nvSpPr>
+          <p:cNvPr id="4" name="Rounded Rectangle 3">
+            <a:extLst>
+              <a:ext uri="{FF2B5EF4-FFF2-40B4-BE49-F238E27FC236}">
+                <a16:creationId xmlns:a16="http://schemas.microsoft.com/office/drawing/2014/main" id="{9DCA2A4D-FDF4-0658-469A-D8724D73E9E5}"/>
+              </a:ext>
+            </a:extLst>
+          </p:cNvPr>
+          <p:cNvSpPr/>
+          <p:nvPr/>
+        </p:nvSpPr>
+        <p:spPr>
+          <a:xfrm>
+            <a:off x="4826643" y="3625770"/>
+            <a:ext cx="1805650" cy="876782"/>
+          </a:xfrm>
+          <a:prstGeom prst="roundRect">
+            <a:avLst/>
+          </a:prstGeom>
+        </p:spPr>
+        <p:style>
+          <a:lnRef idx="2">
+            <a:schemeClr val="accent4">
+              <a:shade val="50000"/>
+            </a:schemeClr>
+          </a:lnRef>
+          <a:fillRef idx="1">
+            <a:schemeClr val="accent4"/>
+          </a:fillRef>
+          <a:effectRef idx="0">
+            <a:schemeClr val="accent4"/>
+          </a:effectRef>
+          <a:fontRef idx="minor">
+            <a:schemeClr val="lt1"/>
+          </a:fontRef>
+        </p:style>
+        <p:txBody>
+          <a:bodyPr rtlCol="0" anchor="ctr"/>
+          <a:lstStyle/>
+          <a:p>
+            <a:pPr algn="ctr"/>
+            <a:r>
+              <a:rPr lang="en-CR" dirty="0"/>
+              <a:t>Subscription Manager</a:t>
+            </a:r>
+          </a:p>
+        </p:txBody>
+      </p:sp>
+      <p:sp>
+        <p:nvSpPr>
+          <p:cNvPr id="24" name="Rounded Rectangle 23">
+            <a:extLst>
+              <a:ext uri="{FF2B5EF4-FFF2-40B4-BE49-F238E27FC236}">
+                <a16:creationId xmlns:a16="http://schemas.microsoft.com/office/drawing/2014/main" id="{9E55CDC8-87F6-FCD6-7DDA-97B100767C1C}"/>
+              </a:ext>
+            </a:extLst>
+          </p:cNvPr>
+          <p:cNvSpPr/>
+          <p:nvPr/>
+        </p:nvSpPr>
+        <p:spPr>
+          <a:xfrm>
+            <a:off x="1564511" y="3625770"/>
+            <a:ext cx="2104664" cy="876782"/>
+          </a:xfrm>
+          <a:prstGeom prst="roundRect">
+            <a:avLst/>
+          </a:prstGeom>
+        </p:spPr>
+        <p:style>
+          <a:lnRef idx="2">
+            <a:schemeClr val="accent1">
+              <a:shade val="50000"/>
+            </a:schemeClr>
+          </a:lnRef>
+          <a:fillRef idx="1">
+            <a:schemeClr val="accent1"/>
+          </a:fillRef>
+          <a:effectRef idx="0">
+            <a:schemeClr val="accent1"/>
+          </a:effectRef>
+          <a:fontRef idx="minor">
+            <a:schemeClr val="lt1"/>
+          </a:fontRef>
+        </p:style>
+        <p:txBody>
+          <a:bodyPr rtlCol="0" anchor="ctr"/>
+          <a:lstStyle/>
+          <a:p>
+            <a:pPr algn="ctr"/>
+            <a:r>
+              <a:rPr lang="en-CR" dirty="0"/>
+              <a:t>Persistance Storage</a:t>
+            </a:r>
+          </a:p>
+        </p:txBody>
+      </p:sp>
+      <p:sp>
+        <p:nvSpPr>
+          <p:cNvPr id="26" name="Rounded Rectangle 25">
+            <a:extLst>
+              <a:ext uri="{FF2B5EF4-FFF2-40B4-BE49-F238E27FC236}">
+                <a16:creationId xmlns:a16="http://schemas.microsoft.com/office/drawing/2014/main" id="{502A7936-3B33-04D5-9A78-7D5201DB1F77}"/>
+              </a:ext>
+            </a:extLst>
+          </p:cNvPr>
+          <p:cNvSpPr/>
+          <p:nvPr/>
+        </p:nvSpPr>
+        <p:spPr>
+          <a:xfrm>
+            <a:off x="7881279" y="3625770"/>
+            <a:ext cx="2104664" cy="876782"/>
+          </a:xfrm>
+          <a:prstGeom prst="roundRect">
+            <a:avLst/>
+          </a:prstGeom>
+        </p:spPr>
+        <p:style>
+          <a:lnRef idx="2">
+            <a:schemeClr val="accent3">
+              <a:shade val="50000"/>
+            </a:schemeClr>
+          </a:lnRef>
+          <a:fillRef idx="1">
+            <a:schemeClr val="accent3"/>
+          </a:fillRef>
+          <a:effectRef idx="0">
+            <a:schemeClr val="accent3"/>
+          </a:effectRef>
+          <a:fontRef idx="minor">
+            <a:schemeClr val="lt1"/>
+          </a:fontRef>
+        </p:style>
+        <p:txBody>
+          <a:bodyPr rtlCol="0" anchor="ctr"/>
+          <a:lstStyle/>
+          <a:p>
+            <a:pPr algn="ctr"/>
+            <a:r>
+              <a:rPr lang="en-CR" dirty="0"/>
+              <a:t>Access Intefaces</a:t>
+            </a:r>
+          </a:p>
+        </p:txBody>
+      </p:sp>
+      <p:cxnSp>
+        <p:nvCxnSpPr>
+          <p:cNvPr id="6" name="Straight Arrow Connector 5">
+            <a:extLst>
+              <a:ext uri="{FF2B5EF4-FFF2-40B4-BE49-F238E27FC236}">
+                <a16:creationId xmlns:a16="http://schemas.microsoft.com/office/drawing/2014/main" id="{B4750DF3-978C-06E9-0C0E-02A66B81F5C6}"/>
+              </a:ext>
+            </a:extLst>
+          </p:cNvPr>
+          <p:cNvCxnSpPr>
+            <a:stCxn id="24" idx="3"/>
+            <a:endCxn id="4" idx="1"/>
+          </p:cNvCxnSpPr>
+          <p:nvPr/>
+        </p:nvCxnSpPr>
+        <p:spPr>
+          <a:xfrm>
+            <a:off x="3669175" y="4064161"/>
+            <a:ext cx="1157468" cy="0"/>
+          </a:xfrm>
+          <a:prstGeom prst="straightConnector1">
+            <a:avLst/>
+          </a:prstGeom>
+          <a:ln>
+            <a:solidFill>
+              <a:srgbClr val="C00000"/>
+            </a:solidFill>
+            <a:headEnd type="triangle"/>
+            <a:tailEnd type="triangle"/>
+          </a:ln>
+        </p:spPr>
+        <p:style>
+          <a:lnRef idx="1">
+            <a:schemeClr val="accent1"/>
+          </a:lnRef>
+          <a:fillRef idx="0">
+            <a:schemeClr val="accent1"/>
+          </a:fillRef>
+          <a:effectRef idx="0">
+            <a:schemeClr val="accent1"/>
+          </a:effectRef>
+          <a:fontRef idx="minor">
+            <a:schemeClr val="tx1"/>
+          </a:fontRef>
+        </p:style>
+      </p:cxnSp>
+      <p:cxnSp>
+        <p:nvCxnSpPr>
+          <p:cNvPr id="12" name="Straight Arrow Connector 11">
+            <a:extLst>
+              <a:ext uri="{FF2B5EF4-FFF2-40B4-BE49-F238E27FC236}">
+                <a16:creationId xmlns:a16="http://schemas.microsoft.com/office/drawing/2014/main" id="{00A1F756-D60B-71F1-6A1D-3AED7EDCC366}"/>
+              </a:ext>
+            </a:extLst>
+          </p:cNvPr>
+          <p:cNvCxnSpPr>
+            <a:stCxn id="4" idx="3"/>
+            <a:endCxn id="26" idx="1"/>
+          </p:cNvCxnSpPr>
+          <p:nvPr/>
+        </p:nvCxnSpPr>
+        <p:spPr>
+          <a:xfrm>
+            <a:off x="6632293" y="4064161"/>
+            <a:ext cx="1248986" cy="0"/>
+          </a:xfrm>
+          <a:prstGeom prst="straightConnector1">
+            <a:avLst/>
+          </a:prstGeom>
+          <a:ln>
+            <a:solidFill>
+              <a:srgbClr val="C00000"/>
+            </a:solidFill>
+            <a:headEnd type="triangle"/>
+            <a:tailEnd type="triangle"/>
+          </a:ln>
+        </p:spPr>
+        <p:style>
+          <a:lnRef idx="1">
+            <a:schemeClr val="accent1"/>
+          </a:lnRef>
+          <a:fillRef idx="0">
+            <a:schemeClr val="accent1"/>
+          </a:fillRef>
+          <a:effectRef idx="0">
+            <a:schemeClr val="accent1"/>
+          </a:effectRef>
+          <a:fontRef idx="minor">
+            <a:schemeClr val="tx1"/>
+          </a:fontRef>
+        </p:style>
+      </p:cxnSp>
+    </p:spTree>
+    <p:extLst>
+      <p:ext uri="{BB962C8B-B14F-4D97-AF65-F5344CB8AC3E}">
+        <p14:creationId xmlns:p14="http://schemas.microsoft.com/office/powerpoint/2010/main" val="2121785855"/>
+      </p:ext>
+    </p:extLst>
+  </p:cSld>
+  <p:clrMapOvr>
+    <a:masterClrMapping/>
+  </p:clrMapOvr>
+</p:sld>
+</file>
+
+<file path=ppt/slides/slide31.xml><?xml version="1.0" encoding="utf-8"?>
+<p:sld xmlns:a="http://schemas.openxmlformats.org/drawingml/2006/main" xmlns:r="http://schemas.openxmlformats.org/officeDocument/2006/relationships" xmlns:p="http://schemas.openxmlformats.org/presentationml/2006/main">
+  <p:cSld>
+    <p:spTree>
+      <p:nvGrpSpPr>
+        <p:cNvPr id="1" name=""/>
+        <p:cNvGrpSpPr/>
+        <p:nvPr/>
+      </p:nvGrpSpPr>
+      <p:grpSpPr>
+        <a:xfrm>
+          <a:off x="0" y="0"/>
+          <a:ext cx="0" cy="0"/>
+          <a:chOff x="0" y="0"/>
+          <a:chExt cx="0" cy="0"/>
+        </a:xfrm>
+      </p:grpSpPr>
+      <p:sp>
+        <p:nvSpPr>
+          <p:cNvPr id="2" name="Title 1">
+            <a:extLst>
+              <a:ext uri="{FF2B5EF4-FFF2-40B4-BE49-F238E27FC236}">
+                <a16:creationId xmlns:a16="http://schemas.microsoft.com/office/drawing/2014/main" id="{5FCAE98A-1FA7-F640-BC7F-9C11658500D7}"/>
+              </a:ext>
+            </a:extLst>
+          </p:cNvPr>
+          <p:cNvSpPr>
+            <a:spLocks noGrp="1"/>
+          </p:cNvSpPr>
+          <p:nvPr>
+            <p:ph type="title"/>
+          </p:nvPr>
+        </p:nvSpPr>
+        <p:spPr/>
+        <p:txBody>
+          <a:bodyPr/>
+          <a:lstStyle/>
+          <a:p>
+            <a:r>
+              <a:rPr lang="en-US" dirty="0"/>
+              <a:t>Caso de </a:t>
+            </a:r>
+            <a:r>
+              <a:rPr lang="en-US" dirty="0" err="1"/>
+              <a:t>estudio</a:t>
+            </a:r>
+            <a:endParaRPr lang="en-CR" dirty="0"/>
+          </a:p>
+        </p:txBody>
+      </p:sp>
+      <p:sp>
+        <p:nvSpPr>
+          <p:cNvPr id="3" name="Slide Number Placeholder 2">
+            <a:extLst>
+              <a:ext uri="{FF2B5EF4-FFF2-40B4-BE49-F238E27FC236}">
+                <a16:creationId xmlns:a16="http://schemas.microsoft.com/office/drawing/2014/main" id="{1DECACD6-7120-4E4A-BB11-C58BCD3D0F9A}"/>
+              </a:ext>
+            </a:extLst>
+          </p:cNvPr>
+          <p:cNvSpPr>
+            <a:spLocks noGrp="1"/>
+          </p:cNvSpPr>
+          <p:nvPr>
+            <p:ph type="sldNum" sz="quarter" idx="12"/>
+          </p:nvPr>
+        </p:nvSpPr>
+        <p:spPr/>
+        <p:txBody>
+          <a:bodyPr/>
+          <a:lstStyle/>
+          <a:p>
+            <a:fld id="{4FAB73BC-B049-4115-A692-8D63A059BFB8}" type="slidenum">
+              <a:rPr lang="en-US" smtClean="0"/>
+              <a:pPr/>
+              <a:t>31</a:t>
+            </a:fld>
+            <a:endParaRPr lang="en-US" dirty="0"/>
+          </a:p>
+        </p:txBody>
+      </p:sp>
+      <p:sp>
+        <p:nvSpPr>
+          <p:cNvPr id="4" name="Rounded Rectangle 3">
+            <a:extLst>
+              <a:ext uri="{FF2B5EF4-FFF2-40B4-BE49-F238E27FC236}">
+                <a16:creationId xmlns:a16="http://schemas.microsoft.com/office/drawing/2014/main" id="{9DCA2A4D-FDF4-0658-469A-D8724D73E9E5}"/>
+              </a:ext>
+            </a:extLst>
+          </p:cNvPr>
+          <p:cNvSpPr/>
+          <p:nvPr/>
+        </p:nvSpPr>
+        <p:spPr>
+          <a:xfrm>
+            <a:off x="4826643" y="3625770"/>
+            <a:ext cx="1805650" cy="876782"/>
+          </a:xfrm>
+          <a:prstGeom prst="roundRect">
+            <a:avLst/>
+          </a:prstGeom>
+        </p:spPr>
+        <p:style>
+          <a:lnRef idx="2">
+            <a:schemeClr val="accent4">
+              <a:shade val="50000"/>
+            </a:schemeClr>
+          </a:lnRef>
+          <a:fillRef idx="1">
+            <a:schemeClr val="accent4"/>
+          </a:fillRef>
+          <a:effectRef idx="0">
+            <a:schemeClr val="accent4"/>
+          </a:effectRef>
+          <a:fontRef idx="minor">
+            <a:schemeClr val="lt1"/>
+          </a:fontRef>
+        </p:style>
+        <p:txBody>
+          <a:bodyPr rtlCol="0" anchor="ctr"/>
+          <a:lstStyle/>
+          <a:p>
+            <a:pPr algn="ctr"/>
+            <a:r>
+              <a:rPr lang="en-CR" dirty="0"/>
+              <a:t>Subscription Manager</a:t>
+            </a:r>
+          </a:p>
+        </p:txBody>
+      </p:sp>
+      <p:sp>
+        <p:nvSpPr>
+          <p:cNvPr id="24" name="Rounded Rectangle 23">
+            <a:extLst>
+              <a:ext uri="{FF2B5EF4-FFF2-40B4-BE49-F238E27FC236}">
+                <a16:creationId xmlns:a16="http://schemas.microsoft.com/office/drawing/2014/main" id="{9E55CDC8-87F6-FCD6-7DDA-97B100767C1C}"/>
+              </a:ext>
+            </a:extLst>
+          </p:cNvPr>
+          <p:cNvSpPr/>
+          <p:nvPr/>
+        </p:nvSpPr>
+        <p:spPr>
+          <a:xfrm>
+            <a:off x="1564511" y="3625770"/>
+            <a:ext cx="2104664" cy="876782"/>
+          </a:xfrm>
+          <a:prstGeom prst="roundRect">
+            <a:avLst/>
+          </a:prstGeom>
+        </p:spPr>
+        <p:style>
+          <a:lnRef idx="2">
+            <a:schemeClr val="accent1">
+              <a:shade val="50000"/>
+            </a:schemeClr>
+          </a:lnRef>
+          <a:fillRef idx="1">
+            <a:schemeClr val="accent1"/>
+          </a:fillRef>
+          <a:effectRef idx="0">
+            <a:schemeClr val="accent1"/>
+          </a:effectRef>
+          <a:fontRef idx="minor">
+            <a:schemeClr val="lt1"/>
+          </a:fontRef>
+        </p:style>
+        <p:txBody>
+          <a:bodyPr rtlCol="0" anchor="ctr"/>
+          <a:lstStyle/>
+          <a:p>
+            <a:pPr algn="ctr"/>
+            <a:r>
+              <a:rPr lang="en-CR" dirty="0"/>
+              <a:t>Persistance Storage</a:t>
+            </a:r>
+          </a:p>
+        </p:txBody>
+      </p:sp>
+      <p:sp>
+        <p:nvSpPr>
+          <p:cNvPr id="26" name="Rounded Rectangle 25">
+            <a:extLst>
+              <a:ext uri="{FF2B5EF4-FFF2-40B4-BE49-F238E27FC236}">
+                <a16:creationId xmlns:a16="http://schemas.microsoft.com/office/drawing/2014/main" id="{502A7936-3B33-04D5-9A78-7D5201DB1F77}"/>
+              </a:ext>
+            </a:extLst>
+          </p:cNvPr>
+          <p:cNvSpPr/>
+          <p:nvPr/>
+        </p:nvSpPr>
+        <p:spPr>
+          <a:xfrm>
+            <a:off x="7881279" y="3625770"/>
+            <a:ext cx="2104664" cy="876782"/>
+          </a:xfrm>
+          <a:prstGeom prst="roundRect">
+            <a:avLst/>
+          </a:prstGeom>
+        </p:spPr>
+        <p:style>
+          <a:lnRef idx="2">
+            <a:schemeClr val="accent3">
+              <a:shade val="50000"/>
+            </a:schemeClr>
+          </a:lnRef>
+          <a:fillRef idx="1">
+            <a:schemeClr val="accent3"/>
+          </a:fillRef>
+          <a:effectRef idx="0">
+            <a:schemeClr val="accent3"/>
+          </a:effectRef>
+          <a:fontRef idx="minor">
+            <a:schemeClr val="lt1"/>
+          </a:fontRef>
+        </p:style>
+        <p:txBody>
+          <a:bodyPr rtlCol="0" anchor="ctr"/>
+          <a:lstStyle/>
+          <a:p>
+            <a:pPr algn="ctr"/>
+            <a:r>
+              <a:rPr lang="en-CR" dirty="0"/>
+              <a:t>Access Intefaces</a:t>
+            </a:r>
+          </a:p>
+        </p:txBody>
+      </p:sp>
+      <p:cxnSp>
+        <p:nvCxnSpPr>
+          <p:cNvPr id="6" name="Straight Arrow Connector 5">
+            <a:extLst>
+              <a:ext uri="{FF2B5EF4-FFF2-40B4-BE49-F238E27FC236}">
+                <a16:creationId xmlns:a16="http://schemas.microsoft.com/office/drawing/2014/main" id="{B4750DF3-978C-06E9-0C0E-02A66B81F5C6}"/>
+              </a:ext>
+            </a:extLst>
+          </p:cNvPr>
+          <p:cNvCxnSpPr>
+            <a:stCxn id="24" idx="3"/>
+            <a:endCxn id="4" idx="1"/>
+          </p:cNvCxnSpPr>
+          <p:nvPr/>
+        </p:nvCxnSpPr>
+        <p:spPr>
+          <a:xfrm>
+            <a:off x="3669175" y="4064161"/>
+            <a:ext cx="1157468" cy="0"/>
+          </a:xfrm>
+          <a:prstGeom prst="straightConnector1">
+            <a:avLst/>
+          </a:prstGeom>
+          <a:ln>
+            <a:solidFill>
+              <a:srgbClr val="C00000"/>
+            </a:solidFill>
+            <a:headEnd type="triangle"/>
+            <a:tailEnd type="triangle"/>
+          </a:ln>
+        </p:spPr>
+        <p:style>
+          <a:lnRef idx="1">
+            <a:schemeClr val="accent1"/>
+          </a:lnRef>
+          <a:fillRef idx="0">
+            <a:schemeClr val="accent1"/>
+          </a:fillRef>
+          <a:effectRef idx="0">
+            <a:schemeClr val="accent1"/>
+          </a:effectRef>
+          <a:fontRef idx="minor">
+            <a:schemeClr val="tx1"/>
+          </a:fontRef>
+        </p:style>
+      </p:cxnSp>
+      <p:cxnSp>
+        <p:nvCxnSpPr>
+          <p:cNvPr id="12" name="Straight Arrow Connector 11">
+            <a:extLst>
+              <a:ext uri="{FF2B5EF4-FFF2-40B4-BE49-F238E27FC236}">
+                <a16:creationId xmlns:a16="http://schemas.microsoft.com/office/drawing/2014/main" id="{00A1F756-D60B-71F1-6A1D-3AED7EDCC366}"/>
+              </a:ext>
+            </a:extLst>
+          </p:cNvPr>
+          <p:cNvCxnSpPr>
+            <a:stCxn id="4" idx="3"/>
+            <a:endCxn id="26" idx="1"/>
+          </p:cNvCxnSpPr>
+          <p:nvPr/>
+        </p:nvCxnSpPr>
+        <p:spPr>
+          <a:xfrm>
+            <a:off x="6632293" y="4064161"/>
+            <a:ext cx="1248986" cy="0"/>
+          </a:xfrm>
+          <a:prstGeom prst="straightConnector1">
+            <a:avLst/>
+          </a:prstGeom>
+          <a:ln>
+            <a:solidFill>
+              <a:srgbClr val="C00000"/>
+            </a:solidFill>
+            <a:headEnd type="triangle"/>
+            <a:tailEnd type="triangle"/>
+          </a:ln>
+        </p:spPr>
+        <p:style>
+          <a:lnRef idx="1">
+            <a:schemeClr val="accent1"/>
+          </a:lnRef>
+          <a:fillRef idx="0">
+            <a:schemeClr val="accent1"/>
+          </a:fillRef>
+          <a:effectRef idx="0">
+            <a:schemeClr val="accent1"/>
+          </a:effectRef>
+          <a:fontRef idx="minor">
+            <a:schemeClr val="tx1"/>
+          </a:fontRef>
+        </p:style>
+      </p:cxnSp>
+      <p:pic>
+        <p:nvPicPr>
+          <p:cNvPr id="7" name="Picture 6">
+            <a:extLst>
+              <a:ext uri="{FF2B5EF4-FFF2-40B4-BE49-F238E27FC236}">
+                <a16:creationId xmlns:a16="http://schemas.microsoft.com/office/drawing/2014/main" id="{9FBB5717-FFB8-1B36-88B0-33478CCA1782}"/>
+              </a:ext>
+            </a:extLst>
+          </p:cNvPr>
+          <p:cNvPicPr>
+            <a:picLocks noChangeAspect="1"/>
+          </p:cNvPicPr>
+          <p:nvPr/>
+        </p:nvPicPr>
+        <p:blipFill>
+          <a:blip r:embed="rId2">
+            <a:extLst>
+              <a:ext uri="{837473B0-CC2E-450A-ABE3-18F120FF3D39}">
+                <a1611:picAttrSrcUrl xmlns:a1611="http://schemas.microsoft.com/office/drawing/2016/11/main" r:id="rId3"/>
+              </a:ext>
+            </a:extLst>
+          </a:blip>
+          <a:stretch>
+            <a:fillRect/>
+          </a:stretch>
+        </p:blipFill>
+        <p:spPr>
+          <a:xfrm>
+            <a:off x="1472993" y="4502552"/>
+            <a:ext cx="2104664" cy="701555"/>
+          </a:xfrm>
+          <a:prstGeom prst="rect">
+            <a:avLst/>
+          </a:prstGeom>
+        </p:spPr>
+      </p:pic>
+      <p:pic>
+        <p:nvPicPr>
+          <p:cNvPr id="10" name="Picture 9">
+            <a:extLst>
+              <a:ext uri="{FF2B5EF4-FFF2-40B4-BE49-F238E27FC236}">
+                <a16:creationId xmlns:a16="http://schemas.microsoft.com/office/drawing/2014/main" id="{26FA43A1-D918-4FB8-F018-9273CBAB1073}"/>
+              </a:ext>
+            </a:extLst>
+          </p:cNvPr>
+          <p:cNvPicPr>
+            <a:picLocks noChangeAspect="1"/>
+          </p:cNvPicPr>
+          <p:nvPr/>
+        </p:nvPicPr>
+        <p:blipFill>
+          <a:blip r:embed="rId4">
+            <a:extLst>
+              <a:ext uri="{837473B0-CC2E-450A-ABE3-18F120FF3D39}">
+                <a1611:picAttrSrcUrl xmlns:a1611="http://schemas.microsoft.com/office/drawing/2016/11/main" r:id="rId5"/>
+              </a:ext>
+            </a:extLst>
+          </a:blip>
+          <a:stretch>
+            <a:fillRect/>
+          </a:stretch>
+        </p:blipFill>
+        <p:spPr>
+          <a:xfrm>
+            <a:off x="4682973" y="4528388"/>
+            <a:ext cx="1949320" cy="825109"/>
+          </a:xfrm>
+          <a:prstGeom prst="rect">
+            <a:avLst/>
+          </a:prstGeom>
+        </p:spPr>
+      </p:pic>
+      <p:pic>
+        <p:nvPicPr>
+          <p:cNvPr id="14" name="Picture 13">
+            <a:extLst>
+              <a:ext uri="{FF2B5EF4-FFF2-40B4-BE49-F238E27FC236}">
+                <a16:creationId xmlns:a16="http://schemas.microsoft.com/office/drawing/2014/main" id="{1322A017-9747-114F-E198-858384E06E44}"/>
+              </a:ext>
+            </a:extLst>
+          </p:cNvPr>
+          <p:cNvPicPr>
+            <a:picLocks noChangeAspect="1"/>
+          </p:cNvPicPr>
+          <p:nvPr/>
+        </p:nvPicPr>
+        <p:blipFill>
+          <a:blip r:embed="rId6">
+            <a:extLst>
+              <a:ext uri="{837473B0-CC2E-450A-ABE3-18F120FF3D39}">
+                <a1611:picAttrSrcUrl xmlns:a1611="http://schemas.microsoft.com/office/drawing/2016/11/main" r:id="rId7"/>
+              </a:ext>
+            </a:extLst>
+          </a:blip>
+          <a:stretch>
+            <a:fillRect/>
+          </a:stretch>
+        </p:blipFill>
+        <p:spPr>
+          <a:xfrm>
+            <a:off x="4422349" y="5245542"/>
+            <a:ext cx="1307119" cy="470665"/>
+          </a:xfrm>
+          <a:prstGeom prst="rect">
+            <a:avLst/>
+          </a:prstGeom>
+        </p:spPr>
+      </p:pic>
+      <p:pic>
+        <p:nvPicPr>
+          <p:cNvPr id="1026" name="Picture 2" descr="ASP.NET Core Swagger UI Authorization using IdentityServer4">
+            <a:extLst>
+              <a:ext uri="{FF2B5EF4-FFF2-40B4-BE49-F238E27FC236}">
+                <a16:creationId xmlns:a16="http://schemas.microsoft.com/office/drawing/2014/main" id="{B2801583-882F-0CF8-65C2-696EF09474BC}"/>
+              </a:ext>
+            </a:extLst>
+          </p:cNvPr>
+          <p:cNvPicPr>
+            <a:picLocks noChangeAspect="1" noChangeArrowheads="1"/>
+          </p:cNvPicPr>
+          <p:nvPr/>
+        </p:nvPicPr>
+        <p:blipFill>
+          <a:blip r:embed="rId8">
+            <a:extLst>
+              <a:ext uri="{28A0092B-C50C-407E-A947-70E740481C1C}">
+                <a14:useLocalDpi xmlns:a14="http://schemas.microsoft.com/office/drawing/2010/main" val="0"/>
+              </a:ext>
+            </a:extLst>
+          </a:blip>
+          <a:srcRect/>
+          <a:stretch>
+            <a:fillRect/>
+          </a:stretch>
+        </p:blipFill>
+        <p:spPr bwMode="auto">
+          <a:xfrm>
+            <a:off x="4077306" y="6006341"/>
+            <a:ext cx="1211333" cy="339110"/>
+          </a:xfrm>
+          <a:prstGeom prst="rect">
+            <a:avLst/>
+          </a:prstGeom>
+          <a:noFill/>
+          <a:extLst>
+            <a:ext uri="{909E8E84-426E-40DD-AFC4-6F175D3DCCD1}">
+              <a14:hiddenFill xmlns:a14="http://schemas.microsoft.com/office/drawing/2010/main">
+                <a:solidFill>
+                  <a:srgbClr val="FFFFFF"/>
+                </a:solidFill>
+              </a14:hiddenFill>
+            </a:ext>
+          </a:extLst>
+        </p:spPr>
+      </p:pic>
+      <p:pic>
+        <p:nvPicPr>
+          <p:cNvPr id="1028" name="Picture 4" descr="Uvicorn">
+            <a:extLst>
+              <a:ext uri="{FF2B5EF4-FFF2-40B4-BE49-F238E27FC236}">
+                <a16:creationId xmlns:a16="http://schemas.microsoft.com/office/drawing/2014/main" id="{6AE93329-191D-F7D3-0413-5640B666C312}"/>
+              </a:ext>
+            </a:extLst>
+          </p:cNvPr>
+          <p:cNvPicPr>
+            <a:picLocks noChangeAspect="1" noChangeArrowheads="1"/>
+          </p:cNvPicPr>
+          <p:nvPr/>
+        </p:nvPicPr>
+        <p:blipFill>
+          <a:blip r:embed="rId9">
+            <a:extLst>
+              <a:ext uri="{28A0092B-C50C-407E-A947-70E740481C1C}">
+                <a14:useLocalDpi xmlns:a14="http://schemas.microsoft.com/office/drawing/2010/main" val="0"/>
+              </a:ext>
+            </a:extLst>
+          </a:blip>
+          <a:srcRect/>
+          <a:stretch>
+            <a:fillRect/>
+          </a:stretch>
+        </p:blipFill>
+        <p:spPr bwMode="auto">
+          <a:xfrm>
+            <a:off x="5832609" y="5343276"/>
+            <a:ext cx="1002175" cy="1002175"/>
+          </a:xfrm>
+          <a:prstGeom prst="rect">
+            <a:avLst/>
+          </a:prstGeom>
+          <a:noFill/>
+          <a:extLst>
+            <a:ext uri="{909E8E84-426E-40DD-AFC4-6F175D3DCCD1}">
+              <a14:hiddenFill xmlns:a14="http://schemas.microsoft.com/office/drawing/2010/main">
+                <a:solidFill>
+                  <a:srgbClr val="FFFFFF"/>
+                </a:solidFill>
+              </a14:hiddenFill>
+            </a:ext>
+          </a:extLst>
+        </p:spPr>
+      </p:pic>
+      <p:pic>
+        <p:nvPicPr>
+          <p:cNvPr id="17" name="Picture 16">
+            <a:extLst>
+              <a:ext uri="{FF2B5EF4-FFF2-40B4-BE49-F238E27FC236}">
+                <a16:creationId xmlns:a16="http://schemas.microsoft.com/office/drawing/2014/main" id="{8ABFBB73-59F9-F52E-8CAB-42AB47C53B87}"/>
+              </a:ext>
+            </a:extLst>
+          </p:cNvPr>
+          <p:cNvPicPr>
+            <a:picLocks noChangeAspect="1"/>
+          </p:cNvPicPr>
+          <p:nvPr/>
+        </p:nvPicPr>
+        <p:blipFill>
+          <a:blip r:embed="rId10">
+            <a:extLst>
+              <a:ext uri="{837473B0-CC2E-450A-ABE3-18F120FF3D39}">
+                <a1611:picAttrSrcUrl xmlns:a1611="http://schemas.microsoft.com/office/drawing/2016/11/main" r:id="rId11"/>
+              </a:ext>
+            </a:extLst>
+          </a:blip>
+          <a:stretch>
+            <a:fillRect/>
+          </a:stretch>
+        </p:blipFill>
+        <p:spPr>
+          <a:xfrm>
+            <a:off x="7794677" y="4602785"/>
+            <a:ext cx="1002175" cy="1002175"/>
+          </a:xfrm>
+          <a:prstGeom prst="rect">
+            <a:avLst/>
+          </a:prstGeom>
+        </p:spPr>
+      </p:pic>
+      <p:pic>
+        <p:nvPicPr>
+          <p:cNvPr id="20" name="Picture 19">
+            <a:extLst>
+              <a:ext uri="{FF2B5EF4-FFF2-40B4-BE49-F238E27FC236}">
+                <a16:creationId xmlns:a16="http://schemas.microsoft.com/office/drawing/2014/main" id="{0B297013-2CBB-F79B-2FC0-C17C833EFFCE}"/>
+              </a:ext>
+            </a:extLst>
+          </p:cNvPr>
+          <p:cNvPicPr>
+            <a:picLocks noChangeAspect="1"/>
+          </p:cNvPicPr>
+          <p:nvPr/>
+        </p:nvPicPr>
+        <p:blipFill>
+          <a:blip r:embed="rId12">
+            <a:extLst>
+              <a:ext uri="{837473B0-CC2E-450A-ABE3-18F120FF3D39}">
+                <a1611:picAttrSrcUrl xmlns:a1611="http://schemas.microsoft.com/office/drawing/2016/11/main" r:id="rId13"/>
+              </a:ext>
+            </a:extLst>
+          </a:blip>
+          <a:stretch>
+            <a:fillRect/>
+          </a:stretch>
+        </p:blipFill>
+        <p:spPr>
+          <a:xfrm>
+            <a:off x="8513383" y="4488946"/>
+            <a:ext cx="2114106" cy="1321316"/>
+          </a:xfrm>
+          <a:prstGeom prst="rect">
+            <a:avLst/>
+          </a:prstGeom>
+        </p:spPr>
+      </p:pic>
+    </p:spTree>
+    <p:extLst>
+      <p:ext uri="{BB962C8B-B14F-4D97-AF65-F5344CB8AC3E}">
+        <p14:creationId xmlns:p14="http://schemas.microsoft.com/office/powerpoint/2010/main" val="731463829"/>
+      </p:ext>
+    </p:extLst>
+  </p:cSld>
+  <p:clrMapOvr>
+    <a:masterClrMapping/>
+  </p:clrMapOvr>
+</p:sld>
+</file>
+
+<file path=ppt/slides/slide32.xml><?xml version="1.0" encoding="utf-8"?>
+<p:sld xmlns:a="http://schemas.openxmlformats.org/drawingml/2006/main" xmlns:r="http://schemas.openxmlformats.org/officeDocument/2006/relationships" xmlns:p="http://schemas.openxmlformats.org/presentationml/2006/main">
+  <p:cSld>
+    <p:spTree>
+      <p:nvGrpSpPr>
+        <p:cNvPr id="1" name=""/>
+        <p:cNvGrpSpPr/>
+        <p:nvPr/>
+      </p:nvGrpSpPr>
+      <p:grpSpPr>
+        <a:xfrm>
+          <a:off x="0" y="0"/>
+          <a:ext cx="0" cy="0"/>
+          <a:chOff x="0" y="0"/>
+          <a:chExt cx="0" cy="0"/>
+        </a:xfrm>
+      </p:grpSpPr>
+      <p:sp>
+        <p:nvSpPr>
+          <p:cNvPr id="2" name="Title 1">
+            <a:extLst>
+              <a:ext uri="{FF2B5EF4-FFF2-40B4-BE49-F238E27FC236}">
+                <a16:creationId xmlns:a16="http://schemas.microsoft.com/office/drawing/2014/main" id="{5FCAE98A-1FA7-F640-BC7F-9C11658500D7}"/>
+              </a:ext>
+            </a:extLst>
+          </p:cNvPr>
+          <p:cNvSpPr>
+            <a:spLocks noGrp="1"/>
+          </p:cNvSpPr>
+          <p:nvPr>
+            <p:ph type="title"/>
+          </p:nvPr>
+        </p:nvSpPr>
+        <p:spPr>
+          <a:xfrm>
+            <a:off x="2231136" y="2834640"/>
+            <a:ext cx="7729728" cy="1188720"/>
+          </a:xfrm>
+        </p:spPr>
+        <p:txBody>
+          <a:bodyPr/>
+          <a:lstStyle/>
+          <a:p>
+            <a:r>
+              <a:rPr lang="en-US" dirty="0" err="1"/>
+              <a:t>Revisión</a:t>
+            </a:r>
+            <a:r>
+              <a:rPr lang="en-US" dirty="0"/>
+              <a:t> del </a:t>
+            </a:r>
+            <a:r>
+              <a:rPr lang="en-US" dirty="0" err="1"/>
+              <a:t>código</a:t>
+            </a:r>
+            <a:endParaRPr lang="en-CR" dirty="0"/>
+          </a:p>
+        </p:txBody>
+      </p:sp>
+      <p:sp>
+        <p:nvSpPr>
+          <p:cNvPr id="3" name="Slide Number Placeholder 2">
+            <a:extLst>
+              <a:ext uri="{FF2B5EF4-FFF2-40B4-BE49-F238E27FC236}">
+                <a16:creationId xmlns:a16="http://schemas.microsoft.com/office/drawing/2014/main" id="{1DECACD6-7120-4E4A-BB11-C58BCD3D0F9A}"/>
+              </a:ext>
+            </a:extLst>
+          </p:cNvPr>
+          <p:cNvSpPr>
+            <a:spLocks noGrp="1"/>
+          </p:cNvSpPr>
+          <p:nvPr>
+            <p:ph type="sldNum" sz="quarter" idx="12"/>
+          </p:nvPr>
+        </p:nvSpPr>
+        <p:spPr/>
+        <p:txBody>
+          <a:bodyPr/>
+          <a:lstStyle/>
+          <a:p>
+            <a:fld id="{4FAB73BC-B049-4115-A692-8D63A059BFB8}" type="slidenum">
+              <a:rPr lang="en-US" smtClean="0"/>
+              <a:pPr/>
+              <a:t>32</a:t>
+            </a:fld>
+            <a:endParaRPr lang="en-US" dirty="0"/>
+          </a:p>
+        </p:txBody>
+      </p:sp>
+    </p:spTree>
+    <p:extLst>
+      <p:ext uri="{BB962C8B-B14F-4D97-AF65-F5344CB8AC3E}">
+        <p14:creationId xmlns:p14="http://schemas.microsoft.com/office/powerpoint/2010/main" val="1257853938"/>
+      </p:ext>
+    </p:extLst>
+  </p:cSld>
+  <p:clrMapOvr>
+    <a:masterClrMapping/>
+  </p:clrMapOvr>
+</p:sld>
+</file>
+
+<file path=ppt/slides/slide33.xml><?xml version="1.0" encoding="utf-8"?>
+<p:sld xmlns:a="http://schemas.openxmlformats.org/drawingml/2006/main" xmlns:r="http://schemas.openxmlformats.org/officeDocument/2006/relationships" xmlns:p="http://schemas.openxmlformats.org/presentationml/2006/main">
+  <p:cSld>
+    <p:spTree>
+      <p:nvGrpSpPr>
+        <p:cNvPr id="1" name=""/>
+        <p:cNvGrpSpPr/>
+        <p:nvPr/>
+      </p:nvGrpSpPr>
+      <p:grpSpPr>
+        <a:xfrm>
+          <a:off x="0" y="0"/>
+          <a:ext cx="0" cy="0"/>
+          <a:chOff x="0" y="0"/>
+          <a:chExt cx="0" cy="0"/>
+        </a:xfrm>
+      </p:grpSpPr>
+      <p:sp>
+        <p:nvSpPr>
+          <p:cNvPr id="2" name="Title 1">
+            <a:extLst>
+              <a:ext uri="{FF2B5EF4-FFF2-40B4-BE49-F238E27FC236}">
+                <a16:creationId xmlns:a16="http://schemas.microsoft.com/office/drawing/2014/main" id="{5FCAE98A-1FA7-F640-BC7F-9C11658500D7}"/>
+              </a:ext>
+            </a:extLst>
+          </p:cNvPr>
+          <p:cNvSpPr>
+            <a:spLocks noGrp="1"/>
+          </p:cNvSpPr>
+          <p:nvPr>
+            <p:ph type="title"/>
+          </p:nvPr>
+        </p:nvSpPr>
+        <p:spPr/>
+        <p:txBody>
+          <a:bodyPr/>
+          <a:lstStyle/>
+          <a:p>
+            <a:r>
+              <a:rPr lang="en-US" dirty="0"/>
+              <a:t>Docker Compose</a:t>
+            </a:r>
+            <a:endParaRPr lang="en-CR" dirty="0"/>
+          </a:p>
+        </p:txBody>
+      </p:sp>
+      <p:sp>
+        <p:nvSpPr>
+          <p:cNvPr id="3" name="Slide Number Placeholder 2">
+            <a:extLst>
+              <a:ext uri="{FF2B5EF4-FFF2-40B4-BE49-F238E27FC236}">
+                <a16:creationId xmlns:a16="http://schemas.microsoft.com/office/drawing/2014/main" id="{1DECACD6-7120-4E4A-BB11-C58BCD3D0F9A}"/>
+              </a:ext>
+            </a:extLst>
+          </p:cNvPr>
+          <p:cNvSpPr>
+            <a:spLocks noGrp="1"/>
+          </p:cNvSpPr>
+          <p:nvPr>
+            <p:ph type="sldNum" sz="quarter" idx="12"/>
+          </p:nvPr>
+        </p:nvSpPr>
+        <p:spPr/>
+        <p:txBody>
+          <a:bodyPr/>
+          <a:lstStyle/>
+          <a:p>
+            <a:fld id="{4FAB73BC-B049-4115-A692-8D63A059BFB8}" type="slidenum">
+              <a:rPr lang="en-US" smtClean="0"/>
+              <a:pPr/>
+              <a:t>33</a:t>
+            </a:fld>
+            <a:endParaRPr lang="en-US" dirty="0"/>
+          </a:p>
+        </p:txBody>
+      </p:sp>
+      <p:sp>
+        <p:nvSpPr>
+          <p:cNvPr id="4" name="TextBox 3">
+            <a:extLst>
+              <a:ext uri="{FF2B5EF4-FFF2-40B4-BE49-F238E27FC236}">
+                <a16:creationId xmlns:a16="http://schemas.microsoft.com/office/drawing/2014/main" id="{DAD0A73E-BB2B-4D41-8529-C5C2D3838AE0}"/>
+              </a:ext>
+            </a:extLst>
+          </p:cNvPr>
+          <p:cNvSpPr txBox="1"/>
+          <p:nvPr/>
+        </p:nvSpPr>
+        <p:spPr>
+          <a:xfrm>
+            <a:off x="945267" y="2828835"/>
+            <a:ext cx="4066571" cy="1477328"/>
+          </a:xfrm>
+          <a:prstGeom prst="rect">
+            <a:avLst/>
+          </a:prstGeom>
+          <a:noFill/>
+        </p:spPr>
+        <p:txBody>
+          <a:bodyPr wrap="square" rtlCol="0">
+            <a:spAutoFit/>
+          </a:bodyPr>
+          <a:lstStyle/>
+          <a:p>
+            <a:pPr marL="285750" indent="-285750">
+              <a:buFont typeface="Arial" panose="020B0604020202020204" pitchFamily="34" charset="0"/>
+              <a:buChar char="•"/>
+            </a:pPr>
+            <a:r>
+              <a:rPr lang="en-CR" dirty="0"/>
+              <a:t>Contruir y desplegar aplicaciones con múltiples contenedores</a:t>
+            </a:r>
+          </a:p>
+          <a:p>
+            <a:pPr marL="285750" indent="-285750">
+              <a:buFont typeface="Arial" panose="020B0604020202020204" pitchFamily="34" charset="0"/>
+              <a:buChar char="•"/>
+            </a:pPr>
+            <a:r>
+              <a:rPr lang="en-CR" dirty="0"/>
+              <a:t>Definición del la arquitectura de servicios en un solo archivo YAML</a:t>
+            </a:r>
+          </a:p>
+          <a:p>
+            <a:pPr marL="285750" indent="-285750">
+              <a:buFont typeface="Arial" panose="020B0604020202020204" pitchFamily="34" charset="0"/>
+              <a:buChar char="•"/>
+            </a:pPr>
+            <a:r>
+              <a:rPr lang="en-CR" dirty="0"/>
+              <a:t>Promueve la seguridad y el aislamiento</a:t>
+            </a:r>
+          </a:p>
+        </p:txBody>
+      </p:sp>
+      <p:sp>
+        <p:nvSpPr>
+          <p:cNvPr id="7" name="TextBox 6">
+            <a:extLst>
+              <a:ext uri="{FF2B5EF4-FFF2-40B4-BE49-F238E27FC236}">
+                <a16:creationId xmlns:a16="http://schemas.microsoft.com/office/drawing/2014/main" id="{9C38E5C3-58DD-AB4D-8C70-7C331ADA6BBE}"/>
+              </a:ext>
+            </a:extLst>
+          </p:cNvPr>
+          <p:cNvSpPr txBox="1"/>
+          <p:nvPr/>
+        </p:nvSpPr>
+        <p:spPr>
+          <a:xfrm>
+            <a:off x="5593647" y="6490590"/>
+            <a:ext cx="5679191" cy="276999"/>
+          </a:xfrm>
+          <a:prstGeom prst="rect">
+            <a:avLst/>
+          </a:prstGeom>
+          <a:noFill/>
+        </p:spPr>
+        <p:txBody>
+          <a:bodyPr wrap="square">
+            <a:spAutoFit/>
+          </a:bodyPr>
+          <a:lstStyle/>
+          <a:p>
+            <a:r>
+              <a:rPr lang="en-US" sz="1200" dirty="0">
+                <a:solidFill>
+                  <a:schemeClr val="tx2"/>
+                </a:solidFill>
+              </a:rPr>
+              <a:t>http://</a:t>
+            </a:r>
+            <a:r>
+              <a:rPr lang="en-US" sz="1200" dirty="0" err="1">
+                <a:solidFill>
+                  <a:schemeClr val="tx2"/>
+                </a:solidFill>
+              </a:rPr>
+              <a:t>img.scoop.it</a:t>
+            </a:r>
+            <a:r>
+              <a:rPr lang="en-US" sz="1200" dirty="0">
+                <a:solidFill>
+                  <a:schemeClr val="tx2"/>
+                </a:solidFill>
+              </a:rPr>
+              <a:t>/bmExZyvGWidultcwx9hCb7nTzqrqzN7Y9aBZTaXoQ8Q=</a:t>
+            </a:r>
+            <a:endParaRPr lang="en-CR" sz="1200" dirty="0">
+              <a:solidFill>
+                <a:schemeClr val="tx2"/>
+              </a:solidFill>
+            </a:endParaRPr>
+          </a:p>
+        </p:txBody>
+      </p:sp>
+      <p:pic>
+        <p:nvPicPr>
+          <p:cNvPr id="3074" name="Picture 2" descr="Docker Bridge Network Driver">
+            <a:extLst>
+              <a:ext uri="{FF2B5EF4-FFF2-40B4-BE49-F238E27FC236}">
+                <a16:creationId xmlns:a16="http://schemas.microsoft.com/office/drawing/2014/main" id="{B3E9E4B2-D939-C074-54AE-B189235398FA}"/>
+              </a:ext>
+            </a:extLst>
+          </p:cNvPr>
+          <p:cNvPicPr>
+            <a:picLocks noChangeAspect="1" noChangeArrowheads="1"/>
+          </p:cNvPicPr>
+          <p:nvPr/>
+        </p:nvPicPr>
+        <p:blipFill>
+          <a:blip r:embed="rId2">
+            <a:extLst>
+              <a:ext uri="{28A0092B-C50C-407E-A947-70E740481C1C}">
+                <a14:useLocalDpi xmlns:a14="http://schemas.microsoft.com/office/drawing/2010/main" val="0"/>
+              </a:ext>
+            </a:extLst>
+          </a:blip>
+          <a:srcRect/>
+          <a:stretch>
+            <a:fillRect/>
+          </a:stretch>
+        </p:blipFill>
+        <p:spPr bwMode="auto">
+          <a:xfrm>
+            <a:off x="6096000" y="2426082"/>
+            <a:ext cx="4066570" cy="3791838"/>
+          </a:xfrm>
+          <a:prstGeom prst="rect">
+            <a:avLst/>
+          </a:prstGeom>
+          <a:noFill/>
+          <a:extLst>
+            <a:ext uri="{909E8E84-426E-40DD-AFC4-6F175D3DCCD1}">
+              <a14:hiddenFill xmlns:a14="http://schemas.microsoft.com/office/drawing/2010/main">
+                <a:solidFill>
+                  <a:srgbClr val="FFFFFF"/>
+                </a:solidFill>
+              </a14:hiddenFill>
+            </a:ext>
+          </a:extLst>
+        </p:spPr>
+      </p:pic>
+      <p:sp>
+        <p:nvSpPr>
+          <p:cNvPr id="10" name="TextBox 9">
+            <a:extLst>
+              <a:ext uri="{FF2B5EF4-FFF2-40B4-BE49-F238E27FC236}">
+                <a16:creationId xmlns:a16="http://schemas.microsoft.com/office/drawing/2014/main" id="{8D154070-1890-C394-0775-95D3E5722A3F}"/>
+              </a:ext>
+            </a:extLst>
+          </p:cNvPr>
+          <p:cNvSpPr txBox="1"/>
+          <p:nvPr/>
+        </p:nvSpPr>
+        <p:spPr>
+          <a:xfrm>
+            <a:off x="192881" y="6400800"/>
+            <a:ext cx="6100762" cy="323165"/>
+          </a:xfrm>
+          <a:prstGeom prst="rect">
+            <a:avLst/>
+          </a:prstGeom>
+          <a:noFill/>
+        </p:spPr>
+        <p:txBody>
+          <a:bodyPr wrap="square">
+            <a:spAutoFit/>
+          </a:bodyPr>
+          <a:lstStyle/>
+          <a:p>
+            <a:r>
+              <a:rPr lang="en-CR" sz="1500" dirty="0">
+                <a:hlinkClick r:id="rId3"/>
+              </a:rPr>
+              <a:t>https://docs.docker.com/compose/</a:t>
+            </a:r>
+            <a:r>
+              <a:rPr lang="en-CR" sz="1500" dirty="0"/>
+              <a:t> </a:t>
+            </a:r>
+          </a:p>
+        </p:txBody>
+      </p:sp>
+    </p:spTree>
+    <p:extLst>
+      <p:ext uri="{BB962C8B-B14F-4D97-AF65-F5344CB8AC3E}">
+        <p14:creationId xmlns:p14="http://schemas.microsoft.com/office/powerpoint/2010/main" val="3744451892"/>
+      </p:ext>
+    </p:extLst>
+  </p:cSld>
+  <p:clrMapOvr>
+    <a:masterClrMapping/>
+  </p:clrMapOvr>
+</p:sld>
+</file>
+
+<file path=ppt/slides/slide34.xml><?xml version="1.0" encoding="utf-8"?>
+<p:sld xmlns:a="http://schemas.openxmlformats.org/drawingml/2006/main" xmlns:r="http://schemas.openxmlformats.org/officeDocument/2006/relationships" xmlns:p="http://schemas.openxmlformats.org/presentationml/2006/main">
+  <p:cSld>
+    <p:spTree>
+      <p:nvGrpSpPr>
+        <p:cNvPr id="1" name=""/>
+        <p:cNvGrpSpPr/>
+        <p:nvPr/>
+      </p:nvGrpSpPr>
+      <p:grpSpPr>
+        <a:xfrm>
+          <a:off x="0" y="0"/>
+          <a:ext cx="0" cy="0"/>
+          <a:chOff x="0" y="0"/>
+          <a:chExt cx="0" cy="0"/>
+        </a:xfrm>
+      </p:grpSpPr>
+      <p:sp>
+        <p:nvSpPr>
+          <p:cNvPr id="2" name="Title 1">
+            <a:extLst>
+              <a:ext uri="{FF2B5EF4-FFF2-40B4-BE49-F238E27FC236}">
+                <a16:creationId xmlns:a16="http://schemas.microsoft.com/office/drawing/2014/main" id="{5FCAE98A-1FA7-F640-BC7F-9C11658500D7}"/>
+              </a:ext>
+            </a:extLst>
+          </p:cNvPr>
+          <p:cNvSpPr>
+            <a:spLocks noGrp="1"/>
+          </p:cNvSpPr>
+          <p:nvPr>
+            <p:ph type="title"/>
+          </p:nvPr>
+        </p:nvSpPr>
+        <p:spPr>
+          <a:xfrm>
+            <a:off x="2231136" y="2834640"/>
+            <a:ext cx="7729728" cy="1188720"/>
+          </a:xfrm>
+        </p:spPr>
+        <p:txBody>
+          <a:bodyPr/>
+          <a:lstStyle/>
+          <a:p>
+            <a:r>
+              <a:rPr lang="en-US" dirty="0" err="1"/>
+              <a:t>Volvamos</a:t>
+            </a:r>
+            <a:r>
+              <a:rPr lang="en-US" dirty="0"/>
+              <a:t> al </a:t>
+            </a:r>
+            <a:r>
+              <a:rPr lang="en-US" dirty="0" err="1"/>
+              <a:t>código</a:t>
+            </a:r>
+            <a:endParaRPr lang="en-CR" dirty="0"/>
+          </a:p>
+        </p:txBody>
+      </p:sp>
+      <p:sp>
+        <p:nvSpPr>
+          <p:cNvPr id="3" name="Slide Number Placeholder 2">
+            <a:extLst>
+              <a:ext uri="{FF2B5EF4-FFF2-40B4-BE49-F238E27FC236}">
+                <a16:creationId xmlns:a16="http://schemas.microsoft.com/office/drawing/2014/main" id="{1DECACD6-7120-4E4A-BB11-C58BCD3D0F9A}"/>
+              </a:ext>
+            </a:extLst>
+          </p:cNvPr>
+          <p:cNvSpPr>
+            <a:spLocks noGrp="1"/>
+          </p:cNvSpPr>
+          <p:nvPr>
+            <p:ph type="sldNum" sz="quarter" idx="12"/>
+          </p:nvPr>
+        </p:nvSpPr>
+        <p:spPr/>
+        <p:txBody>
+          <a:bodyPr/>
+          <a:lstStyle/>
+          <a:p>
+            <a:fld id="{4FAB73BC-B049-4115-A692-8D63A059BFB8}" type="slidenum">
+              <a:rPr lang="en-US" smtClean="0"/>
+              <a:pPr/>
+              <a:t>34</a:t>
+            </a:fld>
+            <a:endParaRPr lang="en-US" dirty="0"/>
+          </a:p>
+        </p:txBody>
+      </p:sp>
+    </p:spTree>
+    <p:extLst>
+      <p:ext uri="{BB962C8B-B14F-4D97-AF65-F5344CB8AC3E}">
+        <p14:creationId xmlns:p14="http://schemas.microsoft.com/office/powerpoint/2010/main" val="1687947566"/>
+      </p:ext>
+    </p:extLst>
+  </p:cSld>
+  <p:clrMapOvr>
+    <a:masterClrMapping/>
+  </p:clrMapOvr>
+</p:sld>
+</file>
+
+<file path=ppt/slides/slide35.xml><?xml version="1.0" encoding="utf-8"?>
+<p:sld xmlns:a="http://schemas.openxmlformats.org/drawingml/2006/main" xmlns:r="http://schemas.openxmlformats.org/officeDocument/2006/relationships" xmlns:p="http://schemas.openxmlformats.org/presentationml/2006/main">
+  <p:cSld>
+    <p:spTree>
+      <p:nvGrpSpPr>
+        <p:cNvPr id="1" name=""/>
+        <p:cNvGrpSpPr/>
+        <p:nvPr/>
+      </p:nvGrpSpPr>
+      <p:grpSpPr>
+        <a:xfrm>
+          <a:off x="0" y="0"/>
+          <a:ext cx="0" cy="0"/>
+          <a:chOff x="0" y="0"/>
+          <a:chExt cx="0" cy="0"/>
+        </a:xfrm>
+      </p:grpSpPr>
+      <p:sp>
+        <p:nvSpPr>
+          <p:cNvPr id="2" name="Title 1">
+            <a:extLst>
+              <a:ext uri="{FF2B5EF4-FFF2-40B4-BE49-F238E27FC236}">
+                <a16:creationId xmlns:a16="http://schemas.microsoft.com/office/drawing/2014/main" id="{5FCAE98A-1FA7-F640-BC7F-9C11658500D7}"/>
+              </a:ext>
+            </a:extLst>
+          </p:cNvPr>
+          <p:cNvSpPr>
+            <a:spLocks noGrp="1"/>
+          </p:cNvSpPr>
+          <p:nvPr>
+            <p:ph type="title"/>
+          </p:nvPr>
+        </p:nvSpPr>
+        <p:spPr>
+          <a:xfrm>
+            <a:off x="2231136" y="2834640"/>
+            <a:ext cx="7729728" cy="1188720"/>
+          </a:xfrm>
+        </p:spPr>
+        <p:txBody>
+          <a:bodyPr/>
+          <a:lstStyle/>
+          <a:p>
+            <a:r>
+              <a:rPr lang="en-US" dirty="0"/>
+              <a:t>¡</a:t>
+            </a:r>
+            <a:r>
+              <a:rPr lang="en-US" dirty="0" err="1"/>
+              <a:t>Muchas</a:t>
+            </a:r>
+            <a:r>
+              <a:rPr lang="en-US" dirty="0"/>
+              <a:t> gracias!</a:t>
+            </a:r>
+            <a:endParaRPr lang="en-CR" dirty="0"/>
+          </a:p>
+        </p:txBody>
+      </p:sp>
+      <p:sp>
+        <p:nvSpPr>
+          <p:cNvPr id="3" name="Slide Number Placeholder 2">
+            <a:extLst>
+              <a:ext uri="{FF2B5EF4-FFF2-40B4-BE49-F238E27FC236}">
+                <a16:creationId xmlns:a16="http://schemas.microsoft.com/office/drawing/2014/main" id="{1DECACD6-7120-4E4A-BB11-C58BCD3D0F9A}"/>
+              </a:ext>
+            </a:extLst>
+          </p:cNvPr>
+          <p:cNvSpPr>
+            <a:spLocks noGrp="1"/>
+          </p:cNvSpPr>
+          <p:nvPr>
+            <p:ph type="sldNum" sz="quarter" idx="12"/>
+          </p:nvPr>
+        </p:nvSpPr>
+        <p:spPr/>
+        <p:txBody>
+          <a:bodyPr/>
+          <a:lstStyle/>
+          <a:p>
+            <a:fld id="{4FAB73BC-B049-4115-A692-8D63A059BFB8}" type="slidenum">
+              <a:rPr lang="en-US" smtClean="0"/>
+              <a:pPr/>
+              <a:t>35</a:t>
+            </a:fld>
+            <a:endParaRPr lang="en-US" dirty="0"/>
+          </a:p>
+        </p:txBody>
+      </p:sp>
+    </p:spTree>
+    <p:extLst>
+      <p:ext uri="{BB962C8B-B14F-4D97-AF65-F5344CB8AC3E}">
+        <p14:creationId xmlns:p14="http://schemas.microsoft.com/office/powerpoint/2010/main" val="1990433902"/>
       </p:ext>
     </p:extLst>
   </p:cSld>

</xml_diff>

<commit_message>
NEW: Updated pptx week 1 and initial pptx week 3
</commit_message>
<xml_diff>
--- a/week 1/week_1_intro.pptx
+++ b/week 1/week_1_intro.pptx
@@ -5,7 +5,7 @@
     <p:sldMasterId id="2147483972" r:id="rId1"/>
   </p:sldMasterIdLst>
   <p:notesMasterIdLst>
-    <p:notesMasterId r:id="rId37"/>
+    <p:notesMasterId r:id="rId38"/>
   </p:notesMasterIdLst>
   <p:sldIdLst>
     <p:sldId id="256" r:id="rId2"/>
@@ -37,12 +37,13 @@
     <p:sldId id="282" r:id="rId28"/>
     <p:sldId id="283" r:id="rId29"/>
     <p:sldId id="284" r:id="rId30"/>
-    <p:sldId id="285" r:id="rId31"/>
-    <p:sldId id="286" r:id="rId32"/>
-    <p:sldId id="287" r:id="rId33"/>
-    <p:sldId id="288" r:id="rId34"/>
-    <p:sldId id="289" r:id="rId35"/>
-    <p:sldId id="290" r:id="rId36"/>
+    <p:sldId id="291" r:id="rId31"/>
+    <p:sldId id="285" r:id="rId32"/>
+    <p:sldId id="286" r:id="rId33"/>
+    <p:sldId id="287" r:id="rId34"/>
+    <p:sldId id="288" r:id="rId35"/>
+    <p:sldId id="289" r:id="rId36"/>
+    <p:sldId id="290" r:id="rId37"/>
   </p:sldIdLst>
   <p:sldSz cx="12192000" cy="6858000"/>
   <p:notesSz cx="6858000" cy="9144000"/>
@@ -231,7 +232,7 @@
           <a:p>
             <a:fld id="{19356E6C-AC99-594F-A973-00A5B63B4978}" type="datetimeFigureOut">
               <a:rPr lang="en-CR" smtClean="0"/>
-              <a:t>15/4/22</a:t>
+              <a:t>13/5/22</a:t>
             </a:fld>
             <a:endParaRPr lang="en-CR"/>
           </a:p>
@@ -654,7 +655,7 @@
           <a:p>
             <a:fld id="{6F6A969C-B561-A54A-B39E-B070FA434C7A}" type="datetime1">
               <a:rPr lang="en-US" smtClean="0"/>
-              <a:t>4/15/22</a:t>
+              <a:t>5/13/22</a:t>
             </a:fld>
             <a:endParaRPr lang="en-US" dirty="0"/>
           </a:p>
@@ -825,7 +826,7 @@
           <a:p>
             <a:fld id="{D2C1C5B1-AB71-F04F-9BC1-728AEE9F606F}" type="datetime1">
               <a:rPr lang="en-US" smtClean="0"/>
-              <a:t>4/15/22</a:t>
+              <a:t>5/13/22</a:t>
             </a:fld>
             <a:endParaRPr lang="en-US" dirty="0"/>
           </a:p>
@@ -1006,7 +1007,7 @@
           <a:p>
             <a:fld id="{B9B5003B-8902-DE40-85EC-DBE1D6B0404C}" type="datetime1">
               <a:rPr lang="en-US" smtClean="0"/>
-              <a:t>4/15/22</a:t>
+              <a:t>5/13/22</a:t>
             </a:fld>
             <a:endParaRPr lang="en-US" dirty="0"/>
           </a:p>
@@ -1177,7 +1178,7 @@
           <a:p>
             <a:fld id="{90CB073F-4785-D24B-9AD2-2E89AA9D1EED}" type="datetime1">
               <a:rPr lang="en-US" smtClean="0"/>
-              <a:t>4/15/22</a:t>
+              <a:t>5/13/22</a:t>
             </a:fld>
             <a:endParaRPr lang="en-US" dirty="0"/>
           </a:p>
@@ -1438,7 +1439,7 @@
           <a:p>
             <a:fld id="{6EB6C2CC-0699-DE41-B0D6-9685E88AE972}" type="datetime1">
               <a:rPr lang="en-US" smtClean="0"/>
-              <a:t>4/15/22</a:t>
+              <a:t>5/13/22</a:t>
             </a:fld>
             <a:endParaRPr lang="en-US" dirty="0"/>
           </a:p>
@@ -1671,7 +1672,7 @@
           <a:p>
             <a:fld id="{0D920FF4-B9C0-4644-B7FB-6986FDBA3661}" type="datetime1">
               <a:rPr lang="en-US" smtClean="0"/>
-              <a:t>4/15/22</a:t>
+              <a:t>5/13/22</a:t>
             </a:fld>
             <a:endParaRPr lang="en-US" dirty="0"/>
           </a:p>
@@ -2027,7 +2028,7 @@
           <a:p>
             <a:fld id="{13B90772-6900-4F46-B6C8-76039AF4EE22}" type="datetime1">
               <a:rPr lang="en-US" smtClean="0"/>
-              <a:t>4/15/22</a:t>
+              <a:t>5/13/22</a:t>
             </a:fld>
             <a:endParaRPr lang="en-US" dirty="0"/>
           </a:p>
@@ -2169,7 +2170,7 @@
           <a:p>
             <a:fld id="{F529848E-D503-CE47-B4AC-9541F3456290}" type="datetime1">
               <a:rPr lang="en-US" smtClean="0"/>
-              <a:t>4/15/22</a:t>
+              <a:t>5/13/22</a:t>
             </a:fld>
             <a:endParaRPr lang="en-US" dirty="0"/>
           </a:p>
@@ -2265,7 +2266,7 @@
           <a:p>
             <a:fld id="{8EF84499-F2EE-A546-8CB3-3ED28A972CAC}" type="datetime1">
               <a:rPr lang="en-US" smtClean="0"/>
-              <a:t>4/15/22</a:t>
+              <a:t>5/13/22</a:t>
             </a:fld>
             <a:endParaRPr lang="en-US" dirty="0"/>
           </a:p>
@@ -2623,7 +2624,7 @@
           <a:p>
             <a:fld id="{DDB9FDC3-AA29-8B45-B6EB-B0EA0C1764D3}" type="datetime1">
               <a:rPr lang="en-US" smtClean="0"/>
-              <a:t>4/15/22</a:t>
+              <a:t>5/13/22</a:t>
             </a:fld>
             <a:endParaRPr lang="en-US" dirty="0"/>
           </a:p>
@@ -2942,7 +2943,7 @@
           <a:p>
             <a:fld id="{56A88B0D-7FF5-1D45-A036-030328FD5E77}" type="datetime1">
               <a:rPr lang="en-US" smtClean="0"/>
-              <a:t>4/15/22</a:t>
+              <a:t>5/13/22</a:t>
             </a:fld>
             <a:endParaRPr lang="en-US" dirty="0"/>
           </a:p>
@@ -3188,7 +3189,7 @@
           <a:p>
             <a:fld id="{0915A0A8-4AAD-954C-B1B9-0F2CC92D59AC}" type="datetime1">
               <a:rPr lang="en-US" smtClean="0"/>
-              <a:t>4/15/22</a:t>
+              <a:t>5/13/22</a:t>
             </a:fld>
             <a:endParaRPr lang="en-US" dirty="0"/>
           </a:p>
@@ -6737,7 +6738,7 @@
         <p:spPr>
           <a:xfrm>
             <a:off x="233423" y="3455900"/>
-            <a:ext cx="11725154" cy="353943"/>
+            <a:ext cx="11725154" cy="615553"/>
           </a:xfrm>
           <a:prstGeom prst="rect">
             <a:avLst/>
@@ -6753,12 +6754,12 @@
           <a:lstStyle/>
           <a:p>
             <a:r>
-              <a:rPr lang="en-US" sz="1700" dirty="0" err="1">
+              <a:rPr lang="en-US" sz="1700">
                 <a:solidFill>
                   <a:schemeClr val="bg1"/>
                 </a:solidFill>
               </a:rPr>
-              <a:t>sudo</a:t>
+              <a:t>docker </a:t>
             </a:r>
             <a:r>
               <a:rPr lang="en-US" sz="1700" dirty="0">
@@ -6766,7 +6767,7 @@
                   <a:schemeClr val="bg1"/>
                 </a:solidFill>
               </a:rPr>
-              <a:t> docker run -v /Users/jpmacprom1/</a:t>
+              <a:t>run –p3306:3306 -v /Users/jpmacprom1/</a:t>
             </a:r>
             <a:r>
               <a:rPr lang="en-US" sz="1700" dirty="0" err="1">
@@ -8370,19 +8371,11 @@
                   <a:schemeClr val="accent1"/>
                 </a:solidFill>
               </a:rPr>
-              <a:t>MAINTAINER</a:t>
+              <a:t>LABEL</a:t>
             </a:r>
             <a:r>
               <a:rPr lang="en-US" dirty="0"/>
-              <a:t> ARSTECH </a:t>
-            </a:r>
-            <a:r>
-              <a:rPr lang="en-US" dirty="0" err="1"/>
-              <a:t>arstech@e-mail</a:t>
-            </a:r>
-            <a:r>
-              <a:rPr lang="en-US" dirty="0"/>
-              <a:t> </a:t>
+              <a:t> ARSTECH pablow75@hotmail.com </a:t>
             </a:r>
           </a:p>
           <a:p>
@@ -9956,14 +9949,9 @@
           <a:lstStyle/>
           <a:p>
             <a:r>
-              <a:rPr lang="en-US" dirty="0"/>
-              <a:t>Caso de </a:t>
-            </a:r>
-            <a:r>
-              <a:rPr lang="en-US" dirty="0" err="1"/>
-              <a:t>estudio</a:t>
-            </a:r>
-            <a:endParaRPr lang="en-CR" dirty="0"/>
+              <a:rPr lang="en-CR" dirty="0"/>
+              <a:t>Microservicios vs arq. Monolítica</a:t>
+            </a:r>
           </a:p>
         </p:txBody>
       </p:sp>
@@ -9972,7 +9960,7 @@
           <p:cNvPr id="3" name="Slide Number Placeholder 2">
             <a:extLst>
               <a:ext uri="{FF2B5EF4-FFF2-40B4-BE49-F238E27FC236}">
-                <a16:creationId xmlns:a16="http://schemas.microsoft.com/office/drawing/2014/main" id="{1DECACD6-7120-4E4A-BB11-C58BCD3D0F9A}"/>
+                <a16:creationId xmlns:a16="http://schemas.microsoft.com/office/drawing/2014/main" id="{3C6C43E8-BEFE-2B43-8F37-D4D5AA030943}"/>
               </a:ext>
             </a:extLst>
           </p:cNvPr>
@@ -9992,6 +9980,206 @@
               <a:rPr lang="en-US" smtClean="0"/>
               <a:pPr/>
               <a:t>30</a:t>
+            </a:fld>
+            <a:endParaRPr lang="en-US" dirty="0"/>
+          </a:p>
+        </p:txBody>
+      </p:sp>
+      <p:pic>
+        <p:nvPicPr>
+          <p:cNvPr id="1026" name="Picture 2" descr="aplicaci&amp;oacute;n monol&amp;iacute;tica en comparaci&amp;oacute;n con microservicios">
+            <a:extLst>
+              <a:ext uri="{FF2B5EF4-FFF2-40B4-BE49-F238E27FC236}">
+                <a16:creationId xmlns:a16="http://schemas.microsoft.com/office/drawing/2014/main" id="{884564D3-4F3F-71B8-0147-A2ABFD91FAE1}"/>
+              </a:ext>
+            </a:extLst>
+          </p:cNvPr>
+          <p:cNvPicPr>
+            <a:picLocks noChangeAspect="1" noChangeArrowheads="1"/>
+          </p:cNvPicPr>
+          <p:nvPr/>
+        </p:nvPicPr>
+        <p:blipFill>
+          <a:blip r:embed="rId2">
+            <a:extLst>
+              <a:ext uri="{28A0092B-C50C-407E-A947-70E740481C1C}">
+                <a14:useLocalDpi xmlns:a14="http://schemas.microsoft.com/office/drawing/2010/main" val="0"/>
+              </a:ext>
+            </a:extLst>
+          </a:blip>
+          <a:srcRect/>
+          <a:stretch>
+            <a:fillRect/>
+          </a:stretch>
+        </p:blipFill>
+        <p:spPr bwMode="auto">
+          <a:xfrm>
+            <a:off x="2978149" y="2395220"/>
+            <a:ext cx="6073253" cy="3723114"/>
+          </a:xfrm>
+          <a:prstGeom prst="rect">
+            <a:avLst/>
+          </a:prstGeom>
+          <a:noFill/>
+          <a:extLst>
+            <a:ext uri="{909E8E84-426E-40DD-AFC4-6F175D3DCCD1}">
+              <a14:hiddenFill xmlns:a14="http://schemas.microsoft.com/office/drawing/2010/main">
+                <a:solidFill>
+                  <a:srgbClr val="FFFFFF"/>
+                </a:solidFill>
+              </a14:hiddenFill>
+            </a:ext>
+          </a:extLst>
+        </p:spPr>
+      </p:pic>
+      <p:sp>
+        <p:nvSpPr>
+          <p:cNvPr id="5" name="TextBox 4">
+            <a:extLst>
+              <a:ext uri="{FF2B5EF4-FFF2-40B4-BE49-F238E27FC236}">
+                <a16:creationId xmlns:a16="http://schemas.microsoft.com/office/drawing/2014/main" id="{A5845CB7-09BA-983D-8959-7204FE0C9D76}"/>
+              </a:ext>
+            </a:extLst>
+          </p:cNvPr>
+          <p:cNvSpPr txBox="1"/>
+          <p:nvPr/>
+        </p:nvSpPr>
+        <p:spPr>
+          <a:xfrm>
+            <a:off x="234176" y="6445405"/>
+            <a:ext cx="2789674" cy="276999"/>
+          </a:xfrm>
+          <a:prstGeom prst="rect">
+            <a:avLst/>
+          </a:prstGeom>
+          <a:noFill/>
+        </p:spPr>
+        <p:txBody>
+          <a:bodyPr wrap="none" rtlCol="0">
+            <a:spAutoFit/>
+          </a:bodyPr>
+          <a:lstStyle/>
+          <a:p>
+            <a:r>
+              <a:rPr lang="en-US" sz="1200" dirty="0">
+                <a:solidFill>
+                  <a:schemeClr val="tx2"/>
+                </a:solidFill>
+              </a:rPr>
+              <a:t>https://</a:t>
+            </a:r>
+            <a:r>
+              <a:rPr lang="en-US" sz="1200" dirty="0" err="1">
+                <a:solidFill>
+                  <a:schemeClr val="tx2"/>
+                </a:solidFill>
+              </a:rPr>
+              <a:t>aws.amazon.com</a:t>
+            </a:r>
+            <a:r>
+              <a:rPr lang="en-US" sz="1200" dirty="0">
+                <a:solidFill>
+                  <a:schemeClr val="tx2"/>
+                </a:solidFill>
+              </a:rPr>
+              <a:t>/es/microservices/</a:t>
+            </a:r>
+            <a:endParaRPr lang="en-CR" sz="1200" dirty="0">
+              <a:solidFill>
+                <a:schemeClr val="tx2"/>
+              </a:solidFill>
+            </a:endParaRPr>
+          </a:p>
+        </p:txBody>
+      </p:sp>
+    </p:spTree>
+    <p:extLst>
+      <p:ext uri="{BB962C8B-B14F-4D97-AF65-F5344CB8AC3E}">
+        <p14:creationId xmlns:p14="http://schemas.microsoft.com/office/powerpoint/2010/main" val="2891467861"/>
+      </p:ext>
+    </p:extLst>
+  </p:cSld>
+  <p:clrMapOvr>
+    <a:masterClrMapping/>
+  </p:clrMapOvr>
+</p:sld>
+</file>
+
+<file path=ppt/slides/slide31.xml><?xml version="1.0" encoding="utf-8"?>
+<p:sld xmlns:a="http://schemas.openxmlformats.org/drawingml/2006/main" xmlns:r="http://schemas.openxmlformats.org/officeDocument/2006/relationships" xmlns:p="http://schemas.openxmlformats.org/presentationml/2006/main">
+  <p:cSld>
+    <p:spTree>
+      <p:nvGrpSpPr>
+        <p:cNvPr id="1" name=""/>
+        <p:cNvGrpSpPr/>
+        <p:nvPr/>
+      </p:nvGrpSpPr>
+      <p:grpSpPr>
+        <a:xfrm>
+          <a:off x="0" y="0"/>
+          <a:ext cx="0" cy="0"/>
+          <a:chOff x="0" y="0"/>
+          <a:chExt cx="0" cy="0"/>
+        </a:xfrm>
+      </p:grpSpPr>
+      <p:sp>
+        <p:nvSpPr>
+          <p:cNvPr id="2" name="Title 1">
+            <a:extLst>
+              <a:ext uri="{FF2B5EF4-FFF2-40B4-BE49-F238E27FC236}">
+                <a16:creationId xmlns:a16="http://schemas.microsoft.com/office/drawing/2014/main" id="{5FCAE98A-1FA7-F640-BC7F-9C11658500D7}"/>
+              </a:ext>
+            </a:extLst>
+          </p:cNvPr>
+          <p:cNvSpPr>
+            <a:spLocks noGrp="1"/>
+          </p:cNvSpPr>
+          <p:nvPr>
+            <p:ph type="title"/>
+          </p:nvPr>
+        </p:nvSpPr>
+        <p:spPr/>
+        <p:txBody>
+          <a:bodyPr/>
+          <a:lstStyle/>
+          <a:p>
+            <a:r>
+              <a:rPr lang="en-US" dirty="0"/>
+              <a:t>Caso de </a:t>
+            </a:r>
+            <a:r>
+              <a:rPr lang="en-US" dirty="0" err="1"/>
+              <a:t>estudio</a:t>
+            </a:r>
+            <a:endParaRPr lang="en-CR" dirty="0"/>
+          </a:p>
+        </p:txBody>
+      </p:sp>
+      <p:sp>
+        <p:nvSpPr>
+          <p:cNvPr id="3" name="Slide Number Placeholder 2">
+            <a:extLst>
+              <a:ext uri="{FF2B5EF4-FFF2-40B4-BE49-F238E27FC236}">
+                <a16:creationId xmlns:a16="http://schemas.microsoft.com/office/drawing/2014/main" id="{1DECACD6-7120-4E4A-BB11-C58BCD3D0F9A}"/>
+              </a:ext>
+            </a:extLst>
+          </p:cNvPr>
+          <p:cNvSpPr>
+            <a:spLocks noGrp="1"/>
+          </p:cNvSpPr>
+          <p:nvPr>
+            <p:ph type="sldNum" sz="quarter" idx="12"/>
+          </p:nvPr>
+        </p:nvSpPr>
+        <p:spPr/>
+        <p:txBody>
+          <a:bodyPr/>
+          <a:lstStyle/>
+          <a:p>
+            <a:fld id="{4FAB73BC-B049-4115-A692-8D63A059BFB8}" type="slidenum">
+              <a:rPr lang="en-US" smtClean="0"/>
+              <a:pPr/>
+              <a:t>31</a:t>
             </a:fld>
             <a:endParaRPr lang="en-US" dirty="0"/>
           </a:p>
@@ -10249,7 +10437,7 @@
 </p:sld>
 </file>
 
-<file path=ppt/slides/slide31.xml><?xml version="1.0" encoding="utf-8"?>
+<file path=ppt/slides/slide32.xml><?xml version="1.0" encoding="utf-8"?>
 <p:sld xmlns:a="http://schemas.openxmlformats.org/drawingml/2006/main" xmlns:r="http://schemas.openxmlformats.org/officeDocument/2006/relationships" xmlns:p="http://schemas.openxmlformats.org/presentationml/2006/main">
   <p:cSld>
     <p:spTree>
@@ -10323,7 +10511,7 @@
             <a:fld id="{4FAB73BC-B049-4115-A692-8D63A059BFB8}" type="slidenum">
               <a:rPr lang="en-US" smtClean="0"/>
               <a:pPr/>
-              <a:t>31</a:t>
+              <a:t>32</a:t>
             </a:fld>
             <a:endParaRPr lang="en-US" dirty="0"/>
           </a:p>
@@ -10846,108 +11034,6 @@
     <p:extLst>
       <p:ext uri="{BB962C8B-B14F-4D97-AF65-F5344CB8AC3E}">
         <p14:creationId xmlns:p14="http://schemas.microsoft.com/office/powerpoint/2010/main" val="731463829"/>
-      </p:ext>
-    </p:extLst>
-  </p:cSld>
-  <p:clrMapOvr>
-    <a:masterClrMapping/>
-  </p:clrMapOvr>
-</p:sld>
-</file>
-
-<file path=ppt/slides/slide32.xml><?xml version="1.0" encoding="utf-8"?>
-<p:sld xmlns:a="http://schemas.openxmlformats.org/drawingml/2006/main" xmlns:r="http://schemas.openxmlformats.org/officeDocument/2006/relationships" xmlns:p="http://schemas.openxmlformats.org/presentationml/2006/main">
-  <p:cSld>
-    <p:spTree>
-      <p:nvGrpSpPr>
-        <p:cNvPr id="1" name=""/>
-        <p:cNvGrpSpPr/>
-        <p:nvPr/>
-      </p:nvGrpSpPr>
-      <p:grpSpPr>
-        <a:xfrm>
-          <a:off x="0" y="0"/>
-          <a:ext cx="0" cy="0"/>
-          <a:chOff x="0" y="0"/>
-          <a:chExt cx="0" cy="0"/>
-        </a:xfrm>
-      </p:grpSpPr>
-      <p:sp>
-        <p:nvSpPr>
-          <p:cNvPr id="2" name="Title 1">
-            <a:extLst>
-              <a:ext uri="{FF2B5EF4-FFF2-40B4-BE49-F238E27FC236}">
-                <a16:creationId xmlns:a16="http://schemas.microsoft.com/office/drawing/2014/main" id="{5FCAE98A-1FA7-F640-BC7F-9C11658500D7}"/>
-              </a:ext>
-            </a:extLst>
-          </p:cNvPr>
-          <p:cNvSpPr>
-            <a:spLocks noGrp="1"/>
-          </p:cNvSpPr>
-          <p:nvPr>
-            <p:ph type="title"/>
-          </p:nvPr>
-        </p:nvSpPr>
-        <p:spPr>
-          <a:xfrm>
-            <a:off x="2231136" y="2834640"/>
-            <a:ext cx="7729728" cy="1188720"/>
-          </a:xfrm>
-        </p:spPr>
-        <p:txBody>
-          <a:bodyPr/>
-          <a:lstStyle/>
-          <a:p>
-            <a:r>
-              <a:rPr lang="en-US" dirty="0" err="1"/>
-              <a:t>Revisión</a:t>
-            </a:r>
-            <a:r>
-              <a:rPr lang="en-US" dirty="0"/>
-              <a:t> del </a:t>
-            </a:r>
-            <a:r>
-              <a:rPr lang="en-US" dirty="0" err="1"/>
-              <a:t>código</a:t>
-            </a:r>
-            <a:endParaRPr lang="en-CR" dirty="0"/>
-          </a:p>
-        </p:txBody>
-      </p:sp>
-      <p:sp>
-        <p:nvSpPr>
-          <p:cNvPr id="3" name="Slide Number Placeholder 2">
-            <a:extLst>
-              <a:ext uri="{FF2B5EF4-FFF2-40B4-BE49-F238E27FC236}">
-                <a16:creationId xmlns:a16="http://schemas.microsoft.com/office/drawing/2014/main" id="{1DECACD6-7120-4E4A-BB11-C58BCD3D0F9A}"/>
-              </a:ext>
-            </a:extLst>
-          </p:cNvPr>
-          <p:cNvSpPr>
-            <a:spLocks noGrp="1"/>
-          </p:cNvSpPr>
-          <p:nvPr>
-            <p:ph type="sldNum" sz="quarter" idx="12"/>
-          </p:nvPr>
-        </p:nvSpPr>
-        <p:spPr/>
-        <p:txBody>
-          <a:bodyPr/>
-          <a:lstStyle/>
-          <a:p>
-            <a:fld id="{4FAB73BC-B049-4115-A692-8D63A059BFB8}" type="slidenum">
-              <a:rPr lang="en-US" smtClean="0"/>
-              <a:pPr/>
-              <a:t>32</a:t>
-            </a:fld>
-            <a:endParaRPr lang="en-US" dirty="0"/>
-          </a:p>
-        </p:txBody>
-      </p:sp>
-    </p:spTree>
-    <p:extLst>
-      <p:ext uri="{BB962C8B-B14F-4D97-AF65-F5344CB8AC3E}">
-        <p14:creationId xmlns:p14="http://schemas.microsoft.com/office/powerpoint/2010/main" val="1257853938"/>
       </p:ext>
     </p:extLst>
   </p:cSld>
@@ -10990,14 +11076,27 @@
             <p:ph type="title"/>
           </p:nvPr>
         </p:nvSpPr>
-        <p:spPr/>
+        <p:spPr>
+          <a:xfrm>
+            <a:off x="2231136" y="2834640"/>
+            <a:ext cx="7729728" cy="1188720"/>
+          </a:xfrm>
+        </p:spPr>
         <p:txBody>
           <a:bodyPr/>
           <a:lstStyle/>
           <a:p>
             <a:r>
+              <a:rPr lang="en-US" dirty="0" err="1"/>
+              <a:t>Revisión</a:t>
+            </a:r>
+            <a:r>
               <a:rPr lang="en-US" dirty="0"/>
-              <a:t>Docker Compose</a:t>
+              <a:t> del </a:t>
+            </a:r>
+            <a:r>
+              <a:rPr lang="en-US" dirty="0" err="1"/>
+              <a:t>código</a:t>
             </a:r>
             <a:endParaRPr lang="en-CR" dirty="0"/>
           </a:p>
@@ -11033,217 +11132,10 @@
           </a:p>
         </p:txBody>
       </p:sp>
-      <p:sp>
-        <p:nvSpPr>
-          <p:cNvPr id="4" name="TextBox 3">
-            <a:extLst>
-              <a:ext uri="{FF2B5EF4-FFF2-40B4-BE49-F238E27FC236}">
-                <a16:creationId xmlns:a16="http://schemas.microsoft.com/office/drawing/2014/main" id="{DAD0A73E-BB2B-4D41-8529-C5C2D3838AE0}"/>
-              </a:ext>
-            </a:extLst>
-          </p:cNvPr>
-          <p:cNvSpPr txBox="1"/>
-          <p:nvPr/>
-        </p:nvSpPr>
-        <p:spPr>
-          <a:xfrm>
-            <a:off x="945267" y="2828835"/>
-            <a:ext cx="4066571" cy="1477328"/>
-          </a:xfrm>
-          <a:prstGeom prst="rect">
-            <a:avLst/>
-          </a:prstGeom>
-          <a:noFill/>
-        </p:spPr>
-        <p:txBody>
-          <a:bodyPr wrap="square" rtlCol="0">
-            <a:spAutoFit/>
-          </a:bodyPr>
-          <a:lstStyle/>
-          <a:p>
-            <a:pPr marL="285750" indent="-285750">
-              <a:buFont typeface="Arial" panose="020B0604020202020204" pitchFamily="34" charset="0"/>
-              <a:buChar char="•"/>
-            </a:pPr>
-            <a:r>
-              <a:rPr lang="en-CR" dirty="0"/>
-              <a:t>Contruir y desplegar aplicaciones con múltiples contenedores</a:t>
-            </a:r>
-          </a:p>
-          <a:p>
-            <a:pPr marL="285750" indent="-285750">
-              <a:buFont typeface="Arial" panose="020B0604020202020204" pitchFamily="34" charset="0"/>
-              <a:buChar char="•"/>
-            </a:pPr>
-            <a:r>
-              <a:rPr lang="en-CR" dirty="0"/>
-              <a:t>Definición del la arquitectura de servicios en un solo archivo YAML</a:t>
-            </a:r>
-          </a:p>
-          <a:p>
-            <a:pPr marL="285750" indent="-285750">
-              <a:buFont typeface="Arial" panose="020B0604020202020204" pitchFamily="34" charset="0"/>
-              <a:buChar char="•"/>
-            </a:pPr>
-            <a:r>
-              <a:rPr lang="en-CR" dirty="0"/>
-              <a:t>Promueve la seguridad y el aislamiento</a:t>
-            </a:r>
-          </a:p>
-        </p:txBody>
-      </p:sp>
-      <p:sp>
-        <p:nvSpPr>
-          <p:cNvPr id="7" name="TextBox 6">
-            <a:extLst>
-              <a:ext uri="{FF2B5EF4-FFF2-40B4-BE49-F238E27FC236}">
-                <a16:creationId xmlns:a16="http://schemas.microsoft.com/office/drawing/2014/main" id="{9C38E5C3-58DD-AB4D-8C70-7C331ADA6BBE}"/>
-              </a:ext>
-            </a:extLst>
-          </p:cNvPr>
-          <p:cNvSpPr txBox="1"/>
-          <p:nvPr/>
-        </p:nvSpPr>
-        <p:spPr>
-          <a:xfrm>
-            <a:off x="5593647" y="6490590"/>
-            <a:ext cx="5679191" cy="276999"/>
-          </a:xfrm>
-          <a:prstGeom prst="rect">
-            <a:avLst/>
-          </a:prstGeom>
-          <a:noFill/>
-        </p:spPr>
-        <p:txBody>
-          <a:bodyPr wrap="square">
-            <a:spAutoFit/>
-          </a:bodyPr>
-          <a:lstStyle/>
-          <a:p>
-            <a:r>
-              <a:rPr lang="en-US" sz="1200" dirty="0">
-                <a:solidFill>
-                  <a:schemeClr val="tx2"/>
-                </a:solidFill>
-              </a:rPr>
-              <a:t>http://</a:t>
-            </a:r>
-            <a:r>
-              <a:rPr lang="en-US" sz="1200" dirty="0" err="1">
-                <a:solidFill>
-                  <a:schemeClr val="tx2"/>
-                </a:solidFill>
-              </a:rPr>
-              <a:t>img.scoop.it</a:t>
-            </a:r>
-            <a:r>
-              <a:rPr lang="en-US" sz="1200" dirty="0">
-                <a:solidFill>
-                  <a:schemeClr val="tx2"/>
-                </a:solidFill>
-              </a:rPr>
-              <a:t>/bmExZyvGWidultcwx9hCb7nTzqrqzN7Y9aBZTaXoQ8Q=</a:t>
-            </a:r>
-            <a:endParaRPr lang="en-CR" sz="1200" dirty="0">
-              <a:solidFill>
-                <a:schemeClr val="tx2"/>
-              </a:solidFill>
-            </a:endParaRPr>
-          </a:p>
-        </p:txBody>
-      </p:sp>
-      <p:pic>
-        <p:nvPicPr>
-          <p:cNvPr id="3074" name="Picture 2" descr="Docker Bridge Network Driver">
-            <a:extLst>
-              <a:ext uri="{FF2B5EF4-FFF2-40B4-BE49-F238E27FC236}">
-                <a16:creationId xmlns:a16="http://schemas.microsoft.com/office/drawing/2014/main" id="{B3E9E4B2-D939-C074-54AE-B189235398FA}"/>
-              </a:ext>
-            </a:extLst>
-          </p:cNvPr>
-          <p:cNvPicPr>
-            <a:picLocks noChangeAspect="1" noChangeArrowheads="1"/>
-          </p:cNvPicPr>
-          <p:nvPr/>
-        </p:nvPicPr>
-        <p:blipFill>
-          <a:blip r:embed="rId2">
-            <a:extLst>
-              <a:ext uri="{28A0092B-C50C-407E-A947-70E740481C1C}">
-                <a14:useLocalDpi xmlns:a14="http://schemas.microsoft.com/office/drawing/2010/main" val="0"/>
-              </a:ext>
-            </a:extLst>
-          </a:blip>
-          <a:srcRect/>
-          <a:stretch>
-            <a:fillRect/>
-          </a:stretch>
-        </p:blipFill>
-        <p:spPr bwMode="auto">
-          <a:xfrm>
-            <a:off x="6096000" y="2426082"/>
-            <a:ext cx="4066570" cy="3791838"/>
-          </a:xfrm>
-          <a:prstGeom prst="rect">
-            <a:avLst/>
-          </a:prstGeom>
-          <a:noFill/>
-          <a:extLst>
-            <a:ext uri="{909E8E84-426E-40DD-AFC4-6F175D3DCCD1}">
-              <a14:hiddenFill xmlns:a14="http://schemas.microsoft.com/office/drawing/2010/main">
-                <a:solidFill>
-                  <a:srgbClr val="FFFFFF"/>
-                </a:solidFill>
-              </a14:hiddenFill>
-            </a:ext>
-          </a:extLst>
-        </p:spPr>
-      </p:pic>
-      <p:sp>
-        <p:nvSpPr>
-          <p:cNvPr id="10" name="TextBox 9">
-            <a:extLst>
-              <a:ext uri="{FF2B5EF4-FFF2-40B4-BE49-F238E27FC236}">
-                <a16:creationId xmlns:a16="http://schemas.microsoft.com/office/drawing/2014/main" id="{8D154070-1890-C394-0775-95D3E5722A3F}"/>
-              </a:ext>
-            </a:extLst>
-          </p:cNvPr>
-          <p:cNvSpPr txBox="1"/>
-          <p:nvPr/>
-        </p:nvSpPr>
-        <p:spPr>
-          <a:xfrm>
-            <a:off x="192881" y="6400800"/>
-            <a:ext cx="6100762" cy="323165"/>
-          </a:xfrm>
-          <a:prstGeom prst="rect">
-            <a:avLst/>
-          </a:prstGeom>
-          <a:noFill/>
-        </p:spPr>
-        <p:txBody>
-          <a:bodyPr wrap="square">
-            <a:spAutoFit/>
-          </a:bodyPr>
-          <a:lstStyle/>
-          <a:p>
-            <a:r>
-              <a:rPr lang="en-CR" sz="1500" dirty="0">
-                <a:hlinkClick r:id="rId3"/>
-              </a:rPr>
-              <a:t>https://docs.docker.com/compose/</a:t>
-            </a:r>
-            <a:r>
-              <a:rPr lang="en-CR" sz="1500" dirty="0"/>
-              <a:t> </a:t>
-            </a:r>
-          </a:p>
-        </p:txBody>
-      </p:sp>
     </p:spTree>
     <p:extLst>
       <p:ext uri="{BB962C8B-B14F-4D97-AF65-F5344CB8AC3E}">
-        <p14:creationId xmlns:p14="http://schemas.microsoft.com/office/powerpoint/2010/main" val="3744451892"/>
+        <p14:creationId xmlns:p14="http://schemas.microsoft.com/office/powerpoint/2010/main" val="1257853938"/>
       </p:ext>
     </p:extLst>
   </p:cSld>
@@ -11286,27 +11178,14 @@
             <p:ph type="title"/>
           </p:nvPr>
         </p:nvSpPr>
-        <p:spPr>
-          <a:xfrm>
-            <a:off x="2231136" y="2834640"/>
-            <a:ext cx="7729728" cy="1188720"/>
-          </a:xfrm>
-        </p:spPr>
+        <p:spPr/>
         <p:txBody>
           <a:bodyPr/>
           <a:lstStyle/>
           <a:p>
             <a:r>
-              <a:rPr lang="en-US" dirty="0" err="1"/>
-              <a:t>Volvamos</a:t>
-            </a:r>
-            <a:r>
               <a:rPr lang="en-US" dirty="0"/>
-              <a:t> al </a:t>
-            </a:r>
-            <a:r>
-              <a:rPr lang="en-US" dirty="0" err="1"/>
-              <a:t>código</a:t>
+              <a:t>Docker Compose</a:t>
             </a:r>
             <a:endParaRPr lang="en-CR" dirty="0"/>
           </a:p>
@@ -11342,10 +11221,217 @@
           </a:p>
         </p:txBody>
       </p:sp>
+      <p:sp>
+        <p:nvSpPr>
+          <p:cNvPr id="4" name="TextBox 3">
+            <a:extLst>
+              <a:ext uri="{FF2B5EF4-FFF2-40B4-BE49-F238E27FC236}">
+                <a16:creationId xmlns:a16="http://schemas.microsoft.com/office/drawing/2014/main" id="{DAD0A73E-BB2B-4D41-8529-C5C2D3838AE0}"/>
+              </a:ext>
+            </a:extLst>
+          </p:cNvPr>
+          <p:cNvSpPr txBox="1"/>
+          <p:nvPr/>
+        </p:nvSpPr>
+        <p:spPr>
+          <a:xfrm>
+            <a:off x="945267" y="2828835"/>
+            <a:ext cx="4066571" cy="1477328"/>
+          </a:xfrm>
+          <a:prstGeom prst="rect">
+            <a:avLst/>
+          </a:prstGeom>
+          <a:noFill/>
+        </p:spPr>
+        <p:txBody>
+          <a:bodyPr wrap="square" rtlCol="0">
+            <a:spAutoFit/>
+          </a:bodyPr>
+          <a:lstStyle/>
+          <a:p>
+            <a:pPr marL="285750" indent="-285750">
+              <a:buFont typeface="Arial" panose="020B0604020202020204" pitchFamily="34" charset="0"/>
+              <a:buChar char="•"/>
+            </a:pPr>
+            <a:r>
+              <a:rPr lang="en-CR" dirty="0"/>
+              <a:t>Contruir y desplegar aplicaciones con múltiples contenedores</a:t>
+            </a:r>
+          </a:p>
+          <a:p>
+            <a:pPr marL="285750" indent="-285750">
+              <a:buFont typeface="Arial" panose="020B0604020202020204" pitchFamily="34" charset="0"/>
+              <a:buChar char="•"/>
+            </a:pPr>
+            <a:r>
+              <a:rPr lang="en-CR" dirty="0"/>
+              <a:t>Definición del la arquitectura de servicios en un solo archivo YAML</a:t>
+            </a:r>
+          </a:p>
+          <a:p>
+            <a:pPr marL="285750" indent="-285750">
+              <a:buFont typeface="Arial" panose="020B0604020202020204" pitchFamily="34" charset="0"/>
+              <a:buChar char="•"/>
+            </a:pPr>
+            <a:r>
+              <a:rPr lang="en-CR" dirty="0"/>
+              <a:t>Promueve la seguridad y el aislamiento</a:t>
+            </a:r>
+          </a:p>
+        </p:txBody>
+      </p:sp>
+      <p:sp>
+        <p:nvSpPr>
+          <p:cNvPr id="7" name="TextBox 6">
+            <a:extLst>
+              <a:ext uri="{FF2B5EF4-FFF2-40B4-BE49-F238E27FC236}">
+                <a16:creationId xmlns:a16="http://schemas.microsoft.com/office/drawing/2014/main" id="{9C38E5C3-58DD-AB4D-8C70-7C331ADA6BBE}"/>
+              </a:ext>
+            </a:extLst>
+          </p:cNvPr>
+          <p:cNvSpPr txBox="1"/>
+          <p:nvPr/>
+        </p:nvSpPr>
+        <p:spPr>
+          <a:xfrm>
+            <a:off x="5593647" y="6490590"/>
+            <a:ext cx="5679191" cy="276999"/>
+          </a:xfrm>
+          <a:prstGeom prst="rect">
+            <a:avLst/>
+          </a:prstGeom>
+          <a:noFill/>
+        </p:spPr>
+        <p:txBody>
+          <a:bodyPr wrap="square">
+            <a:spAutoFit/>
+          </a:bodyPr>
+          <a:lstStyle/>
+          <a:p>
+            <a:r>
+              <a:rPr lang="en-US" sz="1200" dirty="0">
+                <a:solidFill>
+                  <a:schemeClr val="tx2"/>
+                </a:solidFill>
+              </a:rPr>
+              <a:t>http://</a:t>
+            </a:r>
+            <a:r>
+              <a:rPr lang="en-US" sz="1200" dirty="0" err="1">
+                <a:solidFill>
+                  <a:schemeClr val="tx2"/>
+                </a:solidFill>
+              </a:rPr>
+              <a:t>img.scoop.it</a:t>
+            </a:r>
+            <a:r>
+              <a:rPr lang="en-US" sz="1200" dirty="0">
+                <a:solidFill>
+                  <a:schemeClr val="tx2"/>
+                </a:solidFill>
+              </a:rPr>
+              <a:t>/bmExZyvGWidultcwx9hCb7nTzqrqzN7Y9aBZTaXoQ8Q=</a:t>
+            </a:r>
+            <a:endParaRPr lang="en-CR" sz="1200" dirty="0">
+              <a:solidFill>
+                <a:schemeClr val="tx2"/>
+              </a:solidFill>
+            </a:endParaRPr>
+          </a:p>
+        </p:txBody>
+      </p:sp>
+      <p:pic>
+        <p:nvPicPr>
+          <p:cNvPr id="3074" name="Picture 2" descr="Docker Bridge Network Driver">
+            <a:extLst>
+              <a:ext uri="{FF2B5EF4-FFF2-40B4-BE49-F238E27FC236}">
+                <a16:creationId xmlns:a16="http://schemas.microsoft.com/office/drawing/2014/main" id="{B3E9E4B2-D939-C074-54AE-B189235398FA}"/>
+              </a:ext>
+            </a:extLst>
+          </p:cNvPr>
+          <p:cNvPicPr>
+            <a:picLocks noChangeAspect="1" noChangeArrowheads="1"/>
+          </p:cNvPicPr>
+          <p:nvPr/>
+        </p:nvPicPr>
+        <p:blipFill>
+          <a:blip r:embed="rId2">
+            <a:extLst>
+              <a:ext uri="{28A0092B-C50C-407E-A947-70E740481C1C}">
+                <a14:useLocalDpi xmlns:a14="http://schemas.microsoft.com/office/drawing/2010/main" val="0"/>
+              </a:ext>
+            </a:extLst>
+          </a:blip>
+          <a:srcRect/>
+          <a:stretch>
+            <a:fillRect/>
+          </a:stretch>
+        </p:blipFill>
+        <p:spPr bwMode="auto">
+          <a:xfrm>
+            <a:off x="6096000" y="2426082"/>
+            <a:ext cx="4066570" cy="3791838"/>
+          </a:xfrm>
+          <a:prstGeom prst="rect">
+            <a:avLst/>
+          </a:prstGeom>
+          <a:noFill/>
+          <a:extLst>
+            <a:ext uri="{909E8E84-426E-40DD-AFC4-6F175D3DCCD1}">
+              <a14:hiddenFill xmlns:a14="http://schemas.microsoft.com/office/drawing/2010/main">
+                <a:solidFill>
+                  <a:srgbClr val="FFFFFF"/>
+                </a:solidFill>
+              </a14:hiddenFill>
+            </a:ext>
+          </a:extLst>
+        </p:spPr>
+      </p:pic>
+      <p:sp>
+        <p:nvSpPr>
+          <p:cNvPr id="10" name="TextBox 9">
+            <a:extLst>
+              <a:ext uri="{FF2B5EF4-FFF2-40B4-BE49-F238E27FC236}">
+                <a16:creationId xmlns:a16="http://schemas.microsoft.com/office/drawing/2014/main" id="{8D154070-1890-C394-0775-95D3E5722A3F}"/>
+              </a:ext>
+            </a:extLst>
+          </p:cNvPr>
+          <p:cNvSpPr txBox="1"/>
+          <p:nvPr/>
+        </p:nvSpPr>
+        <p:spPr>
+          <a:xfrm>
+            <a:off x="192881" y="6400800"/>
+            <a:ext cx="6100762" cy="323165"/>
+          </a:xfrm>
+          <a:prstGeom prst="rect">
+            <a:avLst/>
+          </a:prstGeom>
+          <a:noFill/>
+        </p:spPr>
+        <p:txBody>
+          <a:bodyPr wrap="square">
+            <a:spAutoFit/>
+          </a:bodyPr>
+          <a:lstStyle/>
+          <a:p>
+            <a:r>
+              <a:rPr lang="en-CR" sz="1500" dirty="0">
+                <a:hlinkClick r:id="rId3"/>
+              </a:rPr>
+              <a:t>https://docs.docker.com/compose/</a:t>
+            </a:r>
+            <a:r>
+              <a:rPr lang="en-CR" sz="1500" dirty="0"/>
+              <a:t> </a:t>
+            </a:r>
+          </a:p>
+        </p:txBody>
+      </p:sp>
     </p:spTree>
     <p:extLst>
       <p:ext uri="{BB962C8B-B14F-4D97-AF65-F5344CB8AC3E}">
-        <p14:creationId xmlns:p14="http://schemas.microsoft.com/office/powerpoint/2010/main" val="1687947566"/>
+        <p14:creationId xmlns:p14="http://schemas.microsoft.com/office/powerpoint/2010/main" val="3744451892"/>
       </p:ext>
     </p:extLst>
   </p:cSld>
@@ -11399,16 +11485,16 @@
           <a:lstStyle/>
           <a:p>
             <a:r>
+              <a:rPr lang="en-US" dirty="0" err="1"/>
+              <a:t>Volvamos</a:t>
+            </a:r>
+            <a:r>
               <a:rPr lang="en-US" dirty="0"/>
-              <a:t>¡</a:t>
+              <a:t> al </a:t>
             </a:r>
             <a:r>
               <a:rPr lang="en-US" dirty="0" err="1"/>
-              <a:t>Muchas</a:t>
-            </a:r>
-            <a:r>
-              <a:rPr lang="en-US" dirty="0"/>
-              <a:t> gracias!</a:t>
+              <a:t>código</a:t>
             </a:r>
             <a:endParaRPr lang="en-CR" dirty="0"/>
           </a:p>
@@ -11439,6 +11525,108 @@
               <a:rPr lang="en-US" smtClean="0"/>
               <a:pPr/>
               <a:t>35</a:t>
+            </a:fld>
+            <a:endParaRPr lang="en-US" dirty="0"/>
+          </a:p>
+        </p:txBody>
+      </p:sp>
+    </p:spTree>
+    <p:extLst>
+      <p:ext uri="{BB962C8B-B14F-4D97-AF65-F5344CB8AC3E}">
+        <p14:creationId xmlns:p14="http://schemas.microsoft.com/office/powerpoint/2010/main" val="1687947566"/>
+      </p:ext>
+    </p:extLst>
+  </p:cSld>
+  <p:clrMapOvr>
+    <a:masterClrMapping/>
+  </p:clrMapOvr>
+</p:sld>
+</file>
+
+<file path=ppt/slides/slide36.xml><?xml version="1.0" encoding="utf-8"?>
+<p:sld xmlns:a="http://schemas.openxmlformats.org/drawingml/2006/main" xmlns:r="http://schemas.openxmlformats.org/officeDocument/2006/relationships" xmlns:p="http://schemas.openxmlformats.org/presentationml/2006/main">
+  <p:cSld>
+    <p:spTree>
+      <p:nvGrpSpPr>
+        <p:cNvPr id="1" name=""/>
+        <p:cNvGrpSpPr/>
+        <p:nvPr/>
+      </p:nvGrpSpPr>
+      <p:grpSpPr>
+        <a:xfrm>
+          <a:off x="0" y="0"/>
+          <a:ext cx="0" cy="0"/>
+          <a:chOff x="0" y="0"/>
+          <a:chExt cx="0" cy="0"/>
+        </a:xfrm>
+      </p:grpSpPr>
+      <p:sp>
+        <p:nvSpPr>
+          <p:cNvPr id="2" name="Title 1">
+            <a:extLst>
+              <a:ext uri="{FF2B5EF4-FFF2-40B4-BE49-F238E27FC236}">
+                <a16:creationId xmlns:a16="http://schemas.microsoft.com/office/drawing/2014/main" id="{5FCAE98A-1FA7-F640-BC7F-9C11658500D7}"/>
+              </a:ext>
+            </a:extLst>
+          </p:cNvPr>
+          <p:cNvSpPr>
+            <a:spLocks noGrp="1"/>
+          </p:cNvSpPr>
+          <p:nvPr>
+            <p:ph type="title"/>
+          </p:nvPr>
+        </p:nvSpPr>
+        <p:spPr>
+          <a:xfrm>
+            <a:off x="2231136" y="2834640"/>
+            <a:ext cx="7729728" cy="1188720"/>
+          </a:xfrm>
+        </p:spPr>
+        <p:txBody>
+          <a:bodyPr/>
+          <a:lstStyle/>
+          <a:p>
+            <a:r>
+              <a:rPr lang="en-US" dirty="0"/>
+              <a:t>¡</a:t>
+            </a:r>
+            <a:r>
+              <a:rPr lang="en-US" dirty="0" err="1"/>
+              <a:t>Muchas</a:t>
+            </a:r>
+            <a:r>
+              <a:rPr lang="en-US" dirty="0"/>
+              <a:t> gracias!</a:t>
+            </a:r>
+            <a:endParaRPr lang="en-CR" dirty="0"/>
+          </a:p>
+        </p:txBody>
+      </p:sp>
+      <p:sp>
+        <p:nvSpPr>
+          <p:cNvPr id="3" name="Slide Number Placeholder 2">
+            <a:extLst>
+              <a:ext uri="{FF2B5EF4-FFF2-40B4-BE49-F238E27FC236}">
+                <a16:creationId xmlns:a16="http://schemas.microsoft.com/office/drawing/2014/main" id="{1DECACD6-7120-4E4A-BB11-C58BCD3D0F9A}"/>
+              </a:ext>
+            </a:extLst>
+          </p:cNvPr>
+          <p:cNvSpPr>
+            <a:spLocks noGrp="1"/>
+          </p:cNvSpPr>
+          <p:nvPr>
+            <p:ph type="sldNum" sz="quarter" idx="12"/>
+          </p:nvPr>
+        </p:nvSpPr>
+        <p:spPr/>
+        <p:txBody>
+          <a:bodyPr/>
+          <a:lstStyle/>
+          <a:p>
+            <a:fld id="{4FAB73BC-B049-4115-A692-8D63A059BFB8}" type="slidenum">
+              <a:rPr lang="en-US" smtClean="0"/>
+              <a:pPr/>
+              <a:t>36</a:t>
             </a:fld>
             <a:endParaRPr lang="en-US" dirty="0"/>
           </a:p>

</xml_diff>

<commit_message>
NEW: notas and pptx updates
</commit_message>
<xml_diff>
--- a/week 1/week_1_intro.pptx
+++ b/week 1/week_1_intro.pptx
@@ -232,7 +232,7 @@
           <a:p>
             <a:fld id="{19356E6C-AC99-594F-A973-00A5B63B4978}" type="datetimeFigureOut">
               <a:rPr lang="en-CR" smtClean="0"/>
-              <a:t>13/5/22</a:t>
+              <a:t>14/5/22</a:t>
             </a:fld>
             <a:endParaRPr lang="en-CR"/>
           </a:p>
@@ -500,6 +500,174 @@
 </p:notesMaster>
 </file>
 
+<file path=ppt/notesSlides/notesSlide1.xml><?xml version="1.0" encoding="utf-8"?>
+<p:notes xmlns:a="http://schemas.openxmlformats.org/drawingml/2006/main" xmlns:r="http://schemas.openxmlformats.org/officeDocument/2006/relationships" xmlns:p="http://schemas.openxmlformats.org/presentationml/2006/main">
+  <p:cSld>
+    <p:spTree>
+      <p:nvGrpSpPr>
+        <p:cNvPr id="1" name=""/>
+        <p:cNvGrpSpPr/>
+        <p:nvPr/>
+      </p:nvGrpSpPr>
+      <p:grpSpPr>
+        <a:xfrm>
+          <a:off x="0" y="0"/>
+          <a:ext cx="0" cy="0"/>
+          <a:chOff x="0" y="0"/>
+          <a:chExt cx="0" cy="0"/>
+        </a:xfrm>
+      </p:grpSpPr>
+      <p:sp>
+        <p:nvSpPr>
+          <p:cNvPr id="2" name="Slide Image Placeholder 1"/>
+          <p:cNvSpPr>
+            <a:spLocks noGrp="1" noRot="1" noChangeAspect="1"/>
+          </p:cNvSpPr>
+          <p:nvPr>
+            <p:ph type="sldImg"/>
+          </p:nvPr>
+        </p:nvSpPr>
+        <p:spPr/>
+      </p:sp>
+      <p:sp>
+        <p:nvSpPr>
+          <p:cNvPr id="3" name="Notes Placeholder 2"/>
+          <p:cNvSpPr>
+            <a:spLocks noGrp="1"/>
+          </p:cNvSpPr>
+          <p:nvPr>
+            <p:ph type="body" idx="1"/>
+          </p:nvPr>
+        </p:nvSpPr>
+        <p:spPr/>
+        <p:txBody>
+          <a:bodyPr/>
+          <a:lstStyle/>
+          <a:p>
+            <a:endParaRPr lang="en-CR" dirty="0"/>
+          </a:p>
+        </p:txBody>
+      </p:sp>
+      <p:sp>
+        <p:nvSpPr>
+          <p:cNvPr id="4" name="Slide Number Placeholder 3"/>
+          <p:cNvSpPr>
+            <a:spLocks noGrp="1"/>
+          </p:cNvSpPr>
+          <p:nvPr>
+            <p:ph type="sldNum" sz="quarter" idx="5"/>
+          </p:nvPr>
+        </p:nvSpPr>
+        <p:spPr/>
+        <p:txBody>
+          <a:bodyPr/>
+          <a:lstStyle/>
+          <a:p>
+            <a:fld id="{6A400BE0-CFB3-8A48-9961-4D4ADC7AA8F1}" type="slidenum">
+              <a:rPr lang="en-CR" smtClean="0"/>
+              <a:t>8</a:t>
+            </a:fld>
+            <a:endParaRPr lang="en-CR"/>
+          </a:p>
+        </p:txBody>
+      </p:sp>
+    </p:spTree>
+    <p:extLst>
+      <p:ext uri="{BB962C8B-B14F-4D97-AF65-F5344CB8AC3E}">
+        <p14:creationId xmlns:p14="http://schemas.microsoft.com/office/powerpoint/2010/main" val="4003741095"/>
+      </p:ext>
+    </p:extLst>
+  </p:cSld>
+  <p:clrMapOvr>
+    <a:masterClrMapping/>
+  </p:clrMapOvr>
+</p:notes>
+</file>
+
+<file path=ppt/notesSlides/notesSlide2.xml><?xml version="1.0" encoding="utf-8"?>
+<p:notes xmlns:a="http://schemas.openxmlformats.org/drawingml/2006/main" xmlns:r="http://schemas.openxmlformats.org/officeDocument/2006/relationships" xmlns:p="http://schemas.openxmlformats.org/presentationml/2006/main">
+  <p:cSld>
+    <p:spTree>
+      <p:nvGrpSpPr>
+        <p:cNvPr id="1" name=""/>
+        <p:cNvGrpSpPr/>
+        <p:nvPr/>
+      </p:nvGrpSpPr>
+      <p:grpSpPr>
+        <a:xfrm>
+          <a:off x="0" y="0"/>
+          <a:ext cx="0" cy="0"/>
+          <a:chOff x="0" y="0"/>
+          <a:chExt cx="0" cy="0"/>
+        </a:xfrm>
+      </p:grpSpPr>
+      <p:sp>
+        <p:nvSpPr>
+          <p:cNvPr id="2" name="Slide Image Placeholder 1"/>
+          <p:cNvSpPr>
+            <a:spLocks noGrp="1" noRot="1" noChangeAspect="1"/>
+          </p:cNvSpPr>
+          <p:nvPr>
+            <p:ph type="sldImg"/>
+          </p:nvPr>
+        </p:nvSpPr>
+        <p:spPr/>
+      </p:sp>
+      <p:sp>
+        <p:nvSpPr>
+          <p:cNvPr id="3" name="Notes Placeholder 2"/>
+          <p:cNvSpPr>
+            <a:spLocks noGrp="1"/>
+          </p:cNvSpPr>
+          <p:nvPr>
+            <p:ph type="body" idx="1"/>
+          </p:nvPr>
+        </p:nvSpPr>
+        <p:spPr/>
+        <p:txBody>
+          <a:bodyPr/>
+          <a:lstStyle/>
+          <a:p>
+            <a:endParaRPr lang="en-CR" dirty="0"/>
+          </a:p>
+        </p:txBody>
+      </p:sp>
+      <p:sp>
+        <p:nvSpPr>
+          <p:cNvPr id="4" name="Slide Number Placeholder 3"/>
+          <p:cNvSpPr>
+            <a:spLocks noGrp="1"/>
+          </p:cNvSpPr>
+          <p:nvPr>
+            <p:ph type="sldNum" sz="quarter" idx="5"/>
+          </p:nvPr>
+        </p:nvSpPr>
+        <p:spPr/>
+        <p:txBody>
+          <a:bodyPr/>
+          <a:lstStyle/>
+          <a:p>
+            <a:fld id="{6A400BE0-CFB3-8A48-9961-4D4ADC7AA8F1}" type="slidenum">
+              <a:rPr lang="en-CR" smtClean="0"/>
+              <a:t>19</a:t>
+            </a:fld>
+            <a:endParaRPr lang="en-CR"/>
+          </a:p>
+        </p:txBody>
+      </p:sp>
+    </p:spTree>
+    <p:extLst>
+      <p:ext uri="{BB962C8B-B14F-4D97-AF65-F5344CB8AC3E}">
+        <p14:creationId xmlns:p14="http://schemas.microsoft.com/office/powerpoint/2010/main" val="3858051197"/>
+      </p:ext>
+    </p:extLst>
+  </p:cSld>
+  <p:clrMapOvr>
+    <a:masterClrMapping/>
+  </p:clrMapOvr>
+</p:notes>
+</file>
+
 <file path=ppt/slideLayouts/slideLayout1.xml><?xml version="1.0" encoding="utf-8"?>
 <p:sldLayout xmlns:a="http://schemas.openxmlformats.org/drawingml/2006/main" xmlns:r="http://schemas.openxmlformats.org/officeDocument/2006/relationships" xmlns:p="http://schemas.openxmlformats.org/presentationml/2006/main" type="title" preserve="1">
   <p:cSld name="Title Slide">
@@ -655,7 +823,7 @@
           <a:p>
             <a:fld id="{6F6A969C-B561-A54A-B39E-B070FA434C7A}" type="datetime1">
               <a:rPr lang="en-US" smtClean="0"/>
-              <a:t>5/13/22</a:t>
+              <a:t>5/14/22</a:t>
             </a:fld>
             <a:endParaRPr lang="en-US" dirty="0"/>
           </a:p>
@@ -826,7 +994,7 @@
           <a:p>
             <a:fld id="{D2C1C5B1-AB71-F04F-9BC1-728AEE9F606F}" type="datetime1">
               <a:rPr lang="en-US" smtClean="0"/>
-              <a:t>5/13/22</a:t>
+              <a:t>5/14/22</a:t>
             </a:fld>
             <a:endParaRPr lang="en-US" dirty="0"/>
           </a:p>
@@ -1007,7 +1175,7 @@
           <a:p>
             <a:fld id="{B9B5003B-8902-DE40-85EC-DBE1D6B0404C}" type="datetime1">
               <a:rPr lang="en-US" smtClean="0"/>
-              <a:t>5/13/22</a:t>
+              <a:t>5/14/22</a:t>
             </a:fld>
             <a:endParaRPr lang="en-US" dirty="0"/>
           </a:p>
@@ -1178,7 +1346,7 @@
           <a:p>
             <a:fld id="{90CB073F-4785-D24B-9AD2-2E89AA9D1EED}" type="datetime1">
               <a:rPr lang="en-US" smtClean="0"/>
-              <a:t>5/13/22</a:t>
+              <a:t>5/14/22</a:t>
             </a:fld>
             <a:endParaRPr lang="en-US" dirty="0"/>
           </a:p>
@@ -1439,7 +1607,7 @@
           <a:p>
             <a:fld id="{6EB6C2CC-0699-DE41-B0D6-9685E88AE972}" type="datetime1">
               <a:rPr lang="en-US" smtClean="0"/>
-              <a:t>5/13/22</a:t>
+              <a:t>5/14/22</a:t>
             </a:fld>
             <a:endParaRPr lang="en-US" dirty="0"/>
           </a:p>
@@ -1672,7 +1840,7 @@
           <a:p>
             <a:fld id="{0D920FF4-B9C0-4644-B7FB-6986FDBA3661}" type="datetime1">
               <a:rPr lang="en-US" smtClean="0"/>
-              <a:t>5/13/22</a:t>
+              <a:t>5/14/22</a:t>
             </a:fld>
             <a:endParaRPr lang="en-US" dirty="0"/>
           </a:p>
@@ -2028,7 +2196,7 @@
           <a:p>
             <a:fld id="{13B90772-6900-4F46-B6C8-76039AF4EE22}" type="datetime1">
               <a:rPr lang="en-US" smtClean="0"/>
-              <a:t>5/13/22</a:t>
+              <a:t>5/14/22</a:t>
             </a:fld>
             <a:endParaRPr lang="en-US" dirty="0"/>
           </a:p>
@@ -2170,7 +2338,7 @@
           <a:p>
             <a:fld id="{F529848E-D503-CE47-B4AC-9541F3456290}" type="datetime1">
               <a:rPr lang="en-US" smtClean="0"/>
-              <a:t>5/13/22</a:t>
+              <a:t>5/14/22</a:t>
             </a:fld>
             <a:endParaRPr lang="en-US" dirty="0"/>
           </a:p>
@@ -2266,7 +2434,7 @@
           <a:p>
             <a:fld id="{8EF84499-F2EE-A546-8CB3-3ED28A972CAC}" type="datetime1">
               <a:rPr lang="en-US" smtClean="0"/>
-              <a:t>5/13/22</a:t>
+              <a:t>5/14/22</a:t>
             </a:fld>
             <a:endParaRPr lang="en-US" dirty="0"/>
           </a:p>
@@ -2624,7 +2792,7 @@
           <a:p>
             <a:fld id="{DDB9FDC3-AA29-8B45-B6EB-B0EA0C1764D3}" type="datetime1">
               <a:rPr lang="en-US" smtClean="0"/>
-              <a:t>5/13/22</a:t>
+              <a:t>5/14/22</a:t>
             </a:fld>
             <a:endParaRPr lang="en-US" dirty="0"/>
           </a:p>
@@ -2943,7 +3111,7 @@
           <a:p>
             <a:fld id="{56A88B0D-7FF5-1D45-A036-030328FD5E77}" type="datetime1">
               <a:rPr lang="en-US" smtClean="0"/>
-              <a:t>5/13/22</a:t>
+              <a:t>5/14/22</a:t>
             </a:fld>
             <a:endParaRPr lang="en-US" dirty="0"/>
           </a:p>
@@ -3189,7 +3357,7 @@
           <a:p>
             <a:fld id="{0915A0A8-4AAD-954C-B1B9-0F2CC92D59AC}" type="datetime1">
               <a:rPr lang="en-US" smtClean="0"/>
-              <a:t>5/13/22</a:t>
+              <a:t>5/14/22</a:t>
             </a:fld>
             <a:endParaRPr lang="en-US" dirty="0"/>
           </a:p>
@@ -5860,7 +6028,7 @@
         <p:spPr>
           <a:xfrm>
             <a:off x="2231136" y="2708476"/>
-            <a:ext cx="7630494" cy="369332"/>
+            <a:ext cx="7630494" cy="646331"/>
           </a:xfrm>
           <a:prstGeom prst="rect">
             <a:avLst/>
@@ -5874,6 +6042,16 @@
             <a:spAutoFit/>
           </a:bodyPr>
           <a:lstStyle/>
+          <a:p>
+            <a:r>
+              <a:rPr lang="en-US" dirty="0">
+                <a:solidFill>
+                  <a:schemeClr val="bg1"/>
+                </a:solidFill>
+              </a:rPr>
+              <a:t>docker run &lt;image&gt; &lt;command&gt;</a:t>
+            </a:r>
+          </a:p>
           <a:p>
             <a:r>
               <a:rPr lang="en-US" dirty="0">
@@ -6419,7 +6597,7 @@
             </a:r>
             <a:r>
               <a:rPr lang="en-US" dirty="0" err="1"/>
-              <a:t>puestos</a:t>
+              <a:t>pueRtos</a:t>
             </a:r>
             <a:endParaRPr lang="en-CR" dirty="0"/>
           </a:p>
@@ -6548,7 +6726,7 @@
                   <a:schemeClr val="bg1"/>
                 </a:solidFill>
               </a:rPr>
-              <a:t>ocker run -p</a:t>
+              <a:t>ocker run –p </a:t>
             </a:r>
             <a:r>
               <a:rPr lang="en-US" dirty="0">
@@ -6754,20 +6932,12 @@
           <a:lstStyle/>
           <a:p>
             <a:r>
-              <a:rPr lang="en-US" sz="1700">
+              <a:rPr lang="en-US" sz="1700" dirty="0">
                 <a:solidFill>
                   <a:schemeClr val="bg1"/>
                 </a:solidFill>
               </a:rPr>
-              <a:t>docker </a:t>
-            </a:r>
-            <a:r>
-              <a:rPr lang="en-US" sz="1700" dirty="0">
-                <a:solidFill>
-                  <a:schemeClr val="bg1"/>
-                </a:solidFill>
-              </a:rPr>
-              <a:t>run –p3306:3306 -v /Users/jpmacprom1/</a:t>
+              <a:t>docker run -p 3306:3306 -v /Users/jpmacprom1/</a:t>
             </a:r>
             <a:r>
               <a:rPr lang="en-US" sz="1700" dirty="0" err="1">
@@ -6954,7 +7124,7 @@
                   <a:schemeClr val="bg1"/>
                 </a:solidFill>
               </a:rPr>
-              <a:t>ocker run &lt;image&gt;:&lt;tag&gt; --name &lt;name&gt;</a:t>
+              <a:t>ocker run --name &lt;name&gt; &lt;image&gt;:&lt;tag&gt; </a:t>
             </a:r>
           </a:p>
         </p:txBody>
@@ -6974,7 +7144,7 @@
         <p:spPr>
           <a:xfrm>
             <a:off x="2231136" y="3514115"/>
-            <a:ext cx="7630494" cy="369332"/>
+            <a:ext cx="7630494" cy="646331"/>
           </a:xfrm>
           <a:prstGeom prst="rect">
             <a:avLst/>
@@ -6995,7 +7165,7 @@
                   <a:schemeClr val="bg1"/>
                 </a:solidFill>
               </a:rPr>
-              <a:t>docker run </a:t>
+              <a:t>docker run –e MYSQL_ROOT_PASSWORD=my-secret-pw  --name </a:t>
             </a:r>
             <a:r>
               <a:rPr lang="en-US" dirty="0" err="1">
@@ -7003,23 +7173,23 @@
                   <a:schemeClr val="bg1"/>
                 </a:solidFill>
               </a:rPr>
+              <a:t>mysql_server</a:t>
+            </a:r>
+            <a:r>
+              <a:rPr lang="en-US" dirty="0">
+                <a:solidFill>
+                  <a:schemeClr val="bg1"/>
+                </a:solidFill>
+              </a:rPr>
+              <a:t> </a:t>
+            </a:r>
+            <a:r>
+              <a:rPr lang="en-US" dirty="0" err="1">
+                <a:solidFill>
+                  <a:schemeClr val="bg1"/>
+                </a:solidFill>
+              </a:rPr>
               <a:t>mysql</a:t>
-            </a:r>
-            <a:r>
-              <a:rPr lang="en-US" dirty="0">
-                <a:solidFill>
-                  <a:schemeClr val="bg1"/>
-                </a:solidFill>
-              </a:rPr>
-              <a:t> --name </a:t>
-            </a:r>
-            <a:r>
-              <a:rPr lang="en-US" dirty="0" err="1">
-                <a:solidFill>
-                  <a:schemeClr val="bg1"/>
-                </a:solidFill>
-              </a:rPr>
-              <a:t>mysql_server</a:t>
             </a:r>
             <a:r>
               <a:rPr lang="en-US" dirty="0">
@@ -12657,7 +12827,7 @@
             </a:pPr>
             <a:r>
               <a:rPr lang="en-CR" dirty="0"/>
-              <a:t>Serivicios aislados</a:t>
+              <a:t>Servicios aislados</a:t>
             </a:r>
           </a:p>
           <a:p>
@@ -12743,7 +12913,7 @@
           <p:nvPr/>
         </p:nvPicPr>
         <p:blipFill>
-          <a:blip r:embed="rId2">
+          <a:blip r:embed="rId3">
             <a:extLst>
               <a:ext uri="{28A0092B-C50C-407E-A947-70E740481C1C}">
                 <a14:useLocalDpi xmlns:a14="http://schemas.microsoft.com/office/drawing/2010/main" val="0"/>

</xml_diff>